<commit_message>
Added some content from third section (Dev / Test)
</commit_message>
<xml_diff>
--- a/6-ASPNET-in-Production.pptx
+++ b/6-ASPNET-in-Production.pptx
@@ -12,7 +12,7 @@
     <p:sldMasterId id="2147483784" r:id="rId8"/>
   </p:sldMasterIdLst>
   <p:notesMasterIdLst>
-    <p:notesMasterId r:id="rId41"/>
+    <p:notesMasterId r:id="rId47"/>
   </p:notesMasterIdLst>
   <p:sldIdLst>
     <p:sldId id="269" r:id="rId9"/>
@@ -33,7 +33,7 @@
     <p:sldId id="289" r:id="rId24"/>
     <p:sldId id="290" r:id="rId25"/>
     <p:sldId id="292" r:id="rId26"/>
-    <p:sldId id="293" r:id="rId27"/>
+    <p:sldId id="305" r:id="rId27"/>
     <p:sldId id="294" r:id="rId28"/>
     <p:sldId id="295" r:id="rId29"/>
     <p:sldId id="296" r:id="rId30"/>
@@ -44,9 +44,15 @@
     <p:sldId id="301" r:id="rId35"/>
     <p:sldId id="302" r:id="rId36"/>
     <p:sldId id="303" r:id="rId37"/>
-    <p:sldId id="304" r:id="rId38"/>
-    <p:sldId id="272" r:id="rId39"/>
-    <p:sldId id="263" r:id="rId40"/>
+    <p:sldId id="306" r:id="rId38"/>
+    <p:sldId id="307" r:id="rId39"/>
+    <p:sldId id="308" r:id="rId40"/>
+    <p:sldId id="309" r:id="rId41"/>
+    <p:sldId id="310" r:id="rId42"/>
+    <p:sldId id="311" r:id="rId43"/>
+    <p:sldId id="313" r:id="rId44"/>
+    <p:sldId id="312" r:id="rId45"/>
+    <p:sldId id="263" r:id="rId46"/>
   </p:sldIdLst>
   <p:sldSz cx="12192000" cy="6858000"/>
   <p:notesSz cx="6858000" cy="9144000"/>
@@ -235,7 +241,7 @@
           <a:p>
             <a:fld id="{0E990FE3-7537-4D15-A9F5-FDF1805FD5F8}" type="datetimeFigureOut">
               <a:rPr lang="en-US" smtClean="0"/>
-              <a:t>10/19/2013</a:t>
+              <a:t>10/20/2013</a:t>
             </a:fld>
             <a:endParaRPr lang="en-US"/>
           </a:p>
@@ -2177,6 +2183,117 @@
 </file>
 
 <file path=ppt/slideLayouts/slideLayout15.xml><?xml version="1.0" encoding="utf-8"?>
+<p:sldLayout xmlns:a="http://schemas.openxmlformats.org/drawingml/2006/main" xmlns:r="http://schemas.openxmlformats.org/officeDocument/2006/relationships" xmlns:p="http://schemas.openxmlformats.org/presentationml/2006/main" userDrawn="1">
+  <p:cSld name="3_Custom Layout">
+    <p:bg>
+      <p:bgPr>
+        <a:solidFill>
+          <a:srgbClr val="617081"/>
+        </a:solidFill>
+        <a:effectLst/>
+      </p:bgPr>
+    </p:bg>
+    <p:spTree>
+      <p:nvGrpSpPr>
+        <p:cNvPr id="1" name=""/>
+        <p:cNvGrpSpPr/>
+        <p:nvPr/>
+      </p:nvGrpSpPr>
+      <p:grpSpPr>
+        <a:xfrm>
+          <a:off x="0" y="0"/>
+          <a:ext cx="0" cy="0"/>
+          <a:chOff x="0" y="0"/>
+          <a:chExt cx="0" cy="0"/>
+        </a:xfrm>
+      </p:grpSpPr>
+      <p:sp>
+        <p:nvSpPr>
+          <p:cNvPr id="4" name="Title 3"/>
+          <p:cNvSpPr>
+            <a:spLocks noGrp="1"/>
+          </p:cNvSpPr>
+          <p:nvPr>
+            <p:ph type="title"/>
+          </p:nvPr>
+        </p:nvSpPr>
+        <p:spPr/>
+        <p:txBody>
+          <a:bodyPr anchor="b"/>
+          <a:lstStyle/>
+          <a:p>
+            <a:r>
+              <a:rPr lang="en-US" smtClean="0"/>
+              <a:t>Click to edit Master title style</a:t>
+            </a:r>
+            <a:endParaRPr lang="en-US"/>
+          </a:p>
+        </p:txBody>
+      </p:sp>
+      <p:sp>
+        <p:nvSpPr>
+          <p:cNvPr id="6" name="Text Placeholder 5"/>
+          <p:cNvSpPr>
+            <a:spLocks noGrp="1"/>
+          </p:cNvSpPr>
+          <p:nvPr>
+            <p:ph type="body" sz="quarter" idx="10" hasCustomPrompt="1"/>
+          </p:nvPr>
+        </p:nvSpPr>
+        <p:spPr>
+          <a:xfrm>
+            <a:off x="6638425" y="5517221"/>
+            <a:ext cx="5013325" cy="1026863"/>
+          </a:xfrm>
+        </p:spPr>
+        <p:txBody>
+          <a:bodyPr/>
+          <a:lstStyle>
+            <a:lvl1pPr>
+              <a:defRPr>
+                <a:solidFill>
+                  <a:srgbClr val="BDCD2C"/>
+                </a:solidFill>
+              </a:defRPr>
+            </a:lvl1pPr>
+          </a:lstStyle>
+          <a:p>
+            <a:pPr lvl="0"/>
+            <a:r>
+              <a:rPr lang="en-US" dirty="0" smtClean="0"/>
+              <a:t>Presenter Name</a:t>
+            </a:r>
+          </a:p>
+          <a:p>
+            <a:pPr lvl="0"/>
+            <a:r>
+              <a:rPr lang="en-US" dirty="0" smtClean="0"/>
+              <a:t>Title/role</a:t>
+            </a:r>
+          </a:p>
+        </p:txBody>
+      </p:sp>
+    </p:spTree>
+    <p:extLst>
+      <p:ext uri="{BB962C8B-B14F-4D97-AF65-F5344CB8AC3E}">
+        <p14:creationId xmlns:p14="http://schemas.microsoft.com/office/powerpoint/2010/main" val="13566877"/>
+      </p:ext>
+    </p:extLst>
+  </p:cSld>
+  <p:clrMapOvr>
+    <a:masterClrMapping/>
+  </p:clrMapOvr>
+  <p:timing>
+    <p:tnLst>
+      <p:par>
+        <p:cTn id="1" dur="indefinite" restart="never" nodeType="tmRoot"/>
+      </p:par>
+    </p:tnLst>
+  </p:timing>
+</p:sldLayout>
+</file>
+
+<file path=ppt/slideLayouts/slideLayout16.xml><?xml version="1.0" encoding="utf-8"?>
 <p:sldLayout xmlns:a="http://schemas.openxmlformats.org/drawingml/2006/main" xmlns:r="http://schemas.openxmlformats.org/officeDocument/2006/relationships" xmlns:p="http://schemas.openxmlformats.org/presentationml/2006/main" type="title" preserve="1">
   <p:cSld name="Title Slide">
     <p:bg>
@@ -2320,7 +2437,7 @@
 </p:sldLayout>
 </file>
 
-<file path=ppt/slideLayouts/slideLayout16.xml><?xml version="1.0" encoding="utf-8"?>
+<file path=ppt/slideLayouts/slideLayout17.xml><?xml version="1.0" encoding="utf-8"?>
 <p:sldLayout xmlns:a="http://schemas.openxmlformats.org/drawingml/2006/main" xmlns:r="http://schemas.openxmlformats.org/officeDocument/2006/relationships" xmlns:p="http://schemas.openxmlformats.org/presentationml/2006/main" type="obj" preserve="1">
   <p:cSld name="Title and Content">
     <p:bg>
@@ -2471,7 +2588,7 @@
 </p:sldLayout>
 </file>
 
-<file path=ppt/slideLayouts/slideLayout17.xml><?xml version="1.0" encoding="utf-8"?>
+<file path=ppt/slideLayouts/slideLayout18.xml><?xml version="1.0" encoding="utf-8"?>
 <p:sldLayout xmlns:a="http://schemas.openxmlformats.org/drawingml/2006/main" xmlns:r="http://schemas.openxmlformats.org/officeDocument/2006/relationships" xmlns:p="http://schemas.openxmlformats.org/presentationml/2006/main" preserve="1" userDrawn="1">
   <p:cSld name="1_Title and Content">
     <p:spTree>
@@ -2659,7 +2776,7 @@
 </p:sldLayout>
 </file>
 
-<file path=ppt/slideLayouts/slideLayout18.xml><?xml version="1.0" encoding="utf-8"?>
+<file path=ppt/slideLayouts/slideLayout19.xml><?xml version="1.0" encoding="utf-8"?>
 <p:sldLayout xmlns:a="http://schemas.openxmlformats.org/drawingml/2006/main" xmlns:r="http://schemas.openxmlformats.org/officeDocument/2006/relationships" xmlns:p="http://schemas.openxmlformats.org/presentationml/2006/main" type="titleOnly" preserve="1">
   <p:cSld name="Title Only">
     <p:bg>
@@ -2758,7 +2875,118 @@
 </p:sldLayout>
 </file>
 
-<file path=ppt/slideLayouts/slideLayout19.xml><?xml version="1.0" encoding="utf-8"?>
+<file path=ppt/slideLayouts/slideLayout2.xml><?xml version="1.0" encoding="utf-8"?>
+<p:sldLayout xmlns:a="http://schemas.openxmlformats.org/drawingml/2006/main" xmlns:r="http://schemas.openxmlformats.org/officeDocument/2006/relationships" xmlns:p="http://schemas.openxmlformats.org/presentationml/2006/main" preserve="1" userDrawn="1">
+  <p:cSld name="1_Custom Layout">
+    <p:bg>
+      <p:bgPr>
+        <a:solidFill>
+          <a:srgbClr val="0171B0"/>
+        </a:solidFill>
+        <a:effectLst/>
+      </p:bgPr>
+    </p:bg>
+    <p:spTree>
+      <p:nvGrpSpPr>
+        <p:cNvPr id="1" name=""/>
+        <p:cNvGrpSpPr/>
+        <p:nvPr/>
+      </p:nvGrpSpPr>
+      <p:grpSpPr>
+        <a:xfrm>
+          <a:off x="0" y="0"/>
+          <a:ext cx="0" cy="0"/>
+          <a:chOff x="0" y="0"/>
+          <a:chExt cx="0" cy="0"/>
+        </a:xfrm>
+      </p:grpSpPr>
+      <p:sp>
+        <p:nvSpPr>
+          <p:cNvPr id="4" name="Title 3"/>
+          <p:cNvSpPr>
+            <a:spLocks noGrp="1"/>
+          </p:cNvSpPr>
+          <p:nvPr>
+            <p:ph type="title"/>
+          </p:nvPr>
+        </p:nvSpPr>
+        <p:spPr/>
+        <p:txBody>
+          <a:bodyPr anchor="b"/>
+          <a:lstStyle/>
+          <a:p>
+            <a:r>
+              <a:rPr lang="en-US" smtClean="0"/>
+              <a:t>Click to edit Master title style</a:t>
+            </a:r>
+            <a:endParaRPr lang="en-US"/>
+          </a:p>
+        </p:txBody>
+      </p:sp>
+      <p:sp>
+        <p:nvSpPr>
+          <p:cNvPr id="6" name="Text Placeholder 5"/>
+          <p:cNvSpPr>
+            <a:spLocks noGrp="1"/>
+          </p:cNvSpPr>
+          <p:nvPr>
+            <p:ph type="body" sz="quarter" idx="10" hasCustomPrompt="1"/>
+          </p:nvPr>
+        </p:nvSpPr>
+        <p:spPr>
+          <a:xfrm>
+            <a:off x="6638425" y="5517221"/>
+            <a:ext cx="5013325" cy="1026863"/>
+          </a:xfrm>
+        </p:spPr>
+        <p:txBody>
+          <a:bodyPr/>
+          <a:lstStyle>
+            <a:lvl1pPr>
+              <a:defRPr>
+                <a:solidFill>
+                  <a:srgbClr val="3C454F"/>
+                </a:solidFill>
+              </a:defRPr>
+            </a:lvl1pPr>
+          </a:lstStyle>
+          <a:p>
+            <a:pPr lvl="0"/>
+            <a:r>
+              <a:rPr lang="en-US" dirty="0" smtClean="0"/>
+              <a:t>Presenter Name</a:t>
+            </a:r>
+          </a:p>
+          <a:p>
+            <a:pPr lvl="0"/>
+            <a:r>
+              <a:rPr lang="en-US" dirty="0" smtClean="0"/>
+              <a:t>Title/role</a:t>
+            </a:r>
+          </a:p>
+        </p:txBody>
+      </p:sp>
+    </p:spTree>
+    <p:extLst>
+      <p:ext uri="{BB962C8B-B14F-4D97-AF65-F5344CB8AC3E}">
+        <p14:creationId xmlns:p14="http://schemas.microsoft.com/office/powerpoint/2010/main" val="62634884"/>
+      </p:ext>
+    </p:extLst>
+  </p:cSld>
+  <p:clrMapOvr>
+    <a:masterClrMapping/>
+  </p:clrMapOvr>
+  <p:timing>
+    <p:tnLst>
+      <p:par>
+        <p:cTn id="1" dur="indefinite" restart="never" nodeType="tmRoot"/>
+      </p:par>
+    </p:tnLst>
+  </p:timing>
+</p:sldLayout>
+</file>
+
+<file path=ppt/slideLayouts/slideLayout20.xml><?xml version="1.0" encoding="utf-8"?>
 <p:sldLayout xmlns:a="http://schemas.openxmlformats.org/drawingml/2006/main" xmlns:r="http://schemas.openxmlformats.org/officeDocument/2006/relationships" xmlns:p="http://schemas.openxmlformats.org/presentationml/2006/main" preserve="1" userDrawn="1">
   <p:cSld name="1_Title Only">
     <p:spTree>
@@ -3735,118 +3963,7 @@
 </p:sldLayout>
 </file>
 
-<file path=ppt/slideLayouts/slideLayout2.xml><?xml version="1.0" encoding="utf-8"?>
-<p:sldLayout xmlns:a="http://schemas.openxmlformats.org/drawingml/2006/main" xmlns:r="http://schemas.openxmlformats.org/officeDocument/2006/relationships" xmlns:p="http://schemas.openxmlformats.org/presentationml/2006/main" preserve="1" userDrawn="1">
-  <p:cSld name="1_Custom Layout">
-    <p:bg>
-      <p:bgPr>
-        <a:solidFill>
-          <a:srgbClr val="0171B0"/>
-        </a:solidFill>
-        <a:effectLst/>
-      </p:bgPr>
-    </p:bg>
-    <p:spTree>
-      <p:nvGrpSpPr>
-        <p:cNvPr id="1" name=""/>
-        <p:cNvGrpSpPr/>
-        <p:nvPr/>
-      </p:nvGrpSpPr>
-      <p:grpSpPr>
-        <a:xfrm>
-          <a:off x="0" y="0"/>
-          <a:ext cx="0" cy="0"/>
-          <a:chOff x="0" y="0"/>
-          <a:chExt cx="0" cy="0"/>
-        </a:xfrm>
-      </p:grpSpPr>
-      <p:sp>
-        <p:nvSpPr>
-          <p:cNvPr id="4" name="Title 3"/>
-          <p:cNvSpPr>
-            <a:spLocks noGrp="1"/>
-          </p:cNvSpPr>
-          <p:nvPr>
-            <p:ph type="title"/>
-          </p:nvPr>
-        </p:nvSpPr>
-        <p:spPr/>
-        <p:txBody>
-          <a:bodyPr anchor="b"/>
-          <a:lstStyle/>
-          <a:p>
-            <a:r>
-              <a:rPr lang="en-US" smtClean="0"/>
-              <a:t>Click to edit Master title style</a:t>
-            </a:r>
-            <a:endParaRPr lang="en-US"/>
-          </a:p>
-        </p:txBody>
-      </p:sp>
-      <p:sp>
-        <p:nvSpPr>
-          <p:cNvPr id="6" name="Text Placeholder 5"/>
-          <p:cNvSpPr>
-            <a:spLocks noGrp="1"/>
-          </p:cNvSpPr>
-          <p:nvPr>
-            <p:ph type="body" sz="quarter" idx="10" hasCustomPrompt="1"/>
-          </p:nvPr>
-        </p:nvSpPr>
-        <p:spPr>
-          <a:xfrm>
-            <a:off x="6638425" y="5517221"/>
-            <a:ext cx="5013325" cy="1026863"/>
-          </a:xfrm>
-        </p:spPr>
-        <p:txBody>
-          <a:bodyPr/>
-          <a:lstStyle>
-            <a:lvl1pPr>
-              <a:defRPr>
-                <a:solidFill>
-                  <a:srgbClr val="3C454F"/>
-                </a:solidFill>
-              </a:defRPr>
-            </a:lvl1pPr>
-          </a:lstStyle>
-          <a:p>
-            <a:pPr lvl="0"/>
-            <a:r>
-              <a:rPr lang="en-US" dirty="0" smtClean="0"/>
-              <a:t>Presenter Name</a:t>
-            </a:r>
-          </a:p>
-          <a:p>
-            <a:pPr lvl="0"/>
-            <a:r>
-              <a:rPr lang="en-US" dirty="0" smtClean="0"/>
-              <a:t>Title/role</a:t>
-            </a:r>
-          </a:p>
-        </p:txBody>
-      </p:sp>
-    </p:spTree>
-    <p:extLst>
-      <p:ext uri="{BB962C8B-B14F-4D97-AF65-F5344CB8AC3E}">
-        <p14:creationId xmlns:p14="http://schemas.microsoft.com/office/powerpoint/2010/main" val="62634884"/>
-      </p:ext>
-    </p:extLst>
-  </p:cSld>
-  <p:clrMapOvr>
-    <a:masterClrMapping/>
-  </p:clrMapOvr>
-  <p:timing>
-    <p:tnLst>
-      <p:par>
-        <p:cTn id="1" dur="indefinite" restart="never" nodeType="tmRoot"/>
-      </p:par>
-    </p:tnLst>
-  </p:timing>
-</p:sldLayout>
-</file>
-
-<file path=ppt/slideLayouts/slideLayout20.xml><?xml version="1.0" encoding="utf-8"?>
+<file path=ppt/slideLayouts/slideLayout21.xml><?xml version="1.0" encoding="utf-8"?>
 <p:sldLayout xmlns:a="http://schemas.openxmlformats.org/drawingml/2006/main" xmlns:r="http://schemas.openxmlformats.org/officeDocument/2006/relationships" xmlns:p="http://schemas.openxmlformats.org/presentationml/2006/main" type="blank" preserve="1">
   <p:cSld name="Blank">
     <p:bg>
@@ -3922,7 +4039,7 @@
 </p:sldLayout>
 </file>
 
-<file path=ppt/slideLayouts/slideLayout21.xml><?xml version="1.0" encoding="utf-8"?>
+<file path=ppt/slideLayouts/slideLayout22.xml><?xml version="1.0" encoding="utf-8"?>
 <p:sldLayout xmlns:a="http://schemas.openxmlformats.org/drawingml/2006/main" xmlns:r="http://schemas.openxmlformats.org/officeDocument/2006/relationships" xmlns:p="http://schemas.openxmlformats.org/presentationml/2006/main" type="blank" preserve="1">
   <p:cSld name="1_Blank">
     <p:bg>
@@ -3967,7 +4084,7 @@
 </p:sldLayout>
 </file>
 
-<file path=ppt/slideLayouts/slideLayout22.xml><?xml version="1.0" encoding="utf-8"?>
+<file path=ppt/slideLayouts/slideLayout23.xml><?xml version="1.0" encoding="utf-8"?>
 <p:sldLayout xmlns:a="http://schemas.openxmlformats.org/drawingml/2006/main" xmlns:r="http://schemas.openxmlformats.org/officeDocument/2006/relationships" xmlns:p="http://schemas.openxmlformats.org/presentationml/2006/main" type="objTx" preserve="1">
   <p:cSld name="Content with Caption">
     <p:bg>
@@ -4239,7 +4356,7 @@
 </p:sldLayout>
 </file>
 
-<file path=ppt/slideLayouts/slideLayout23.xml><?xml version="1.0" encoding="utf-8"?>
+<file path=ppt/slideLayouts/slideLayout24.xml><?xml version="1.0" encoding="utf-8"?>
 <p:sldLayout xmlns:a="http://schemas.openxmlformats.org/drawingml/2006/main" xmlns:r="http://schemas.openxmlformats.org/officeDocument/2006/relationships" xmlns:p="http://schemas.openxmlformats.org/presentationml/2006/main" type="title" preserve="1">
   <p:cSld name="Title Slide">
     <p:bg>
@@ -4383,7 +4500,7 @@
 </p:sldLayout>
 </file>
 
-<file path=ppt/slideLayouts/slideLayout24.xml><?xml version="1.0" encoding="utf-8"?>
+<file path=ppt/slideLayouts/slideLayout25.xml><?xml version="1.0" encoding="utf-8"?>
 <p:sldLayout xmlns:a="http://schemas.openxmlformats.org/drawingml/2006/main" xmlns:r="http://schemas.openxmlformats.org/officeDocument/2006/relationships" xmlns:p="http://schemas.openxmlformats.org/presentationml/2006/main" type="obj" preserve="1">
   <p:cSld name="Title and Content">
     <p:bg>
@@ -4534,7 +4651,7 @@
 </p:sldLayout>
 </file>
 
-<file path=ppt/slideLayouts/slideLayout25.xml><?xml version="1.0" encoding="utf-8"?>
+<file path=ppt/slideLayouts/slideLayout26.xml><?xml version="1.0" encoding="utf-8"?>
 <p:sldLayout xmlns:a="http://schemas.openxmlformats.org/drawingml/2006/main" xmlns:r="http://schemas.openxmlformats.org/officeDocument/2006/relationships" xmlns:p="http://schemas.openxmlformats.org/presentationml/2006/main" preserve="1" userDrawn="1">
   <p:cSld name="1_Title and Content">
     <p:spTree>
@@ -4722,7 +4839,7 @@
 </p:sldLayout>
 </file>
 
-<file path=ppt/slideLayouts/slideLayout26.xml><?xml version="1.0" encoding="utf-8"?>
+<file path=ppt/slideLayouts/slideLayout27.xml><?xml version="1.0" encoding="utf-8"?>
 <p:sldLayout xmlns:a="http://schemas.openxmlformats.org/drawingml/2006/main" xmlns:r="http://schemas.openxmlformats.org/officeDocument/2006/relationships" xmlns:p="http://schemas.openxmlformats.org/presentationml/2006/main" type="titleOnly" preserve="1">
   <p:cSld name="Title Only">
     <p:bg>
@@ -4821,7 +4938,7 @@
 </p:sldLayout>
 </file>
 
-<file path=ppt/slideLayouts/slideLayout27.xml><?xml version="1.0" encoding="utf-8"?>
+<file path=ppt/slideLayouts/slideLayout28.xml><?xml version="1.0" encoding="utf-8"?>
 <p:sldLayout xmlns:a="http://schemas.openxmlformats.org/drawingml/2006/main" xmlns:r="http://schemas.openxmlformats.org/officeDocument/2006/relationships" xmlns:p="http://schemas.openxmlformats.org/presentationml/2006/main" preserve="1" userDrawn="1">
   <p:cSld name="1_Title Only">
     <p:spTree>
@@ -5854,7 +5971,7 @@
 </p:sldLayout>
 </file>
 
-<file path=ppt/slideLayouts/slideLayout28.xml><?xml version="1.0" encoding="utf-8"?>
+<file path=ppt/slideLayouts/slideLayout29.xml><?xml version="1.0" encoding="utf-8"?>
 <p:sldLayout xmlns:a="http://schemas.openxmlformats.org/drawingml/2006/main" xmlns:r="http://schemas.openxmlformats.org/officeDocument/2006/relationships" xmlns:p="http://schemas.openxmlformats.org/presentationml/2006/main" type="blank" preserve="1">
   <p:cSld name="Blank">
     <p:bg>
@@ -5930,7 +6047,118 @@
 </p:sldLayout>
 </file>
 
-<file path=ppt/slideLayouts/slideLayout29.xml><?xml version="1.0" encoding="utf-8"?>
+<file path=ppt/slideLayouts/slideLayout3.xml><?xml version="1.0" encoding="utf-8"?>
+<p:sldLayout xmlns:a="http://schemas.openxmlformats.org/drawingml/2006/main" xmlns:r="http://schemas.openxmlformats.org/officeDocument/2006/relationships" xmlns:p="http://schemas.openxmlformats.org/presentationml/2006/main" preserve="1" userDrawn="1">
+  <p:cSld name="2_Custom Layout">
+    <p:bg>
+      <p:bgPr>
+        <a:solidFill>
+          <a:srgbClr val="1D4380"/>
+        </a:solidFill>
+        <a:effectLst/>
+      </p:bgPr>
+    </p:bg>
+    <p:spTree>
+      <p:nvGrpSpPr>
+        <p:cNvPr id="1" name=""/>
+        <p:cNvGrpSpPr/>
+        <p:nvPr/>
+      </p:nvGrpSpPr>
+      <p:grpSpPr>
+        <a:xfrm>
+          <a:off x="0" y="0"/>
+          <a:ext cx="0" cy="0"/>
+          <a:chOff x="0" y="0"/>
+          <a:chExt cx="0" cy="0"/>
+        </a:xfrm>
+      </p:grpSpPr>
+      <p:sp>
+        <p:nvSpPr>
+          <p:cNvPr id="4" name="Title 3"/>
+          <p:cNvSpPr>
+            <a:spLocks noGrp="1"/>
+          </p:cNvSpPr>
+          <p:nvPr>
+            <p:ph type="title"/>
+          </p:nvPr>
+        </p:nvSpPr>
+        <p:spPr/>
+        <p:txBody>
+          <a:bodyPr anchor="b"/>
+          <a:lstStyle/>
+          <a:p>
+            <a:r>
+              <a:rPr lang="en-US" smtClean="0"/>
+              <a:t>Click to edit Master title style</a:t>
+            </a:r>
+            <a:endParaRPr lang="en-US"/>
+          </a:p>
+        </p:txBody>
+      </p:sp>
+      <p:sp>
+        <p:nvSpPr>
+          <p:cNvPr id="6" name="Text Placeholder 5"/>
+          <p:cNvSpPr>
+            <a:spLocks noGrp="1"/>
+          </p:cNvSpPr>
+          <p:nvPr>
+            <p:ph type="body" sz="quarter" idx="10" hasCustomPrompt="1"/>
+          </p:nvPr>
+        </p:nvSpPr>
+        <p:spPr>
+          <a:xfrm>
+            <a:off x="6638425" y="5517221"/>
+            <a:ext cx="5013325" cy="1026863"/>
+          </a:xfrm>
+        </p:spPr>
+        <p:txBody>
+          <a:bodyPr/>
+          <a:lstStyle>
+            <a:lvl1pPr>
+              <a:defRPr>
+                <a:solidFill>
+                  <a:srgbClr val="289FD7"/>
+                </a:solidFill>
+              </a:defRPr>
+            </a:lvl1pPr>
+          </a:lstStyle>
+          <a:p>
+            <a:pPr lvl="0"/>
+            <a:r>
+              <a:rPr lang="en-US" dirty="0" smtClean="0"/>
+              <a:t>Presenter Name</a:t>
+            </a:r>
+          </a:p>
+          <a:p>
+            <a:pPr lvl="0"/>
+            <a:r>
+              <a:rPr lang="en-US" dirty="0" smtClean="0"/>
+              <a:t>Title/role</a:t>
+            </a:r>
+          </a:p>
+        </p:txBody>
+      </p:sp>
+    </p:spTree>
+    <p:extLst>
+      <p:ext uri="{BB962C8B-B14F-4D97-AF65-F5344CB8AC3E}">
+        <p14:creationId xmlns:p14="http://schemas.microsoft.com/office/powerpoint/2010/main" val="991024635"/>
+      </p:ext>
+    </p:extLst>
+  </p:cSld>
+  <p:clrMapOvr>
+    <a:masterClrMapping/>
+  </p:clrMapOvr>
+  <p:timing>
+    <p:tnLst>
+      <p:par>
+        <p:cTn id="1" dur="indefinite" restart="never" nodeType="tmRoot"/>
+      </p:par>
+    </p:tnLst>
+  </p:timing>
+</p:sldLayout>
+</file>
+
+<file path=ppt/slideLayouts/slideLayout30.xml><?xml version="1.0" encoding="utf-8"?>
 <p:sldLayout xmlns:a="http://schemas.openxmlformats.org/drawingml/2006/main" xmlns:r="http://schemas.openxmlformats.org/officeDocument/2006/relationships" xmlns:p="http://schemas.openxmlformats.org/presentationml/2006/main" type="blank" preserve="1">
   <p:cSld name="1_Blank">
     <p:bg>
@@ -5975,118 +6203,7 @@
 </p:sldLayout>
 </file>
 
-<file path=ppt/slideLayouts/slideLayout3.xml><?xml version="1.0" encoding="utf-8"?>
-<p:sldLayout xmlns:a="http://schemas.openxmlformats.org/drawingml/2006/main" xmlns:r="http://schemas.openxmlformats.org/officeDocument/2006/relationships" xmlns:p="http://schemas.openxmlformats.org/presentationml/2006/main" preserve="1" userDrawn="1">
-  <p:cSld name="2_Custom Layout">
-    <p:bg>
-      <p:bgPr>
-        <a:solidFill>
-          <a:srgbClr val="1D4380"/>
-        </a:solidFill>
-        <a:effectLst/>
-      </p:bgPr>
-    </p:bg>
-    <p:spTree>
-      <p:nvGrpSpPr>
-        <p:cNvPr id="1" name=""/>
-        <p:cNvGrpSpPr/>
-        <p:nvPr/>
-      </p:nvGrpSpPr>
-      <p:grpSpPr>
-        <a:xfrm>
-          <a:off x="0" y="0"/>
-          <a:ext cx="0" cy="0"/>
-          <a:chOff x="0" y="0"/>
-          <a:chExt cx="0" cy="0"/>
-        </a:xfrm>
-      </p:grpSpPr>
-      <p:sp>
-        <p:nvSpPr>
-          <p:cNvPr id="4" name="Title 3"/>
-          <p:cNvSpPr>
-            <a:spLocks noGrp="1"/>
-          </p:cNvSpPr>
-          <p:nvPr>
-            <p:ph type="title"/>
-          </p:nvPr>
-        </p:nvSpPr>
-        <p:spPr/>
-        <p:txBody>
-          <a:bodyPr anchor="b"/>
-          <a:lstStyle/>
-          <a:p>
-            <a:r>
-              <a:rPr lang="en-US" smtClean="0"/>
-              <a:t>Click to edit Master title style</a:t>
-            </a:r>
-            <a:endParaRPr lang="en-US"/>
-          </a:p>
-        </p:txBody>
-      </p:sp>
-      <p:sp>
-        <p:nvSpPr>
-          <p:cNvPr id="6" name="Text Placeholder 5"/>
-          <p:cNvSpPr>
-            <a:spLocks noGrp="1"/>
-          </p:cNvSpPr>
-          <p:nvPr>
-            <p:ph type="body" sz="quarter" idx="10" hasCustomPrompt="1"/>
-          </p:nvPr>
-        </p:nvSpPr>
-        <p:spPr>
-          <a:xfrm>
-            <a:off x="6638425" y="5517221"/>
-            <a:ext cx="5013325" cy="1026863"/>
-          </a:xfrm>
-        </p:spPr>
-        <p:txBody>
-          <a:bodyPr/>
-          <a:lstStyle>
-            <a:lvl1pPr>
-              <a:defRPr>
-                <a:solidFill>
-                  <a:srgbClr val="289FD7"/>
-                </a:solidFill>
-              </a:defRPr>
-            </a:lvl1pPr>
-          </a:lstStyle>
-          <a:p>
-            <a:pPr lvl="0"/>
-            <a:r>
-              <a:rPr lang="en-US" dirty="0" smtClean="0"/>
-              <a:t>Presenter Name</a:t>
-            </a:r>
-          </a:p>
-          <a:p>
-            <a:pPr lvl="0"/>
-            <a:r>
-              <a:rPr lang="en-US" dirty="0" smtClean="0"/>
-              <a:t>Title/role</a:t>
-            </a:r>
-          </a:p>
-        </p:txBody>
-      </p:sp>
-    </p:spTree>
-    <p:extLst>
-      <p:ext uri="{BB962C8B-B14F-4D97-AF65-F5344CB8AC3E}">
-        <p14:creationId xmlns:p14="http://schemas.microsoft.com/office/powerpoint/2010/main" val="991024635"/>
-      </p:ext>
-    </p:extLst>
-  </p:cSld>
-  <p:clrMapOvr>
-    <a:masterClrMapping/>
-  </p:clrMapOvr>
-  <p:timing>
-    <p:tnLst>
-      <p:par>
-        <p:cTn id="1" dur="indefinite" restart="never" nodeType="tmRoot"/>
-      </p:par>
-    </p:tnLst>
-  </p:timing>
-</p:sldLayout>
-</file>
-
-<file path=ppt/slideLayouts/slideLayout30.xml><?xml version="1.0" encoding="utf-8"?>
+<file path=ppt/slideLayouts/slideLayout31.xml><?xml version="1.0" encoding="utf-8"?>
 <p:sldLayout xmlns:a="http://schemas.openxmlformats.org/drawingml/2006/main" xmlns:r="http://schemas.openxmlformats.org/officeDocument/2006/relationships" xmlns:p="http://schemas.openxmlformats.org/presentationml/2006/main" type="objTx" preserve="1">
   <p:cSld name="Content with Caption">
     <p:bg>
@@ -6358,7 +6475,7 @@
 </p:sldLayout>
 </file>
 
-<file path=ppt/slideLayouts/slideLayout31.xml><?xml version="1.0" encoding="utf-8"?>
+<file path=ppt/slideLayouts/slideLayout32.xml><?xml version="1.0" encoding="utf-8"?>
 <p:sldLayout xmlns:a="http://schemas.openxmlformats.org/drawingml/2006/main" xmlns:r="http://schemas.openxmlformats.org/officeDocument/2006/relationships" xmlns:p="http://schemas.openxmlformats.org/presentationml/2006/main" type="title" preserve="1">
   <p:cSld name="Title Slide">
     <p:bg>
@@ -6502,7 +6619,7 @@
 </p:sldLayout>
 </file>
 
-<file path=ppt/slideLayouts/slideLayout32.xml><?xml version="1.0" encoding="utf-8"?>
+<file path=ppt/slideLayouts/slideLayout33.xml><?xml version="1.0" encoding="utf-8"?>
 <p:sldLayout xmlns:a="http://schemas.openxmlformats.org/drawingml/2006/main" xmlns:r="http://schemas.openxmlformats.org/officeDocument/2006/relationships" xmlns:p="http://schemas.openxmlformats.org/presentationml/2006/main" type="obj" preserve="1">
   <p:cSld name="Title and Content">
     <p:bg>
@@ -6653,7 +6770,7 @@
 </p:sldLayout>
 </file>
 
-<file path=ppt/slideLayouts/slideLayout33.xml><?xml version="1.0" encoding="utf-8"?>
+<file path=ppt/slideLayouts/slideLayout34.xml><?xml version="1.0" encoding="utf-8"?>
 <p:sldLayout xmlns:a="http://schemas.openxmlformats.org/drawingml/2006/main" xmlns:r="http://schemas.openxmlformats.org/officeDocument/2006/relationships" xmlns:p="http://schemas.openxmlformats.org/presentationml/2006/main" preserve="1" userDrawn="1">
   <p:cSld name="1_Title and Content">
     <p:spTree>
@@ -6841,7 +6958,7 @@
 </p:sldLayout>
 </file>
 
-<file path=ppt/slideLayouts/slideLayout34.xml><?xml version="1.0" encoding="utf-8"?>
+<file path=ppt/slideLayouts/slideLayout35.xml><?xml version="1.0" encoding="utf-8"?>
 <p:sldLayout xmlns:a="http://schemas.openxmlformats.org/drawingml/2006/main" xmlns:r="http://schemas.openxmlformats.org/officeDocument/2006/relationships" xmlns:p="http://schemas.openxmlformats.org/presentationml/2006/main" type="titleOnly" preserve="1">
   <p:cSld name="Title Only">
     <p:bg>
@@ -6940,7 +7057,7 @@
 </p:sldLayout>
 </file>
 
-<file path=ppt/slideLayouts/slideLayout35.xml><?xml version="1.0" encoding="utf-8"?>
+<file path=ppt/slideLayouts/slideLayout36.xml><?xml version="1.0" encoding="utf-8"?>
 <p:sldLayout xmlns:a="http://schemas.openxmlformats.org/drawingml/2006/main" xmlns:r="http://schemas.openxmlformats.org/officeDocument/2006/relationships" xmlns:p="http://schemas.openxmlformats.org/presentationml/2006/main" preserve="1" userDrawn="1">
   <p:cSld name="1_Title Only">
     <p:spTree>
@@ -7975,7 +8092,7 @@
 </p:sldLayout>
 </file>
 
-<file path=ppt/slideLayouts/slideLayout36.xml><?xml version="1.0" encoding="utf-8"?>
+<file path=ppt/slideLayouts/slideLayout37.xml><?xml version="1.0" encoding="utf-8"?>
 <p:sldLayout xmlns:a="http://schemas.openxmlformats.org/drawingml/2006/main" xmlns:r="http://schemas.openxmlformats.org/officeDocument/2006/relationships" xmlns:p="http://schemas.openxmlformats.org/presentationml/2006/main" type="blank" preserve="1">
   <p:cSld name="Blank">
     <p:bg>
@@ -8051,7 +8168,7 @@
 </p:sldLayout>
 </file>
 
-<file path=ppt/slideLayouts/slideLayout37.xml><?xml version="1.0" encoding="utf-8"?>
+<file path=ppt/slideLayouts/slideLayout38.xml><?xml version="1.0" encoding="utf-8"?>
 <p:sldLayout xmlns:a="http://schemas.openxmlformats.org/drawingml/2006/main" xmlns:r="http://schemas.openxmlformats.org/officeDocument/2006/relationships" xmlns:p="http://schemas.openxmlformats.org/presentationml/2006/main" type="blank" preserve="1">
   <p:cSld name="1_Blank">
     <p:bg>
@@ -8096,7 +8213,7 @@
 </p:sldLayout>
 </file>
 
-<file path=ppt/slideLayouts/slideLayout38.xml><?xml version="1.0" encoding="utf-8"?>
+<file path=ppt/slideLayouts/slideLayout39.xml><?xml version="1.0" encoding="utf-8"?>
 <p:sldLayout xmlns:a="http://schemas.openxmlformats.org/drawingml/2006/main" xmlns:r="http://schemas.openxmlformats.org/officeDocument/2006/relationships" xmlns:p="http://schemas.openxmlformats.org/presentationml/2006/main" type="objTx" preserve="1">
   <p:cSld name="Content with Caption">
     <p:bg>
@@ -8368,7 +8485,118 @@
 </p:sldLayout>
 </file>
 
-<file path=ppt/slideLayouts/slideLayout39.xml><?xml version="1.0" encoding="utf-8"?>
+<file path=ppt/slideLayouts/slideLayout4.xml><?xml version="1.0" encoding="utf-8"?>
+<p:sldLayout xmlns:a="http://schemas.openxmlformats.org/drawingml/2006/main" xmlns:r="http://schemas.openxmlformats.org/officeDocument/2006/relationships" xmlns:p="http://schemas.openxmlformats.org/presentationml/2006/main" preserve="1" userDrawn="1">
+  <p:cSld name="3_Custom Layout">
+    <p:bg>
+      <p:bgPr>
+        <a:solidFill>
+          <a:srgbClr val="617081"/>
+        </a:solidFill>
+        <a:effectLst/>
+      </p:bgPr>
+    </p:bg>
+    <p:spTree>
+      <p:nvGrpSpPr>
+        <p:cNvPr id="1" name=""/>
+        <p:cNvGrpSpPr/>
+        <p:nvPr/>
+      </p:nvGrpSpPr>
+      <p:grpSpPr>
+        <a:xfrm>
+          <a:off x="0" y="0"/>
+          <a:ext cx="0" cy="0"/>
+          <a:chOff x="0" y="0"/>
+          <a:chExt cx="0" cy="0"/>
+        </a:xfrm>
+      </p:grpSpPr>
+      <p:sp>
+        <p:nvSpPr>
+          <p:cNvPr id="4" name="Title 3"/>
+          <p:cNvSpPr>
+            <a:spLocks noGrp="1"/>
+          </p:cNvSpPr>
+          <p:nvPr>
+            <p:ph type="title"/>
+          </p:nvPr>
+        </p:nvSpPr>
+        <p:spPr/>
+        <p:txBody>
+          <a:bodyPr anchor="b"/>
+          <a:lstStyle/>
+          <a:p>
+            <a:r>
+              <a:rPr lang="en-US" smtClean="0"/>
+              <a:t>Click to edit Master title style</a:t>
+            </a:r>
+            <a:endParaRPr lang="en-US"/>
+          </a:p>
+        </p:txBody>
+      </p:sp>
+      <p:sp>
+        <p:nvSpPr>
+          <p:cNvPr id="6" name="Text Placeholder 5"/>
+          <p:cNvSpPr>
+            <a:spLocks noGrp="1"/>
+          </p:cNvSpPr>
+          <p:nvPr>
+            <p:ph type="body" sz="quarter" idx="10" hasCustomPrompt="1"/>
+          </p:nvPr>
+        </p:nvSpPr>
+        <p:spPr>
+          <a:xfrm>
+            <a:off x="6638425" y="5517221"/>
+            <a:ext cx="5013325" cy="1026863"/>
+          </a:xfrm>
+        </p:spPr>
+        <p:txBody>
+          <a:bodyPr/>
+          <a:lstStyle>
+            <a:lvl1pPr>
+              <a:defRPr>
+                <a:solidFill>
+                  <a:srgbClr val="BDCD2C"/>
+                </a:solidFill>
+              </a:defRPr>
+            </a:lvl1pPr>
+          </a:lstStyle>
+          <a:p>
+            <a:pPr lvl="0"/>
+            <a:r>
+              <a:rPr lang="en-US" dirty="0" smtClean="0"/>
+              <a:t>Presenter Name</a:t>
+            </a:r>
+          </a:p>
+          <a:p>
+            <a:pPr lvl="0"/>
+            <a:r>
+              <a:rPr lang="en-US" dirty="0" smtClean="0"/>
+              <a:t>Title/role</a:t>
+            </a:r>
+          </a:p>
+        </p:txBody>
+      </p:sp>
+    </p:spTree>
+    <p:extLst>
+      <p:ext uri="{BB962C8B-B14F-4D97-AF65-F5344CB8AC3E}">
+        <p14:creationId xmlns:p14="http://schemas.microsoft.com/office/powerpoint/2010/main" val="127618525"/>
+      </p:ext>
+    </p:extLst>
+  </p:cSld>
+  <p:clrMapOvr>
+    <a:masterClrMapping/>
+  </p:clrMapOvr>
+  <p:timing>
+    <p:tnLst>
+      <p:par>
+        <p:cTn id="1" dur="indefinite" restart="never" nodeType="tmRoot"/>
+      </p:par>
+    </p:tnLst>
+  </p:timing>
+</p:sldLayout>
+</file>
+
+<file path=ppt/slideLayouts/slideLayout40.xml><?xml version="1.0" encoding="utf-8"?>
 <p:sldLayout xmlns:a="http://schemas.openxmlformats.org/drawingml/2006/main" xmlns:r="http://schemas.openxmlformats.org/officeDocument/2006/relationships" xmlns:p="http://schemas.openxmlformats.org/presentationml/2006/main" type="title" preserve="1">
   <p:cSld name="Title Slide">
     <p:bg>
@@ -8512,118 +8740,7 @@
 </p:sldLayout>
 </file>
 
-<file path=ppt/slideLayouts/slideLayout4.xml><?xml version="1.0" encoding="utf-8"?>
-<p:sldLayout xmlns:a="http://schemas.openxmlformats.org/drawingml/2006/main" xmlns:r="http://schemas.openxmlformats.org/officeDocument/2006/relationships" xmlns:p="http://schemas.openxmlformats.org/presentationml/2006/main" preserve="1" userDrawn="1">
-  <p:cSld name="3_Custom Layout">
-    <p:bg>
-      <p:bgPr>
-        <a:solidFill>
-          <a:srgbClr val="617081"/>
-        </a:solidFill>
-        <a:effectLst/>
-      </p:bgPr>
-    </p:bg>
-    <p:spTree>
-      <p:nvGrpSpPr>
-        <p:cNvPr id="1" name=""/>
-        <p:cNvGrpSpPr/>
-        <p:nvPr/>
-      </p:nvGrpSpPr>
-      <p:grpSpPr>
-        <a:xfrm>
-          <a:off x="0" y="0"/>
-          <a:ext cx="0" cy="0"/>
-          <a:chOff x="0" y="0"/>
-          <a:chExt cx="0" cy="0"/>
-        </a:xfrm>
-      </p:grpSpPr>
-      <p:sp>
-        <p:nvSpPr>
-          <p:cNvPr id="4" name="Title 3"/>
-          <p:cNvSpPr>
-            <a:spLocks noGrp="1"/>
-          </p:cNvSpPr>
-          <p:nvPr>
-            <p:ph type="title"/>
-          </p:nvPr>
-        </p:nvSpPr>
-        <p:spPr/>
-        <p:txBody>
-          <a:bodyPr anchor="b"/>
-          <a:lstStyle/>
-          <a:p>
-            <a:r>
-              <a:rPr lang="en-US" smtClean="0"/>
-              <a:t>Click to edit Master title style</a:t>
-            </a:r>
-            <a:endParaRPr lang="en-US"/>
-          </a:p>
-        </p:txBody>
-      </p:sp>
-      <p:sp>
-        <p:nvSpPr>
-          <p:cNvPr id="6" name="Text Placeholder 5"/>
-          <p:cNvSpPr>
-            <a:spLocks noGrp="1"/>
-          </p:cNvSpPr>
-          <p:nvPr>
-            <p:ph type="body" sz="quarter" idx="10" hasCustomPrompt="1"/>
-          </p:nvPr>
-        </p:nvSpPr>
-        <p:spPr>
-          <a:xfrm>
-            <a:off x="6638425" y="5517221"/>
-            <a:ext cx="5013325" cy="1026863"/>
-          </a:xfrm>
-        </p:spPr>
-        <p:txBody>
-          <a:bodyPr/>
-          <a:lstStyle>
-            <a:lvl1pPr>
-              <a:defRPr>
-                <a:solidFill>
-                  <a:srgbClr val="BDCD2C"/>
-                </a:solidFill>
-              </a:defRPr>
-            </a:lvl1pPr>
-          </a:lstStyle>
-          <a:p>
-            <a:pPr lvl="0"/>
-            <a:r>
-              <a:rPr lang="en-US" dirty="0" smtClean="0"/>
-              <a:t>Presenter Name</a:t>
-            </a:r>
-          </a:p>
-          <a:p>
-            <a:pPr lvl="0"/>
-            <a:r>
-              <a:rPr lang="en-US" dirty="0" smtClean="0"/>
-              <a:t>Title/role</a:t>
-            </a:r>
-          </a:p>
-        </p:txBody>
-      </p:sp>
-    </p:spTree>
-    <p:extLst>
-      <p:ext uri="{BB962C8B-B14F-4D97-AF65-F5344CB8AC3E}">
-        <p14:creationId xmlns:p14="http://schemas.microsoft.com/office/powerpoint/2010/main" val="127618525"/>
-      </p:ext>
-    </p:extLst>
-  </p:cSld>
-  <p:clrMapOvr>
-    <a:masterClrMapping/>
-  </p:clrMapOvr>
-  <p:timing>
-    <p:tnLst>
-      <p:par>
-        <p:cTn id="1" dur="indefinite" restart="never" nodeType="tmRoot"/>
-      </p:par>
-    </p:tnLst>
-  </p:timing>
-</p:sldLayout>
-</file>
-
-<file path=ppt/slideLayouts/slideLayout40.xml><?xml version="1.0" encoding="utf-8"?>
+<file path=ppt/slideLayouts/slideLayout41.xml><?xml version="1.0" encoding="utf-8"?>
 <p:sldLayout xmlns:a="http://schemas.openxmlformats.org/drawingml/2006/main" xmlns:r="http://schemas.openxmlformats.org/officeDocument/2006/relationships" xmlns:p="http://schemas.openxmlformats.org/presentationml/2006/main" type="obj" preserve="1">
   <p:cSld name="Title and Content">
     <p:bg>
@@ -8774,7 +8891,7 @@
 </p:sldLayout>
 </file>
 
-<file path=ppt/slideLayouts/slideLayout41.xml><?xml version="1.0" encoding="utf-8"?>
+<file path=ppt/slideLayouts/slideLayout42.xml><?xml version="1.0" encoding="utf-8"?>
 <p:sldLayout xmlns:a="http://schemas.openxmlformats.org/drawingml/2006/main" xmlns:r="http://schemas.openxmlformats.org/officeDocument/2006/relationships" xmlns:p="http://schemas.openxmlformats.org/presentationml/2006/main" preserve="1" userDrawn="1">
   <p:cSld name="1_Title and Content">
     <p:spTree>
@@ -8962,7 +9079,7 @@
 </p:sldLayout>
 </file>
 
-<file path=ppt/slideLayouts/slideLayout42.xml><?xml version="1.0" encoding="utf-8"?>
+<file path=ppt/slideLayouts/slideLayout43.xml><?xml version="1.0" encoding="utf-8"?>
 <p:sldLayout xmlns:a="http://schemas.openxmlformats.org/drawingml/2006/main" xmlns:r="http://schemas.openxmlformats.org/officeDocument/2006/relationships" xmlns:p="http://schemas.openxmlformats.org/presentationml/2006/main" type="titleOnly" preserve="1">
   <p:cSld name="Title Only">
     <p:bg>
@@ -9061,7 +9178,7 @@
 </p:sldLayout>
 </file>
 
-<file path=ppt/slideLayouts/slideLayout43.xml><?xml version="1.0" encoding="utf-8"?>
+<file path=ppt/slideLayouts/slideLayout44.xml><?xml version="1.0" encoding="utf-8"?>
 <p:sldLayout xmlns:a="http://schemas.openxmlformats.org/drawingml/2006/main" xmlns:r="http://schemas.openxmlformats.org/officeDocument/2006/relationships" xmlns:p="http://schemas.openxmlformats.org/presentationml/2006/main" preserve="1" userDrawn="1">
   <p:cSld name="1_Title Only">
     <p:spTree>
@@ -10096,7 +10213,7 @@
 </p:sldLayout>
 </file>
 
-<file path=ppt/slideLayouts/slideLayout44.xml><?xml version="1.0" encoding="utf-8"?>
+<file path=ppt/slideLayouts/slideLayout45.xml><?xml version="1.0" encoding="utf-8"?>
 <p:sldLayout xmlns:a="http://schemas.openxmlformats.org/drawingml/2006/main" xmlns:r="http://schemas.openxmlformats.org/officeDocument/2006/relationships" xmlns:p="http://schemas.openxmlformats.org/presentationml/2006/main" type="blank" preserve="1">
   <p:cSld name="Blank">
     <p:bg>
@@ -10172,7 +10289,7 @@
 </p:sldLayout>
 </file>
 
-<file path=ppt/slideLayouts/slideLayout45.xml><?xml version="1.0" encoding="utf-8"?>
+<file path=ppt/slideLayouts/slideLayout46.xml><?xml version="1.0" encoding="utf-8"?>
 <p:sldLayout xmlns:a="http://schemas.openxmlformats.org/drawingml/2006/main" xmlns:r="http://schemas.openxmlformats.org/officeDocument/2006/relationships" xmlns:p="http://schemas.openxmlformats.org/presentationml/2006/main" type="blank" preserve="1">
   <p:cSld name="1_Blank">
     <p:bg>
@@ -10217,7 +10334,7 @@
 </p:sldLayout>
 </file>
 
-<file path=ppt/slideLayouts/slideLayout46.xml><?xml version="1.0" encoding="utf-8"?>
+<file path=ppt/slideLayouts/slideLayout47.xml><?xml version="1.0" encoding="utf-8"?>
 <p:sldLayout xmlns:a="http://schemas.openxmlformats.org/drawingml/2006/main" xmlns:r="http://schemas.openxmlformats.org/officeDocument/2006/relationships" xmlns:p="http://schemas.openxmlformats.org/presentationml/2006/main" type="objTx" preserve="1">
   <p:cSld name="Content with Caption">
     <p:bg>
@@ -10489,7 +10606,7 @@
 </p:sldLayout>
 </file>
 
-<file path=ppt/slideLayouts/slideLayout47.xml><?xml version="1.0" encoding="utf-8"?>
+<file path=ppt/slideLayouts/slideLayout48.xml><?xml version="1.0" encoding="utf-8"?>
 <p:sldLayout xmlns:a="http://schemas.openxmlformats.org/drawingml/2006/main" xmlns:r="http://schemas.openxmlformats.org/officeDocument/2006/relationships" xmlns:p="http://schemas.openxmlformats.org/presentationml/2006/main" type="title" preserve="1">
   <p:cSld name="Title Slide">
     <p:bg>
@@ -10633,7 +10750,7 @@
 </p:sldLayout>
 </file>
 
-<file path=ppt/slideLayouts/slideLayout48.xml><?xml version="1.0" encoding="utf-8"?>
+<file path=ppt/slideLayouts/slideLayout49.xml><?xml version="1.0" encoding="utf-8"?>
 <p:sldLayout xmlns:a="http://schemas.openxmlformats.org/drawingml/2006/main" xmlns:r="http://schemas.openxmlformats.org/officeDocument/2006/relationships" xmlns:p="http://schemas.openxmlformats.org/presentationml/2006/main" type="obj" preserve="1">
   <p:cSld name="Title and Content">
     <p:bg>
@@ -10768,194 +10885,6 @@
     <p:extLst>
       <p:ext uri="{BB962C8B-B14F-4D97-AF65-F5344CB8AC3E}">
         <p14:creationId xmlns:p14="http://schemas.microsoft.com/office/powerpoint/2010/main" val="3995736214"/>
-      </p:ext>
-    </p:extLst>
-  </p:cSld>
-  <p:clrMapOvr>
-    <a:masterClrMapping/>
-  </p:clrMapOvr>
-  <p:timing>
-    <p:tnLst>
-      <p:par>
-        <p:cTn id="1" dur="indefinite" restart="never" nodeType="tmRoot"/>
-      </p:par>
-    </p:tnLst>
-  </p:timing>
-</p:sldLayout>
-</file>
-
-<file path=ppt/slideLayouts/slideLayout49.xml><?xml version="1.0" encoding="utf-8"?>
-<p:sldLayout xmlns:a="http://schemas.openxmlformats.org/drawingml/2006/main" xmlns:r="http://schemas.openxmlformats.org/officeDocument/2006/relationships" xmlns:p="http://schemas.openxmlformats.org/presentationml/2006/main" preserve="1" userDrawn="1">
-  <p:cSld name="1_Title and Content">
-    <p:spTree>
-      <p:nvGrpSpPr>
-        <p:cNvPr id="1" name=""/>
-        <p:cNvGrpSpPr/>
-        <p:nvPr/>
-      </p:nvGrpSpPr>
-      <p:grpSpPr>
-        <a:xfrm>
-          <a:off x="0" y="0"/>
-          <a:ext cx="0" cy="0"/>
-          <a:chOff x="0" y="0"/>
-          <a:chExt cx="0" cy="0"/>
-        </a:xfrm>
-      </p:grpSpPr>
-      <p:sp>
-        <p:nvSpPr>
-          <p:cNvPr id="2" name="Title 1"/>
-          <p:cNvSpPr>
-            <a:spLocks noGrp="1"/>
-          </p:cNvSpPr>
-          <p:nvPr>
-            <p:ph type="title"/>
-          </p:nvPr>
-        </p:nvSpPr>
-        <p:spPr/>
-        <p:txBody>
-          <a:bodyPr/>
-          <a:lstStyle/>
-          <a:p>
-            <a:r>
-              <a:rPr lang="en-US" smtClean="0"/>
-              <a:t>Click to edit Master title style</a:t>
-            </a:r>
-            <a:endParaRPr lang="en-US"/>
-          </a:p>
-        </p:txBody>
-      </p:sp>
-      <p:sp>
-        <p:nvSpPr>
-          <p:cNvPr id="3" name="Content Placeholder 2"/>
-          <p:cNvSpPr>
-            <a:spLocks noGrp="1"/>
-          </p:cNvSpPr>
-          <p:nvPr>
-            <p:ph idx="1"/>
-          </p:nvPr>
-        </p:nvSpPr>
-        <p:spPr>
-          <a:xfrm>
-            <a:off x="560798" y="2111604"/>
-            <a:ext cx="11079822" cy="3980971"/>
-          </a:xfrm>
-        </p:spPr>
-        <p:txBody>
-          <a:bodyPr/>
-          <a:lstStyle/>
-          <a:p>
-            <a:pPr lvl="0"/>
-            <a:r>
-              <a:rPr lang="en-US" smtClean="0"/>
-              <a:t>Click to edit Master text styles</a:t>
-            </a:r>
-          </a:p>
-          <a:p>
-            <a:pPr lvl="1"/>
-            <a:r>
-              <a:rPr lang="en-US" smtClean="0"/>
-              <a:t>Second level</a:t>
-            </a:r>
-          </a:p>
-          <a:p>
-            <a:pPr lvl="2"/>
-            <a:r>
-              <a:rPr lang="en-US" smtClean="0"/>
-              <a:t>Third level</a:t>
-            </a:r>
-          </a:p>
-          <a:p>
-            <a:pPr lvl="3"/>
-            <a:r>
-              <a:rPr lang="en-US" smtClean="0"/>
-              <a:t>Fourth level</a:t>
-            </a:r>
-          </a:p>
-          <a:p>
-            <a:pPr lvl="4"/>
-            <a:r>
-              <a:rPr lang="en-US" smtClean="0"/>
-              <a:t>Fifth level</a:t>
-            </a:r>
-            <a:endParaRPr lang="en-US"/>
-          </a:p>
-        </p:txBody>
-      </p:sp>
-      <p:sp>
-        <p:nvSpPr>
-          <p:cNvPr id="6" name="Slide Number Placeholder 5"/>
-          <p:cNvSpPr>
-            <a:spLocks noGrp="1"/>
-          </p:cNvSpPr>
-          <p:nvPr>
-            <p:ph type="sldNum" sz="quarter" idx="12"/>
-          </p:nvPr>
-        </p:nvSpPr>
-        <p:spPr>
-          <a:xfrm>
-            <a:off x="8897420" y="6256216"/>
-            <a:ext cx="2743200" cy="365125"/>
-          </a:xfrm>
-          <a:prstGeom prst="rect">
-            <a:avLst/>
-          </a:prstGeom>
-        </p:spPr>
-        <p:txBody>
-          <a:bodyPr/>
-          <a:lstStyle/>
-          <a:p>
-            <a:fld id="{0A164282-434E-41D4-9582-783D542A7B68}" type="slidenum">
-              <a:rPr lang="en-US" smtClean="0"/>
-              <a:t>‹#›</a:t>
-            </a:fld>
-            <a:endParaRPr lang="en-US"/>
-          </a:p>
-        </p:txBody>
-      </p:sp>
-      <p:sp>
-        <p:nvSpPr>
-          <p:cNvPr id="5" name="Text Placeholder 4"/>
-          <p:cNvSpPr>
-            <a:spLocks noGrp="1"/>
-          </p:cNvSpPr>
-          <p:nvPr>
-            <p:ph type="body" sz="quarter" idx="13" hasCustomPrompt="1"/>
-          </p:nvPr>
-        </p:nvSpPr>
-        <p:spPr>
-          <a:xfrm>
-            <a:off x="560388" y="1534096"/>
-            <a:ext cx="11080750" cy="437594"/>
-          </a:xfrm>
-        </p:spPr>
-        <p:txBody>
-          <a:bodyPr>
-            <a:normAutofit/>
-          </a:bodyPr>
-          <a:lstStyle>
-            <a:lvl1pPr marL="0" indent="0">
-              <a:buFontTx/>
-              <a:buNone/>
-              <a:defRPr sz="2000" cap="all" baseline="0"/>
-            </a:lvl1pPr>
-            <a:lvl5pPr>
-              <a:defRPr/>
-            </a:lvl5pPr>
-          </a:lstStyle>
-          <a:p>
-            <a:pPr lvl="0"/>
-            <a:r>
-              <a:rPr lang="en-US" dirty="0" smtClean="0"/>
-              <a:t>Secondary refining headline</a:t>
-            </a:r>
-            <a:endParaRPr lang="en-US" dirty="0"/>
-          </a:p>
-        </p:txBody>
-      </p:sp>
-    </p:spTree>
-    <p:extLst>
-      <p:ext uri="{BB962C8B-B14F-4D97-AF65-F5344CB8AC3E}">
-        <p14:creationId xmlns:p14="http://schemas.microsoft.com/office/powerpoint/2010/main" val="3229571234"/>
       </p:ext>
     </p:extLst>
   </p:cSld>
@@ -11092,6 +11021,194 @@
 </file>
 
 <file path=ppt/slideLayouts/slideLayout50.xml><?xml version="1.0" encoding="utf-8"?>
+<p:sldLayout xmlns:a="http://schemas.openxmlformats.org/drawingml/2006/main" xmlns:r="http://schemas.openxmlformats.org/officeDocument/2006/relationships" xmlns:p="http://schemas.openxmlformats.org/presentationml/2006/main" preserve="1" userDrawn="1">
+  <p:cSld name="1_Title and Content">
+    <p:spTree>
+      <p:nvGrpSpPr>
+        <p:cNvPr id="1" name=""/>
+        <p:cNvGrpSpPr/>
+        <p:nvPr/>
+      </p:nvGrpSpPr>
+      <p:grpSpPr>
+        <a:xfrm>
+          <a:off x="0" y="0"/>
+          <a:ext cx="0" cy="0"/>
+          <a:chOff x="0" y="0"/>
+          <a:chExt cx="0" cy="0"/>
+        </a:xfrm>
+      </p:grpSpPr>
+      <p:sp>
+        <p:nvSpPr>
+          <p:cNvPr id="2" name="Title 1"/>
+          <p:cNvSpPr>
+            <a:spLocks noGrp="1"/>
+          </p:cNvSpPr>
+          <p:nvPr>
+            <p:ph type="title"/>
+          </p:nvPr>
+        </p:nvSpPr>
+        <p:spPr/>
+        <p:txBody>
+          <a:bodyPr/>
+          <a:lstStyle/>
+          <a:p>
+            <a:r>
+              <a:rPr lang="en-US" smtClean="0"/>
+              <a:t>Click to edit Master title style</a:t>
+            </a:r>
+            <a:endParaRPr lang="en-US"/>
+          </a:p>
+        </p:txBody>
+      </p:sp>
+      <p:sp>
+        <p:nvSpPr>
+          <p:cNvPr id="3" name="Content Placeholder 2"/>
+          <p:cNvSpPr>
+            <a:spLocks noGrp="1"/>
+          </p:cNvSpPr>
+          <p:nvPr>
+            <p:ph idx="1"/>
+          </p:nvPr>
+        </p:nvSpPr>
+        <p:spPr>
+          <a:xfrm>
+            <a:off x="560798" y="2111604"/>
+            <a:ext cx="11079822" cy="3980971"/>
+          </a:xfrm>
+        </p:spPr>
+        <p:txBody>
+          <a:bodyPr/>
+          <a:lstStyle/>
+          <a:p>
+            <a:pPr lvl="0"/>
+            <a:r>
+              <a:rPr lang="en-US" smtClean="0"/>
+              <a:t>Click to edit Master text styles</a:t>
+            </a:r>
+          </a:p>
+          <a:p>
+            <a:pPr lvl="1"/>
+            <a:r>
+              <a:rPr lang="en-US" smtClean="0"/>
+              <a:t>Second level</a:t>
+            </a:r>
+          </a:p>
+          <a:p>
+            <a:pPr lvl="2"/>
+            <a:r>
+              <a:rPr lang="en-US" smtClean="0"/>
+              <a:t>Third level</a:t>
+            </a:r>
+          </a:p>
+          <a:p>
+            <a:pPr lvl="3"/>
+            <a:r>
+              <a:rPr lang="en-US" smtClean="0"/>
+              <a:t>Fourth level</a:t>
+            </a:r>
+          </a:p>
+          <a:p>
+            <a:pPr lvl="4"/>
+            <a:r>
+              <a:rPr lang="en-US" smtClean="0"/>
+              <a:t>Fifth level</a:t>
+            </a:r>
+            <a:endParaRPr lang="en-US"/>
+          </a:p>
+        </p:txBody>
+      </p:sp>
+      <p:sp>
+        <p:nvSpPr>
+          <p:cNvPr id="6" name="Slide Number Placeholder 5"/>
+          <p:cNvSpPr>
+            <a:spLocks noGrp="1"/>
+          </p:cNvSpPr>
+          <p:nvPr>
+            <p:ph type="sldNum" sz="quarter" idx="12"/>
+          </p:nvPr>
+        </p:nvSpPr>
+        <p:spPr>
+          <a:xfrm>
+            <a:off x="8897420" y="6256216"/>
+            <a:ext cx="2743200" cy="365125"/>
+          </a:xfrm>
+          <a:prstGeom prst="rect">
+            <a:avLst/>
+          </a:prstGeom>
+        </p:spPr>
+        <p:txBody>
+          <a:bodyPr/>
+          <a:lstStyle/>
+          <a:p>
+            <a:fld id="{0A164282-434E-41D4-9582-783D542A7B68}" type="slidenum">
+              <a:rPr lang="en-US" smtClean="0"/>
+              <a:t>‹#›</a:t>
+            </a:fld>
+            <a:endParaRPr lang="en-US"/>
+          </a:p>
+        </p:txBody>
+      </p:sp>
+      <p:sp>
+        <p:nvSpPr>
+          <p:cNvPr id="5" name="Text Placeholder 4"/>
+          <p:cNvSpPr>
+            <a:spLocks noGrp="1"/>
+          </p:cNvSpPr>
+          <p:nvPr>
+            <p:ph type="body" sz="quarter" idx="13" hasCustomPrompt="1"/>
+          </p:nvPr>
+        </p:nvSpPr>
+        <p:spPr>
+          <a:xfrm>
+            <a:off x="560388" y="1534096"/>
+            <a:ext cx="11080750" cy="437594"/>
+          </a:xfrm>
+        </p:spPr>
+        <p:txBody>
+          <a:bodyPr>
+            <a:normAutofit/>
+          </a:bodyPr>
+          <a:lstStyle>
+            <a:lvl1pPr marL="0" indent="0">
+              <a:buFontTx/>
+              <a:buNone/>
+              <a:defRPr sz="2000" cap="all" baseline="0"/>
+            </a:lvl1pPr>
+            <a:lvl5pPr>
+              <a:defRPr/>
+            </a:lvl5pPr>
+          </a:lstStyle>
+          <a:p>
+            <a:pPr lvl="0"/>
+            <a:r>
+              <a:rPr lang="en-US" dirty="0" smtClean="0"/>
+              <a:t>Secondary refining headline</a:t>
+            </a:r>
+            <a:endParaRPr lang="en-US" dirty="0"/>
+          </a:p>
+        </p:txBody>
+      </p:sp>
+    </p:spTree>
+    <p:extLst>
+      <p:ext uri="{BB962C8B-B14F-4D97-AF65-F5344CB8AC3E}">
+        <p14:creationId xmlns:p14="http://schemas.microsoft.com/office/powerpoint/2010/main" val="3229571234"/>
+      </p:ext>
+    </p:extLst>
+  </p:cSld>
+  <p:clrMapOvr>
+    <a:masterClrMapping/>
+  </p:clrMapOvr>
+  <p:timing>
+    <p:tnLst>
+      <p:par>
+        <p:cTn id="1" dur="indefinite" restart="never" nodeType="tmRoot"/>
+      </p:par>
+    </p:tnLst>
+  </p:timing>
+</p:sldLayout>
+</file>
+
+<file path=ppt/slideLayouts/slideLayout51.xml><?xml version="1.0" encoding="utf-8"?>
 <p:sldLayout xmlns:a="http://schemas.openxmlformats.org/drawingml/2006/main" xmlns:r="http://schemas.openxmlformats.org/officeDocument/2006/relationships" xmlns:p="http://schemas.openxmlformats.org/presentationml/2006/main" type="titleOnly" preserve="1">
   <p:cSld name="Title Only">
     <p:bg>
@@ -11190,7 +11307,7 @@
 </p:sldLayout>
 </file>
 
-<file path=ppt/slideLayouts/slideLayout51.xml><?xml version="1.0" encoding="utf-8"?>
+<file path=ppt/slideLayouts/slideLayout52.xml><?xml version="1.0" encoding="utf-8"?>
 <p:sldLayout xmlns:a="http://schemas.openxmlformats.org/drawingml/2006/main" xmlns:r="http://schemas.openxmlformats.org/officeDocument/2006/relationships" xmlns:p="http://schemas.openxmlformats.org/presentationml/2006/main" type="blank" preserve="1">
   <p:cSld name="Blank">
     <p:bg>
@@ -11266,7 +11383,7 @@
 </p:sldLayout>
 </file>
 
-<file path=ppt/slideLayouts/slideLayout52.xml><?xml version="1.0" encoding="utf-8"?>
+<file path=ppt/slideLayouts/slideLayout53.xml><?xml version="1.0" encoding="utf-8"?>
 <p:sldLayout xmlns:a="http://schemas.openxmlformats.org/drawingml/2006/main" xmlns:r="http://schemas.openxmlformats.org/officeDocument/2006/relationships" xmlns:p="http://schemas.openxmlformats.org/presentationml/2006/main" type="blank" preserve="1">
   <p:cSld name="1_Blank">
     <p:bg>
@@ -11311,7 +11428,7 @@
 </p:sldLayout>
 </file>
 
-<file path=ppt/slideLayouts/slideLayout53.xml><?xml version="1.0" encoding="utf-8"?>
+<file path=ppt/slideLayouts/slideLayout54.xml><?xml version="1.0" encoding="utf-8"?>
 <p:sldLayout xmlns:a="http://schemas.openxmlformats.org/drawingml/2006/main" xmlns:r="http://schemas.openxmlformats.org/officeDocument/2006/relationships" xmlns:p="http://schemas.openxmlformats.org/presentationml/2006/main" type="objTx" preserve="1">
   <p:cSld name="Content with Caption">
     <p:bg>
@@ -11583,7 +11700,7 @@
 </p:sldLayout>
 </file>
 
-<file path=ppt/slideLayouts/slideLayout54.xml><?xml version="1.0" encoding="utf-8"?>
+<file path=ppt/slideLayouts/slideLayout55.xml><?xml version="1.0" encoding="utf-8"?>
 <p:sldLayout xmlns:a="http://schemas.openxmlformats.org/drawingml/2006/main" xmlns:r="http://schemas.openxmlformats.org/officeDocument/2006/relationships" xmlns:p="http://schemas.openxmlformats.org/presentationml/2006/main" type="title" preserve="1">
   <p:cSld name="Title Slide">
     <p:bg>
@@ -11727,7 +11844,7 @@
 </p:sldLayout>
 </file>
 
-<file path=ppt/slideLayouts/slideLayout55.xml><?xml version="1.0" encoding="utf-8"?>
+<file path=ppt/slideLayouts/slideLayout56.xml><?xml version="1.0" encoding="utf-8"?>
 <p:sldLayout xmlns:a="http://schemas.openxmlformats.org/drawingml/2006/main" xmlns:r="http://schemas.openxmlformats.org/officeDocument/2006/relationships" xmlns:p="http://schemas.openxmlformats.org/presentationml/2006/main" type="obj" preserve="1">
   <p:cSld name="Title and Content">
     <p:bg>
@@ -11879,7 +11996,7 @@
 </p:sldLayout>
 </file>
 
-<file path=ppt/slideLayouts/slideLayout56.xml><?xml version="1.0" encoding="utf-8"?>
+<file path=ppt/slideLayouts/slideLayout57.xml><?xml version="1.0" encoding="utf-8"?>
 <p:sldLayout xmlns:a="http://schemas.openxmlformats.org/drawingml/2006/main" xmlns:r="http://schemas.openxmlformats.org/officeDocument/2006/relationships" xmlns:p="http://schemas.openxmlformats.org/presentationml/2006/main" preserve="1" userDrawn="1">
   <p:cSld name="1_Title and Content">
     <p:spTree>
@@ -12068,7 +12185,7 @@
 </p:sldLayout>
 </file>
 
-<file path=ppt/slideLayouts/slideLayout57.xml><?xml version="1.0" encoding="utf-8"?>
+<file path=ppt/slideLayouts/slideLayout58.xml><?xml version="1.0" encoding="utf-8"?>
 <p:sldLayout xmlns:a="http://schemas.openxmlformats.org/drawingml/2006/main" xmlns:r="http://schemas.openxmlformats.org/officeDocument/2006/relationships" xmlns:p="http://schemas.openxmlformats.org/presentationml/2006/main" type="titleOnly" preserve="1">
   <p:cSld name="Title Only">
     <p:bg>
@@ -12168,7 +12285,7 @@
 </p:sldLayout>
 </file>
 
-<file path=ppt/slideLayouts/slideLayout58.xml><?xml version="1.0" encoding="utf-8"?>
+<file path=ppt/slideLayouts/slideLayout59.xml><?xml version="1.0" encoding="utf-8"?>
 <p:sldLayout xmlns:a="http://schemas.openxmlformats.org/drawingml/2006/main" xmlns:r="http://schemas.openxmlformats.org/officeDocument/2006/relationships" xmlns:p="http://schemas.openxmlformats.org/presentationml/2006/main" preserve="1" userDrawn="1">
   <p:cSld name="1_Title Only">
     <p:spTree>
@@ -13198,83 +13315,6 @@
 </p:sldLayout>
 </file>
 
-<file path=ppt/slideLayouts/slideLayout59.xml><?xml version="1.0" encoding="utf-8"?>
-<p:sldLayout xmlns:a="http://schemas.openxmlformats.org/drawingml/2006/main" xmlns:r="http://schemas.openxmlformats.org/officeDocument/2006/relationships" xmlns:p="http://schemas.openxmlformats.org/presentationml/2006/main" type="blank" preserve="1">
-  <p:cSld name="Blank">
-    <p:bg>
-      <p:bgPr>
-        <a:solidFill>
-          <a:srgbClr val="3C454F"/>
-        </a:solidFill>
-        <a:effectLst/>
-      </p:bgPr>
-    </p:bg>
-    <p:spTree>
-      <p:nvGrpSpPr>
-        <p:cNvPr id="1" name=""/>
-        <p:cNvGrpSpPr/>
-        <p:nvPr/>
-      </p:nvGrpSpPr>
-      <p:grpSpPr>
-        <a:xfrm>
-          <a:off x="0" y="0"/>
-          <a:ext cx="0" cy="0"/>
-          <a:chOff x="0" y="0"/>
-          <a:chExt cx="0" cy="0"/>
-        </a:xfrm>
-      </p:grpSpPr>
-      <p:sp>
-        <p:nvSpPr>
-          <p:cNvPr id="4" name="Slide Number Placeholder 3"/>
-          <p:cNvSpPr>
-            <a:spLocks noGrp="1"/>
-          </p:cNvSpPr>
-          <p:nvPr>
-            <p:ph type="sldNum" sz="quarter" idx="12"/>
-          </p:nvPr>
-        </p:nvSpPr>
-        <p:spPr>
-          <a:xfrm>
-            <a:off x="8903414" y="6256216"/>
-            <a:ext cx="2743200" cy="365125"/>
-          </a:xfrm>
-          <a:prstGeom prst="rect">
-            <a:avLst/>
-          </a:prstGeom>
-        </p:spPr>
-        <p:txBody>
-          <a:bodyPr/>
-          <a:lstStyle/>
-          <a:p>
-            <a:fld id="{0A164282-434E-41D4-9582-783D542A7B68}" type="slidenum">
-              <a:rPr/>
-              <a:pPr/>
-              <a:t>‹#›</a:t>
-            </a:fld>
-            <a:endParaRPr/>
-          </a:p>
-        </p:txBody>
-      </p:sp>
-    </p:spTree>
-    <p:extLst>
-      <p:ext uri="{BB962C8B-B14F-4D97-AF65-F5344CB8AC3E}">
-        <p14:creationId xmlns:p14="http://schemas.microsoft.com/office/powerpoint/2010/main" val="993952241"/>
-      </p:ext>
-    </p:extLst>
-  </p:cSld>
-  <p:clrMapOvr>
-    <a:masterClrMapping/>
-  </p:clrMapOvr>
-  <p:timing>
-    <p:tnLst>
-      <p:par>
-        <p:cTn id="1" dur="indefinite" restart="never" nodeType="tmRoot"/>
-      </p:par>
-    </p:tnLst>
-  </p:timing>
-</p:sldLayout>
-</file>
-
 <file path=ppt/slideLayouts/slideLayout6.xml><?xml version="1.0" encoding="utf-8"?>
 <p:sldLayout xmlns:a="http://schemas.openxmlformats.org/drawingml/2006/main" xmlns:r="http://schemas.openxmlformats.org/officeDocument/2006/relationships" xmlns:p="http://schemas.openxmlformats.org/presentationml/2006/main" type="title" preserve="1">
   <p:cSld name="Title Slide">
@@ -13412,6 +13452,83 @@
 </file>
 
 <file path=ppt/slideLayouts/slideLayout60.xml><?xml version="1.0" encoding="utf-8"?>
+<p:sldLayout xmlns:a="http://schemas.openxmlformats.org/drawingml/2006/main" xmlns:r="http://schemas.openxmlformats.org/officeDocument/2006/relationships" xmlns:p="http://schemas.openxmlformats.org/presentationml/2006/main" type="blank" preserve="1">
+  <p:cSld name="Blank">
+    <p:bg>
+      <p:bgPr>
+        <a:solidFill>
+          <a:srgbClr val="3C454F"/>
+        </a:solidFill>
+        <a:effectLst/>
+      </p:bgPr>
+    </p:bg>
+    <p:spTree>
+      <p:nvGrpSpPr>
+        <p:cNvPr id="1" name=""/>
+        <p:cNvGrpSpPr/>
+        <p:nvPr/>
+      </p:nvGrpSpPr>
+      <p:grpSpPr>
+        <a:xfrm>
+          <a:off x="0" y="0"/>
+          <a:ext cx="0" cy="0"/>
+          <a:chOff x="0" y="0"/>
+          <a:chExt cx="0" cy="0"/>
+        </a:xfrm>
+      </p:grpSpPr>
+      <p:sp>
+        <p:nvSpPr>
+          <p:cNvPr id="4" name="Slide Number Placeholder 3"/>
+          <p:cNvSpPr>
+            <a:spLocks noGrp="1"/>
+          </p:cNvSpPr>
+          <p:nvPr>
+            <p:ph type="sldNum" sz="quarter" idx="12"/>
+          </p:nvPr>
+        </p:nvSpPr>
+        <p:spPr>
+          <a:xfrm>
+            <a:off x="8903414" y="6256216"/>
+            <a:ext cx="2743200" cy="365125"/>
+          </a:xfrm>
+          <a:prstGeom prst="rect">
+            <a:avLst/>
+          </a:prstGeom>
+        </p:spPr>
+        <p:txBody>
+          <a:bodyPr/>
+          <a:lstStyle/>
+          <a:p>
+            <a:fld id="{0A164282-434E-41D4-9582-783D542A7B68}" type="slidenum">
+              <a:rPr/>
+              <a:pPr/>
+              <a:t>‹#›</a:t>
+            </a:fld>
+            <a:endParaRPr/>
+          </a:p>
+        </p:txBody>
+      </p:sp>
+    </p:spTree>
+    <p:extLst>
+      <p:ext uri="{BB962C8B-B14F-4D97-AF65-F5344CB8AC3E}">
+        <p14:creationId xmlns:p14="http://schemas.microsoft.com/office/powerpoint/2010/main" val="993952241"/>
+      </p:ext>
+    </p:extLst>
+  </p:cSld>
+  <p:clrMapOvr>
+    <a:masterClrMapping/>
+  </p:clrMapOvr>
+  <p:timing>
+    <p:tnLst>
+      <p:par>
+        <p:cTn id="1" dur="indefinite" restart="never" nodeType="tmRoot"/>
+      </p:par>
+    </p:tnLst>
+  </p:timing>
+</p:sldLayout>
+</file>
+
+<file path=ppt/slideLayouts/slideLayout61.xml><?xml version="1.0" encoding="utf-8"?>
 <p:sldLayout xmlns:a="http://schemas.openxmlformats.org/drawingml/2006/main" xmlns:r="http://schemas.openxmlformats.org/officeDocument/2006/relationships" xmlns:p="http://schemas.openxmlformats.org/presentationml/2006/main" type="blank" preserve="1">
   <p:cSld name="1_Blank">
     <p:bg>
@@ -13456,7 +13573,7 @@
 </p:sldLayout>
 </file>
 
-<file path=ppt/slideLayouts/slideLayout61.xml><?xml version="1.0" encoding="utf-8"?>
+<file path=ppt/slideLayouts/slideLayout62.xml><?xml version="1.0" encoding="utf-8"?>
 <p:sldLayout xmlns:a="http://schemas.openxmlformats.org/drawingml/2006/main" xmlns:r="http://schemas.openxmlformats.org/officeDocument/2006/relationships" xmlns:p="http://schemas.openxmlformats.org/presentationml/2006/main" type="objTx" preserve="1">
   <p:cSld name="Content with Caption">
     <p:bg>
@@ -13729,7 +13846,7 @@
 </p:sldLayout>
 </file>
 
-<file path=ppt/slideLayouts/slideLayout62.xml><?xml version="1.0" encoding="utf-8"?>
+<file path=ppt/slideLayouts/slideLayout63.xml><?xml version="1.0" encoding="utf-8"?>
 <p:sldLayout xmlns:a="http://schemas.openxmlformats.org/drawingml/2006/main" xmlns:r="http://schemas.openxmlformats.org/officeDocument/2006/relationships" xmlns:p="http://schemas.openxmlformats.org/presentationml/2006/main" userDrawn="1">
   <p:cSld name="1_Logo on Background">
     <p:bg>
@@ -13893,7 +14010,7 @@
 </p:sldLayout>
 </file>
 
-<file path=ppt/slideLayouts/slideLayout63.xml><?xml version="1.0" encoding="utf-8"?>
+<file path=ppt/slideLayouts/slideLayout64.xml><?xml version="1.0" encoding="utf-8"?>
 <p:sldLayout xmlns:a="http://schemas.openxmlformats.org/drawingml/2006/main" xmlns:r="http://schemas.openxmlformats.org/officeDocument/2006/relationships" xmlns:p="http://schemas.openxmlformats.org/presentationml/2006/main" userDrawn="1">
   <p:cSld name="3_Custom Layout">
     <p:bg>
@@ -14959,7 +15076,7 @@
           <p:nvPr userDrawn="1"/>
         </p:nvPicPr>
         <p:blipFill>
-          <a:blip r:embed="rId11"/>
+          <a:blip r:embed="rId12"/>
           <a:stretch>
             <a:fillRect/>
           </a:stretch>
@@ -15355,6 +15472,7 @@
     <p:sldLayoutId id="2147483726" r:id="rId7"/>
     <p:sldLayoutId id="2147483722" r:id="rId8"/>
     <p:sldLayoutId id="2147483772" r:id="rId9"/>
+    <p:sldLayoutId id="2147483795" r:id="rId10"/>
   </p:sldLayoutIdLst>
   <p:timing>
     <p:tnLst>
@@ -21949,28 +22067,39 @@
           <a:lstStyle/>
           <a:p>
             <a:pPr marL="0" indent="0">
+              <a:lnSpc>
+                <a:spcPct val="150000"/>
+              </a:lnSpc>
               <a:buNone/>
             </a:pPr>
             <a:r>
               <a:rPr lang="en-US" dirty="0" smtClean="0"/>
-              <a:t>You’re not done when your site goes to production.</a:t>
+              <a:t>Your site isn’t done when you deploy to production.</a:t>
             </a:r>
           </a:p>
           <a:p>
             <a:pPr marL="0" indent="0">
+              <a:lnSpc>
+                <a:spcPct val="150000"/>
+              </a:lnSpc>
               <a:buNone/>
             </a:pPr>
-            <a:endParaRPr lang="en-US" dirty="0"/>
+            <a:r>
+              <a:rPr lang="en-US" dirty="0" smtClean="0"/>
+              <a:t>You need to add new features.</a:t>
+            </a:r>
           </a:p>
           <a:p>
             <a:pPr marL="0" indent="0">
+              <a:lnSpc>
+                <a:spcPct val="150000"/>
+              </a:lnSpc>
               <a:buNone/>
             </a:pPr>
             <a:r>
               <a:rPr lang="en-US" dirty="0" smtClean="0"/>
-              <a:t>You’re just getting started.</a:t>
-            </a:r>
-            <a:endParaRPr lang="en-US" dirty="0"/>
+              <a:t>Change adds risk.</a:t>
+            </a:r>
           </a:p>
         </p:txBody>
       </p:sp>
@@ -21991,23 +22120,256 @@
           <a:p>
             <a:fld id="{0A164282-434E-41D4-9582-783D542A7B68}" type="slidenum">
               <a:rPr lang="en-US" smtClean="0"/>
-              <a:pPr/>
               <a:t>19</a:t>
             </a:fld>
             <a:endParaRPr lang="en-US"/>
           </a:p>
         </p:txBody>
       </p:sp>
+      <p:pic>
+        <p:nvPicPr>
+          <p:cNvPr id="5" name="Picture 4"/>
+          <p:cNvPicPr>
+            <a:picLocks noChangeAspect="1"/>
+          </p:cNvPicPr>
+          <p:nvPr/>
+        </p:nvPicPr>
+        <p:blipFill>
+          <a:blip r:embed="rId2">
+            <a:extLst>
+              <a:ext uri="{28A0092B-C50C-407E-A947-70E740481C1C}">
+                <a14:useLocalDpi xmlns:a14="http://schemas.microsoft.com/office/drawing/2010/main" val="0"/>
+              </a:ext>
+            </a:extLst>
+          </a:blip>
+          <a:stretch>
+            <a:fillRect/>
+          </a:stretch>
+        </p:blipFill>
+        <p:spPr>
+          <a:xfrm>
+            <a:off x="7678220" y="3789112"/>
+            <a:ext cx="2438400" cy="2438400"/>
+          </a:xfrm>
+          <a:prstGeom prst="rect">
+            <a:avLst/>
+          </a:prstGeom>
+        </p:spPr>
+      </p:pic>
     </p:spTree>
     <p:extLst>
       <p:ext uri="{BB962C8B-B14F-4D97-AF65-F5344CB8AC3E}">
-        <p14:creationId xmlns:p14="http://schemas.microsoft.com/office/powerpoint/2010/main" val="3218986713"/>
+        <p14:creationId xmlns:p14="http://schemas.microsoft.com/office/powerpoint/2010/main" val="1804452690"/>
       </p:ext>
     </p:extLst>
   </p:cSld>
   <p:clrMapOvr>
     <a:masterClrMapping/>
   </p:clrMapOvr>
+  <p:timing>
+    <p:tnLst>
+      <p:par>
+        <p:cTn id="1" dur="indefinite" restart="never" nodeType="tmRoot">
+          <p:childTnLst>
+            <p:seq concurrent="1" nextAc="seek">
+              <p:cTn id="2" dur="indefinite" nodeType="mainSeq">
+                <p:childTnLst>
+                  <p:par>
+                    <p:cTn id="3" fill="hold">
+                      <p:stCondLst>
+                        <p:cond delay="indefinite"/>
+                      </p:stCondLst>
+                      <p:childTnLst>
+                        <p:par>
+                          <p:cTn id="4" fill="hold">
+                            <p:stCondLst>
+                              <p:cond delay="0"/>
+                            </p:stCondLst>
+                            <p:childTnLst>
+                              <p:par>
+                                <p:cTn id="5" presetID="1" presetClass="entr" presetSubtype="0" fill="hold" nodeType="clickEffect">
+                                  <p:stCondLst>
+                                    <p:cond delay="0"/>
+                                  </p:stCondLst>
+                                  <p:childTnLst>
+                                    <p:set>
+                                      <p:cBhvr>
+                                        <p:cTn id="6" dur="1" fill="hold">
+                                          <p:stCondLst>
+                                            <p:cond delay="0"/>
+                                          </p:stCondLst>
+                                        </p:cTn>
+                                        <p:tgtEl>
+                                          <p:spTgt spid="3">
+                                            <p:txEl>
+                                              <p:pRg st="0" end="0"/>
+                                            </p:txEl>
+                                          </p:spTgt>
+                                        </p:tgtEl>
+                                        <p:attrNameLst>
+                                          <p:attrName>style.visibility</p:attrName>
+                                        </p:attrNameLst>
+                                      </p:cBhvr>
+                                      <p:to>
+                                        <p:strVal val="visible"/>
+                                      </p:to>
+                                    </p:set>
+                                  </p:childTnLst>
+                                </p:cTn>
+                              </p:par>
+                            </p:childTnLst>
+                          </p:cTn>
+                        </p:par>
+                      </p:childTnLst>
+                    </p:cTn>
+                  </p:par>
+                  <p:par>
+                    <p:cTn id="7" fill="hold">
+                      <p:stCondLst>
+                        <p:cond delay="indefinite"/>
+                      </p:stCondLst>
+                      <p:childTnLst>
+                        <p:par>
+                          <p:cTn id="8" fill="hold">
+                            <p:stCondLst>
+                              <p:cond delay="0"/>
+                            </p:stCondLst>
+                            <p:childTnLst>
+                              <p:par>
+                                <p:cTn id="9" presetID="1" presetClass="entr" presetSubtype="0" fill="hold" nodeType="clickEffect">
+                                  <p:stCondLst>
+                                    <p:cond delay="0"/>
+                                  </p:stCondLst>
+                                  <p:childTnLst>
+                                    <p:set>
+                                      <p:cBhvr>
+                                        <p:cTn id="10" dur="1" fill="hold">
+                                          <p:stCondLst>
+                                            <p:cond delay="0"/>
+                                          </p:stCondLst>
+                                        </p:cTn>
+                                        <p:tgtEl>
+                                          <p:spTgt spid="3">
+                                            <p:txEl>
+                                              <p:pRg st="1" end="1"/>
+                                            </p:txEl>
+                                          </p:spTgt>
+                                        </p:tgtEl>
+                                        <p:attrNameLst>
+                                          <p:attrName>style.visibility</p:attrName>
+                                        </p:attrNameLst>
+                                      </p:cBhvr>
+                                      <p:to>
+                                        <p:strVal val="visible"/>
+                                      </p:to>
+                                    </p:set>
+                                  </p:childTnLst>
+                                </p:cTn>
+                              </p:par>
+                            </p:childTnLst>
+                          </p:cTn>
+                        </p:par>
+                      </p:childTnLst>
+                    </p:cTn>
+                  </p:par>
+                  <p:par>
+                    <p:cTn id="11" fill="hold">
+                      <p:stCondLst>
+                        <p:cond delay="indefinite"/>
+                      </p:stCondLst>
+                      <p:childTnLst>
+                        <p:par>
+                          <p:cTn id="12" fill="hold">
+                            <p:stCondLst>
+                              <p:cond delay="0"/>
+                            </p:stCondLst>
+                            <p:childTnLst>
+                              <p:par>
+                                <p:cTn id="13" presetID="1" presetClass="entr" presetSubtype="0" fill="hold" nodeType="clickEffect">
+                                  <p:stCondLst>
+                                    <p:cond delay="0"/>
+                                  </p:stCondLst>
+                                  <p:childTnLst>
+                                    <p:set>
+                                      <p:cBhvr>
+                                        <p:cTn id="14" dur="1" fill="hold">
+                                          <p:stCondLst>
+                                            <p:cond delay="0"/>
+                                          </p:stCondLst>
+                                        </p:cTn>
+                                        <p:tgtEl>
+                                          <p:spTgt spid="3">
+                                            <p:txEl>
+                                              <p:pRg st="2" end="2"/>
+                                            </p:txEl>
+                                          </p:spTgt>
+                                        </p:tgtEl>
+                                        <p:attrNameLst>
+                                          <p:attrName>style.visibility</p:attrName>
+                                        </p:attrNameLst>
+                                      </p:cBhvr>
+                                      <p:to>
+                                        <p:strVal val="visible"/>
+                                      </p:to>
+                                    </p:set>
+                                  </p:childTnLst>
+                                </p:cTn>
+                              </p:par>
+                              <p:par>
+                                <p:cTn id="15" presetID="1" presetClass="entr" presetSubtype="0" fill="hold" nodeType="withEffect">
+                                  <p:stCondLst>
+                                    <p:cond delay="0"/>
+                                  </p:stCondLst>
+                                  <p:childTnLst>
+                                    <p:set>
+                                      <p:cBhvr>
+                                        <p:cTn id="16" dur="1" fill="hold">
+                                          <p:stCondLst>
+                                            <p:cond delay="0"/>
+                                          </p:stCondLst>
+                                        </p:cTn>
+                                        <p:tgtEl>
+                                          <p:spTgt spid="5"/>
+                                        </p:tgtEl>
+                                        <p:attrNameLst>
+                                          <p:attrName>style.visibility</p:attrName>
+                                        </p:attrNameLst>
+                                      </p:cBhvr>
+                                      <p:to>
+                                        <p:strVal val="visible"/>
+                                      </p:to>
+                                    </p:set>
+                                  </p:childTnLst>
+                                </p:cTn>
+                              </p:par>
+                            </p:childTnLst>
+                          </p:cTn>
+                        </p:par>
+                      </p:childTnLst>
+                    </p:cTn>
+                  </p:par>
+                </p:childTnLst>
+              </p:cTn>
+              <p:prevCondLst>
+                <p:cond evt="onPrev" delay="0">
+                  <p:tgtEl>
+                    <p:sldTgt/>
+                  </p:tgtEl>
+                </p:cond>
+              </p:prevCondLst>
+              <p:nextCondLst>
+                <p:cond evt="onNext" delay="0">
+                  <p:tgtEl>
+                    <p:sldTgt/>
+                  </p:tgtEl>
+                </p:cond>
+              </p:nextCondLst>
+            </p:seq>
+          </p:childTnLst>
+        </p:cTn>
+      </p:par>
+    </p:tnLst>
+  </p:timing>
 </p:sld>
 </file>
 
@@ -22178,11 +22540,7 @@
           <a:p>
             <a:r>
               <a:rPr lang="en-US" dirty="0" smtClean="0"/>
-              <a:t>Step 1: </a:t>
-            </a:r>
-            <a:r>
-              <a:rPr lang="en-US" dirty="0" smtClean="0"/>
-              <a:t>Manage database schema</a:t>
+              <a:t>Step 1: Manage database schema</a:t>
             </a:r>
             <a:endParaRPr lang="en-US" dirty="0"/>
           </a:p>
@@ -22304,11 +22662,7 @@
           <a:p>
             <a:r>
               <a:rPr lang="en-US" dirty="0" smtClean="0"/>
-              <a:t>Step 1: </a:t>
-            </a:r>
-            <a:r>
-              <a:rPr lang="en-US" dirty="0" smtClean="0"/>
-              <a:t>Manage database schema</a:t>
+              <a:t>Step 1: Manage database schema</a:t>
             </a:r>
             <a:endParaRPr lang="en-US" dirty="0"/>
           </a:p>
@@ -22472,11 +22826,7 @@
           <a:p>
             <a:r>
               <a:rPr lang="en-US" dirty="0" smtClean="0"/>
-              <a:t>Scenario: </a:t>
-            </a:r>
-            <a:r>
-              <a:rPr lang="en-US" dirty="0" smtClean="0"/>
-              <a:t>Data migrations</a:t>
+              <a:t>Scenario: Data migrations</a:t>
             </a:r>
             <a:endParaRPr lang="en-US" dirty="0"/>
           </a:p>
@@ -22531,11 +22881,7 @@
           <a:p>
             <a:r>
               <a:rPr lang="en-US" dirty="0" smtClean="0"/>
-              <a:t>Step </a:t>
-            </a:r>
-            <a:r>
-              <a:rPr lang="en-US" dirty="0" smtClean="0"/>
-              <a:t>2: Manage deployments</a:t>
+              <a:t>Step 2: Manage deployments</a:t>
             </a:r>
             <a:endParaRPr lang="en-US" dirty="0"/>
           </a:p>
@@ -22666,11 +23012,7 @@
           <a:p>
             <a:r>
               <a:rPr lang="en-US" dirty="0" smtClean="0"/>
-              <a:t>Step </a:t>
-            </a:r>
-            <a:r>
-              <a:rPr lang="en-US" dirty="0" smtClean="0"/>
-              <a:t>2: Manage deployments </a:t>
+              <a:t>Step 2: Manage deployments </a:t>
             </a:r>
             <a:endParaRPr lang="en-US" dirty="0"/>
           </a:p>
@@ -22918,11 +23260,7 @@
           <a:p>
             <a:r>
               <a:rPr lang="en-US" dirty="0" smtClean="0"/>
-              <a:t>Scenario: </a:t>
-            </a:r>
-            <a:r>
-              <a:rPr lang="en-US" dirty="0" smtClean="0"/>
-              <a:t>Deployment rollback</a:t>
+              <a:t>Scenario: Deployment rollback</a:t>
             </a:r>
             <a:endParaRPr lang="en-US" dirty="0"/>
           </a:p>
@@ -22977,11 +23315,7 @@
           <a:p>
             <a:r>
               <a:rPr lang="en-US" dirty="0" smtClean="0"/>
-              <a:t>Step </a:t>
-            </a:r>
-            <a:r>
-              <a:rPr lang="en-US" dirty="0" smtClean="0"/>
-              <a:t>3: Leverage services</a:t>
+              <a:t>Step 3: Leverage services</a:t>
             </a:r>
             <a:endParaRPr lang="en-US" dirty="0"/>
           </a:p>
@@ -23104,11 +23438,7 @@
           <a:p>
             <a:r>
               <a:rPr lang="en-US" dirty="0" smtClean="0"/>
-              <a:t>Step </a:t>
-            </a:r>
-            <a:r>
-              <a:rPr lang="en-US" dirty="0" smtClean="0"/>
-              <a:t>3: Leverage services</a:t>
+              <a:t>Step 3: Leverage services</a:t>
             </a:r>
             <a:endParaRPr lang="en-US" dirty="0"/>
           </a:p>
@@ -23273,11 +23603,7 @@
           <a:p>
             <a:r>
               <a:rPr lang="en-US" dirty="0" smtClean="0"/>
-              <a:t>Scenario: </a:t>
-            </a:r>
-            <a:r>
-              <a:rPr lang="en-US" dirty="0" smtClean="0"/>
-              <a:t>Windows Azure Active Directory</a:t>
+              <a:t>Scenario: Windows Azure Active Directory</a:t>
             </a:r>
             <a:endParaRPr lang="en-US" dirty="0"/>
           </a:p>
@@ -23380,18 +23706,28 @@
             <p:ph type="title"/>
           </p:nvPr>
         </p:nvSpPr>
-        <p:spPr/>
-        <p:txBody>
-          <a:bodyPr/>
+        <p:spPr>
+          <a:xfrm>
+            <a:off x="158620" y="3750907"/>
+            <a:ext cx="11493130" cy="1340528"/>
+          </a:xfrm>
+        </p:spPr>
+        <p:txBody>
+          <a:bodyPr>
+            <a:normAutofit fontScale="90000"/>
+          </a:bodyPr>
           <a:lstStyle/>
           <a:p>
             <a:r>
               <a:rPr lang="en-US" dirty="0" smtClean="0"/>
               <a:t>Scenario: </a:t>
             </a:r>
-            <a:r>
+            <a:br>
               <a:rPr lang="en-US" dirty="0" smtClean="0"/>
-              <a:t>Environments</a:t>
+            </a:br>
+            <a:r>
+              <a:rPr lang="en-US" dirty="0" smtClean="0"/>
+              <a:t>Multiple Environments</a:t>
             </a:r>
             <a:endParaRPr lang="en-US" dirty="0"/>
           </a:p>
@@ -23399,7 +23735,7 @@
       </p:sp>
       <p:sp>
         <p:nvSpPr>
-          <p:cNvPr id="4" name="Text Placeholder 3"/>
+          <p:cNvPr id="3" name="Text Placeholder 2"/>
           <p:cNvSpPr>
             <a:spLocks noGrp="1"/>
           </p:cNvSpPr>
@@ -23419,7 +23755,7 @@
     </p:spTree>
     <p:extLst>
       <p:ext uri="{BB962C8B-B14F-4D97-AF65-F5344CB8AC3E}">
-        <p14:creationId xmlns:p14="http://schemas.microsoft.com/office/powerpoint/2010/main" val="1565729414"/>
+        <p14:creationId xmlns:p14="http://schemas.microsoft.com/office/powerpoint/2010/main" val="394802596"/>
       </p:ext>
     </p:extLst>
   </p:cSld>
@@ -23448,6 +23784,746 @@
       </p:grpSpPr>
       <p:sp>
         <p:nvSpPr>
+          <p:cNvPr id="2" name="Title 1"/>
+          <p:cNvSpPr>
+            <a:spLocks noGrp="1"/>
+          </p:cNvSpPr>
+          <p:nvPr>
+            <p:ph type="title"/>
+          </p:nvPr>
+        </p:nvSpPr>
+        <p:spPr/>
+        <p:txBody>
+          <a:bodyPr/>
+          <a:lstStyle/>
+          <a:p>
+            <a:r>
+              <a:rPr lang="en-US" dirty="0" smtClean="0"/>
+              <a:t>Scenario description</a:t>
+            </a:r>
+            <a:endParaRPr lang="en-US" dirty="0"/>
+          </a:p>
+        </p:txBody>
+      </p:sp>
+      <p:sp>
+        <p:nvSpPr>
+          <p:cNvPr id="3" name="Content Placeholder 2"/>
+          <p:cNvSpPr>
+            <a:spLocks noGrp="1"/>
+          </p:cNvSpPr>
+          <p:nvPr>
+            <p:ph idx="1"/>
+          </p:nvPr>
+        </p:nvSpPr>
+        <p:spPr/>
+        <p:txBody>
+          <a:bodyPr/>
+          <a:lstStyle/>
+          <a:p>
+            <a:pPr marL="0" indent="0">
+              <a:buNone/>
+            </a:pPr>
+            <a:r>
+              <a:rPr lang="en-US" dirty="0" smtClean="0"/>
+              <a:t>Running a real site requires several environments.</a:t>
+            </a:r>
+          </a:p>
+        </p:txBody>
+      </p:sp>
+      <p:sp>
+        <p:nvSpPr>
+          <p:cNvPr id="4" name="Slide Number Placeholder 3"/>
+          <p:cNvSpPr>
+            <a:spLocks noGrp="1"/>
+          </p:cNvSpPr>
+          <p:nvPr>
+            <p:ph type="sldNum" sz="quarter" idx="12"/>
+          </p:nvPr>
+        </p:nvSpPr>
+        <p:spPr/>
+        <p:txBody>
+          <a:bodyPr/>
+          <a:lstStyle/>
+          <a:p>
+            <a:fld id="{0A164282-434E-41D4-9582-783D542A7B68}" type="slidenum">
+              <a:rPr lang="en-US" smtClean="0"/>
+              <a:t>31</a:t>
+            </a:fld>
+            <a:endParaRPr lang="en-US"/>
+          </a:p>
+        </p:txBody>
+      </p:sp>
+    </p:spTree>
+    <p:extLst>
+      <p:ext uri="{BB962C8B-B14F-4D97-AF65-F5344CB8AC3E}">
+        <p14:creationId xmlns:p14="http://schemas.microsoft.com/office/powerpoint/2010/main" val="887955382"/>
+      </p:ext>
+    </p:extLst>
+  </p:cSld>
+  <p:clrMapOvr>
+    <a:masterClrMapping/>
+  </p:clrMapOvr>
+</p:sld>
+</file>
+
+<file path=ppt/slides/slide32.xml><?xml version="1.0" encoding="utf-8"?>
+<p:sld xmlns:a="http://schemas.openxmlformats.org/drawingml/2006/main" xmlns:r="http://schemas.openxmlformats.org/officeDocument/2006/relationships" xmlns:p="http://schemas.openxmlformats.org/presentationml/2006/main">
+  <p:cSld>
+    <p:spTree>
+      <p:nvGrpSpPr>
+        <p:cNvPr id="1" name=""/>
+        <p:cNvGrpSpPr/>
+        <p:nvPr/>
+      </p:nvGrpSpPr>
+      <p:grpSpPr>
+        <a:xfrm>
+          <a:off x="0" y="0"/>
+          <a:ext cx="0" cy="0"/>
+          <a:chOff x="0" y="0"/>
+          <a:chExt cx="0" cy="0"/>
+        </a:xfrm>
+      </p:grpSpPr>
+      <p:sp>
+        <p:nvSpPr>
+          <p:cNvPr id="2" name="Title 1"/>
+          <p:cNvSpPr>
+            <a:spLocks noGrp="1"/>
+          </p:cNvSpPr>
+          <p:nvPr>
+            <p:ph type="title"/>
+          </p:nvPr>
+        </p:nvSpPr>
+        <p:spPr/>
+        <p:txBody>
+          <a:bodyPr/>
+          <a:lstStyle/>
+          <a:p>
+            <a:r>
+              <a:rPr lang="en-US" dirty="0" smtClean="0"/>
+              <a:t>Step 1: Continuous Integration</a:t>
+            </a:r>
+            <a:endParaRPr lang="en-US" dirty="0"/>
+          </a:p>
+        </p:txBody>
+      </p:sp>
+      <p:sp>
+        <p:nvSpPr>
+          <p:cNvPr id="3" name="Content Placeholder 2"/>
+          <p:cNvSpPr>
+            <a:spLocks noGrp="1"/>
+          </p:cNvSpPr>
+          <p:nvPr>
+            <p:ph idx="1"/>
+          </p:nvPr>
+        </p:nvSpPr>
+        <p:spPr/>
+        <p:txBody>
+          <a:bodyPr/>
+          <a:lstStyle/>
+          <a:p>
+            <a:pPr marL="0" indent="0">
+              <a:buNone/>
+            </a:pPr>
+            <a:r>
+              <a:rPr lang="en-US" dirty="0" smtClean="0"/>
+              <a:t>PROBLEM:</a:t>
+            </a:r>
+          </a:p>
+          <a:p>
+            <a:pPr marL="0" indent="0">
+              <a:buNone/>
+            </a:pPr>
+            <a:endParaRPr lang="en-US" dirty="0" smtClean="0"/>
+          </a:p>
+          <a:p>
+            <a:pPr marL="0" indent="0">
+              <a:buNone/>
+            </a:pPr>
+            <a:r>
+              <a:rPr lang="en-US" dirty="0" smtClean="0"/>
+              <a:t>Bugs and issues in your code get harder to fix the longer it takes to find out about them.</a:t>
+            </a:r>
+            <a:endParaRPr lang="en-US" dirty="0"/>
+          </a:p>
+          <a:p>
+            <a:pPr marL="0" indent="0">
+              <a:buNone/>
+            </a:pPr>
+            <a:endParaRPr lang="en-US" dirty="0" smtClean="0"/>
+          </a:p>
+        </p:txBody>
+      </p:sp>
+      <p:sp>
+        <p:nvSpPr>
+          <p:cNvPr id="4" name="Slide Number Placeholder 3"/>
+          <p:cNvSpPr>
+            <a:spLocks noGrp="1"/>
+          </p:cNvSpPr>
+          <p:nvPr>
+            <p:ph type="sldNum" sz="quarter" idx="12"/>
+          </p:nvPr>
+        </p:nvSpPr>
+        <p:spPr/>
+        <p:txBody>
+          <a:bodyPr/>
+          <a:lstStyle/>
+          <a:p>
+            <a:fld id="{0A164282-434E-41D4-9582-783D542A7B68}" type="slidenum">
+              <a:rPr lang="en-US" smtClean="0"/>
+              <a:t>32</a:t>
+            </a:fld>
+            <a:endParaRPr lang="en-US"/>
+          </a:p>
+        </p:txBody>
+      </p:sp>
+    </p:spTree>
+    <p:extLst>
+      <p:ext uri="{BB962C8B-B14F-4D97-AF65-F5344CB8AC3E}">
+        <p14:creationId xmlns:p14="http://schemas.microsoft.com/office/powerpoint/2010/main" val="1498845413"/>
+      </p:ext>
+    </p:extLst>
+  </p:cSld>
+  <p:clrMapOvr>
+    <a:masterClrMapping/>
+  </p:clrMapOvr>
+</p:sld>
+</file>
+
+<file path=ppt/slides/slide33.xml><?xml version="1.0" encoding="utf-8"?>
+<p:sld xmlns:a="http://schemas.openxmlformats.org/drawingml/2006/main" xmlns:r="http://schemas.openxmlformats.org/officeDocument/2006/relationships" xmlns:p="http://schemas.openxmlformats.org/presentationml/2006/main">
+  <p:cSld>
+    <p:spTree>
+      <p:nvGrpSpPr>
+        <p:cNvPr id="1" name=""/>
+        <p:cNvGrpSpPr/>
+        <p:nvPr/>
+      </p:nvGrpSpPr>
+      <p:grpSpPr>
+        <a:xfrm>
+          <a:off x="0" y="0"/>
+          <a:ext cx="0" cy="0"/>
+          <a:chOff x="0" y="0"/>
+          <a:chExt cx="0" cy="0"/>
+        </a:xfrm>
+      </p:grpSpPr>
+      <p:sp>
+        <p:nvSpPr>
+          <p:cNvPr id="2" name="Title 1"/>
+          <p:cNvSpPr>
+            <a:spLocks noGrp="1"/>
+          </p:cNvSpPr>
+          <p:nvPr>
+            <p:ph type="title"/>
+          </p:nvPr>
+        </p:nvSpPr>
+        <p:spPr/>
+        <p:txBody>
+          <a:bodyPr/>
+          <a:lstStyle/>
+          <a:p>
+            <a:r>
+              <a:rPr lang="en-US" dirty="0" smtClean="0"/>
+              <a:t>Step 1: Continuous Integration</a:t>
+            </a:r>
+            <a:endParaRPr lang="en-US" dirty="0"/>
+          </a:p>
+        </p:txBody>
+      </p:sp>
+      <p:sp>
+        <p:nvSpPr>
+          <p:cNvPr id="3" name="Content Placeholder 2"/>
+          <p:cNvSpPr>
+            <a:spLocks noGrp="1"/>
+          </p:cNvSpPr>
+          <p:nvPr>
+            <p:ph idx="1"/>
+          </p:nvPr>
+        </p:nvSpPr>
+        <p:spPr/>
+        <p:txBody>
+          <a:bodyPr/>
+          <a:lstStyle/>
+          <a:p>
+            <a:pPr marL="0" indent="0">
+              <a:buNone/>
+            </a:pPr>
+            <a:r>
+              <a:rPr lang="en-US" dirty="0" smtClean="0"/>
+              <a:t>SOLUTION:</a:t>
+            </a:r>
+          </a:p>
+          <a:p>
+            <a:pPr marL="0" indent="0">
+              <a:buNone/>
+            </a:pPr>
+            <a:endParaRPr lang="en-US" dirty="0" smtClean="0"/>
+          </a:p>
+          <a:p>
+            <a:pPr marL="0" indent="0">
+              <a:buNone/>
+            </a:pPr>
+            <a:r>
+              <a:rPr lang="en-US" dirty="0" smtClean="0"/>
+              <a:t>[Cory?]</a:t>
+            </a:r>
+            <a:endParaRPr lang="en-US" dirty="0"/>
+          </a:p>
+        </p:txBody>
+      </p:sp>
+      <p:sp>
+        <p:nvSpPr>
+          <p:cNvPr id="4" name="Slide Number Placeholder 3"/>
+          <p:cNvSpPr>
+            <a:spLocks noGrp="1"/>
+          </p:cNvSpPr>
+          <p:nvPr>
+            <p:ph type="sldNum" sz="quarter" idx="12"/>
+          </p:nvPr>
+        </p:nvSpPr>
+        <p:spPr/>
+        <p:txBody>
+          <a:bodyPr/>
+          <a:lstStyle/>
+          <a:p>
+            <a:fld id="{0A164282-434E-41D4-9582-783D542A7B68}" type="slidenum">
+              <a:rPr lang="en-US" smtClean="0"/>
+              <a:t>33</a:t>
+            </a:fld>
+            <a:endParaRPr lang="en-US"/>
+          </a:p>
+        </p:txBody>
+      </p:sp>
+    </p:spTree>
+    <p:extLst>
+      <p:ext uri="{BB962C8B-B14F-4D97-AF65-F5344CB8AC3E}">
+        <p14:creationId xmlns:p14="http://schemas.microsoft.com/office/powerpoint/2010/main" val="3820646459"/>
+      </p:ext>
+    </p:extLst>
+  </p:cSld>
+  <p:clrMapOvr>
+    <a:masterClrMapping/>
+  </p:clrMapOvr>
+</p:sld>
+</file>
+
+<file path=ppt/slides/slide34.xml><?xml version="1.0" encoding="utf-8"?>
+<p:sld xmlns:a="http://schemas.openxmlformats.org/drawingml/2006/main" xmlns:r="http://schemas.openxmlformats.org/officeDocument/2006/relationships" xmlns:p="http://schemas.openxmlformats.org/presentationml/2006/main">
+  <p:cSld>
+    <p:spTree>
+      <p:nvGrpSpPr>
+        <p:cNvPr id="1" name=""/>
+        <p:cNvGrpSpPr/>
+        <p:nvPr/>
+      </p:nvGrpSpPr>
+      <p:grpSpPr>
+        <a:xfrm>
+          <a:off x="0" y="0"/>
+          <a:ext cx="0" cy="0"/>
+          <a:chOff x="0" y="0"/>
+          <a:chExt cx="0" cy="0"/>
+        </a:xfrm>
+      </p:grpSpPr>
+      <p:sp>
+        <p:nvSpPr>
+          <p:cNvPr id="2" name="Title 1"/>
+          <p:cNvSpPr>
+            <a:spLocks noGrp="1"/>
+          </p:cNvSpPr>
+          <p:nvPr>
+            <p:ph type="title"/>
+          </p:nvPr>
+        </p:nvSpPr>
+        <p:spPr/>
+        <p:txBody>
+          <a:bodyPr/>
+          <a:lstStyle/>
+          <a:p>
+            <a:r>
+              <a:rPr lang="en-US" dirty="0" smtClean="0"/>
+              <a:t>Scenario description</a:t>
+            </a:r>
+            <a:endParaRPr lang="en-US" dirty="0"/>
+          </a:p>
+        </p:txBody>
+      </p:sp>
+      <p:sp>
+        <p:nvSpPr>
+          <p:cNvPr id="3" name="Content Placeholder 2"/>
+          <p:cNvSpPr>
+            <a:spLocks noGrp="1"/>
+          </p:cNvSpPr>
+          <p:nvPr>
+            <p:ph idx="1"/>
+          </p:nvPr>
+        </p:nvSpPr>
+        <p:spPr/>
+        <p:txBody>
+          <a:bodyPr/>
+          <a:lstStyle/>
+          <a:p>
+            <a:pPr marL="0" indent="0">
+              <a:buNone/>
+            </a:pPr>
+            <a:r>
+              <a:rPr lang="en-US" dirty="0" smtClean="0"/>
+              <a:t>Running a real site requires several environments.</a:t>
+            </a:r>
+          </a:p>
+        </p:txBody>
+      </p:sp>
+      <p:sp>
+        <p:nvSpPr>
+          <p:cNvPr id="4" name="Slide Number Placeholder 3"/>
+          <p:cNvSpPr>
+            <a:spLocks noGrp="1"/>
+          </p:cNvSpPr>
+          <p:nvPr>
+            <p:ph type="sldNum" sz="quarter" idx="12"/>
+          </p:nvPr>
+        </p:nvSpPr>
+        <p:spPr/>
+        <p:txBody>
+          <a:bodyPr/>
+          <a:lstStyle/>
+          <a:p>
+            <a:fld id="{0A164282-434E-41D4-9582-783D542A7B68}" type="slidenum">
+              <a:rPr lang="en-US" smtClean="0"/>
+              <a:t>34</a:t>
+            </a:fld>
+            <a:endParaRPr lang="en-US"/>
+          </a:p>
+        </p:txBody>
+      </p:sp>
+    </p:spTree>
+    <p:extLst>
+      <p:ext uri="{BB962C8B-B14F-4D97-AF65-F5344CB8AC3E}">
+        <p14:creationId xmlns:p14="http://schemas.microsoft.com/office/powerpoint/2010/main" val="3947867443"/>
+      </p:ext>
+    </p:extLst>
+  </p:cSld>
+  <p:clrMapOvr>
+    <a:masterClrMapping/>
+  </p:clrMapOvr>
+</p:sld>
+</file>
+
+<file path=ppt/slides/slide35.xml><?xml version="1.0" encoding="utf-8"?>
+<p:sld xmlns:a="http://schemas.openxmlformats.org/drawingml/2006/main" xmlns:r="http://schemas.openxmlformats.org/officeDocument/2006/relationships" xmlns:p="http://schemas.openxmlformats.org/presentationml/2006/main">
+  <p:cSld>
+    <p:spTree>
+      <p:nvGrpSpPr>
+        <p:cNvPr id="1" name=""/>
+        <p:cNvGrpSpPr/>
+        <p:nvPr/>
+      </p:nvGrpSpPr>
+      <p:grpSpPr>
+        <a:xfrm>
+          <a:off x="0" y="0"/>
+          <a:ext cx="0" cy="0"/>
+          <a:chOff x="0" y="0"/>
+          <a:chExt cx="0" cy="0"/>
+        </a:xfrm>
+      </p:grpSpPr>
+      <p:sp>
+        <p:nvSpPr>
+          <p:cNvPr id="2" name="Title 1"/>
+          <p:cNvSpPr>
+            <a:spLocks noGrp="1"/>
+          </p:cNvSpPr>
+          <p:nvPr>
+            <p:ph type="title"/>
+          </p:nvPr>
+        </p:nvSpPr>
+        <p:spPr/>
+        <p:txBody>
+          <a:bodyPr>
+            <a:normAutofit fontScale="90000"/>
+          </a:bodyPr>
+          <a:lstStyle/>
+          <a:p>
+            <a:r>
+              <a:rPr lang="en-US" dirty="0"/>
+              <a:t>Running, improving and maintaining a site in the real </a:t>
+            </a:r>
+            <a:r>
+              <a:rPr lang="en-US" dirty="0" smtClean="0"/>
+              <a:t>world</a:t>
+            </a:r>
+            <a:endParaRPr lang="en-US" dirty="0"/>
+          </a:p>
+        </p:txBody>
+      </p:sp>
+      <p:sp>
+        <p:nvSpPr>
+          <p:cNvPr id="3" name="Content Placeholder 2"/>
+          <p:cNvSpPr>
+            <a:spLocks noGrp="1"/>
+          </p:cNvSpPr>
+          <p:nvPr>
+            <p:ph idx="1"/>
+          </p:nvPr>
+        </p:nvSpPr>
+        <p:spPr>
+          <a:xfrm>
+            <a:off x="838199" y="1825624"/>
+            <a:ext cx="10681607" cy="4681311"/>
+          </a:xfrm>
+        </p:spPr>
+        <p:txBody>
+          <a:bodyPr>
+            <a:normAutofit fontScale="25000" lnSpcReduction="20000"/>
+          </a:bodyPr>
+          <a:lstStyle/>
+          <a:p>
+            <a:r>
+              <a:rPr lang="en-US" dirty="0" smtClean="0"/>
+              <a:t>60 minutes</a:t>
+            </a:r>
+          </a:p>
+          <a:p>
+            <a:r>
+              <a:rPr lang="en-US" dirty="0" smtClean="0"/>
+              <a:t>“Real world” content</a:t>
+            </a:r>
+          </a:p>
+          <a:p>
+            <a:r>
+              <a:rPr lang="en-US" dirty="0" smtClean="0"/>
+              <a:t>Scenario: Scale</a:t>
+            </a:r>
+          </a:p>
+          <a:p>
+            <a:pPr marL="914400" lvl="1" indent="-457200">
+              <a:buFont typeface="+mj-lt"/>
+              <a:buAutoNum type="arabicPeriod"/>
+            </a:pPr>
+            <a:r>
+              <a:rPr lang="en-US" dirty="0" smtClean="0"/>
+              <a:t>Static content to storage (using URL rewrite)</a:t>
+            </a:r>
+          </a:p>
+          <a:p>
+            <a:pPr marL="914400" lvl="1" indent="-457200">
+              <a:buFont typeface="+mj-lt"/>
+              <a:buAutoNum type="arabicPeriod"/>
+            </a:pPr>
+            <a:r>
+              <a:rPr lang="en-US" dirty="0" smtClean="0"/>
+              <a:t>Manual scale</a:t>
+            </a:r>
+          </a:p>
+          <a:p>
+            <a:pPr marL="914400" lvl="1" indent="-457200">
+              <a:buFont typeface="+mj-lt"/>
+              <a:buAutoNum type="arabicPeriod"/>
+            </a:pPr>
+            <a:r>
+              <a:rPr lang="en-US" dirty="0" smtClean="0"/>
+              <a:t>Auto-scale</a:t>
+            </a:r>
+          </a:p>
+          <a:p>
+            <a:pPr marL="914400" lvl="1" indent="-457200">
+              <a:buFont typeface="+mj-lt"/>
+              <a:buAutoNum type="arabicPeriod"/>
+            </a:pPr>
+            <a:r>
+              <a:rPr lang="en-US" dirty="0" smtClean="0"/>
+              <a:t>Caching</a:t>
+            </a:r>
+          </a:p>
+          <a:p>
+            <a:pPr lvl="1"/>
+            <a:r>
+              <a:rPr lang="en-US" dirty="0" smtClean="0"/>
+              <a:t>Use WCAT to show load?</a:t>
+            </a:r>
+          </a:p>
+          <a:p>
+            <a:r>
+              <a:rPr lang="en-US" dirty="0" smtClean="0"/>
+              <a:t>Scenario: Change</a:t>
+            </a:r>
+          </a:p>
+          <a:p>
+            <a:pPr lvl="1"/>
+            <a:r>
+              <a:rPr lang="en-US" dirty="0" smtClean="0"/>
+              <a:t>EF Migrations – both up and down (mention other migration options?)</a:t>
+            </a:r>
+          </a:p>
+          <a:p>
+            <a:pPr lvl="1"/>
+            <a:r>
+              <a:rPr lang="en-US" dirty="0" smtClean="0"/>
+              <a:t>Deployment rollback (</a:t>
+            </a:r>
+            <a:r>
+              <a:rPr lang="en-US" dirty="0" err="1" smtClean="0"/>
+              <a:t>Git</a:t>
+            </a:r>
+            <a:r>
+              <a:rPr lang="en-US" dirty="0" smtClean="0"/>
+              <a:t> / TFS)</a:t>
+            </a:r>
+          </a:p>
+          <a:p>
+            <a:pPr lvl="1"/>
+            <a:r>
+              <a:rPr lang="en-US" dirty="0" smtClean="0"/>
+              <a:t>WAAD (selling private label version of site w/ AD support)</a:t>
+            </a:r>
+          </a:p>
+          <a:p>
+            <a:r>
+              <a:rPr lang="en-US" dirty="0" smtClean="0"/>
+              <a:t>Scenario: </a:t>
+            </a:r>
+            <a:r>
+              <a:rPr lang="en-US" dirty="0" err="1" smtClean="0"/>
+              <a:t>Dev</a:t>
+            </a:r>
+            <a:r>
+              <a:rPr lang="en-US" dirty="0" smtClean="0"/>
+              <a:t> / Test</a:t>
+            </a:r>
+          </a:p>
+          <a:p>
+            <a:pPr lvl="1"/>
+            <a:r>
+              <a:rPr lang="en-US" dirty="0" smtClean="0"/>
+              <a:t>Continuous Integration</a:t>
+            </a:r>
+          </a:p>
+          <a:p>
+            <a:pPr lvl="1"/>
+            <a:r>
+              <a:rPr lang="en-US" dirty="0" smtClean="0"/>
+              <a:t>Multi-environment</a:t>
+            </a:r>
+          </a:p>
+          <a:p>
+            <a:pPr lvl="1"/>
+            <a:r>
+              <a:rPr lang="en-US" dirty="0" smtClean="0"/>
+              <a:t>VM</a:t>
+            </a:r>
+          </a:p>
+          <a:p>
+            <a:pPr lvl="1"/>
+            <a:r>
+              <a:rPr lang="en-US" dirty="0" smtClean="0"/>
+              <a:t>Test Manager?</a:t>
+            </a:r>
+          </a:p>
+          <a:p>
+            <a:pPr lvl="1"/>
+            <a:endParaRPr lang="en-US" dirty="0"/>
+          </a:p>
+          <a:p>
+            <a:r>
+              <a:rPr lang="en-US" dirty="0" smtClean="0"/>
+              <a:t>Note: </a:t>
+            </a:r>
+          </a:p>
+          <a:p>
+            <a:pPr lvl="1"/>
+            <a:r>
+              <a:rPr lang="en-US" dirty="0" smtClean="0"/>
+              <a:t>AD here + SSL (slide driven) – Note: Talk to Vittorio about ACS / AD</a:t>
+            </a:r>
+          </a:p>
+          <a:p>
+            <a:pPr lvl="1"/>
+            <a:r>
+              <a:rPr lang="en-US" dirty="0" smtClean="0"/>
+              <a:t>Slides in appendix to go in depth</a:t>
+            </a:r>
+          </a:p>
+          <a:p>
+            <a:pPr lvl="1"/>
+            <a:r>
+              <a:rPr lang="en-US" dirty="0" smtClean="0"/>
+              <a:t>Make this 75-90 minutes?</a:t>
+            </a:r>
+          </a:p>
+          <a:p>
+            <a:pPr lvl="1"/>
+            <a:r>
+              <a:rPr lang="en-US" dirty="0" smtClean="0"/>
+              <a:t>3 Calls to action for each scenario</a:t>
+            </a:r>
+          </a:p>
+          <a:p>
+            <a:pPr lvl="1"/>
+            <a:r>
+              <a:rPr lang="en-US" dirty="0" smtClean="0"/>
+              <a:t>Include New Relic, maybe Glimpse too</a:t>
+            </a:r>
+          </a:p>
+          <a:p>
+            <a:pPr lvl="1"/>
+            <a:r>
+              <a:rPr lang="en-US" dirty="0" smtClean="0"/>
+              <a:t>Optimization – Web </a:t>
+            </a:r>
+            <a:r>
+              <a:rPr lang="en-US" dirty="0" err="1" smtClean="0"/>
+              <a:t>Dev</a:t>
+            </a:r>
+            <a:r>
+              <a:rPr lang="en-US" dirty="0" smtClean="0"/>
+              <a:t> Checklist</a:t>
+            </a:r>
+          </a:p>
+          <a:p>
+            <a:pPr lvl="1"/>
+            <a:r>
+              <a:rPr lang="en-US" dirty="0" smtClean="0"/>
+              <a:t>Selective publishing</a:t>
+            </a:r>
+          </a:p>
+        </p:txBody>
+      </p:sp>
+    </p:spTree>
+    <p:extLst>
+      <p:ext uri="{BB962C8B-B14F-4D97-AF65-F5344CB8AC3E}">
+        <p14:creationId xmlns:p14="http://schemas.microsoft.com/office/powerpoint/2010/main" val="193550282"/>
+      </p:ext>
+    </p:extLst>
+  </p:cSld>
+  <p:clrMapOvr>
+    <a:masterClrMapping/>
+  </p:clrMapOvr>
+  <p:timing>
+    <p:tnLst>
+      <p:par>
+        <p:cTn id="1" dur="indefinite" restart="never" nodeType="tmRoot"/>
+      </p:par>
+    </p:tnLst>
+  </p:timing>
+</p:sld>
+</file>
+
+<file path=ppt/slides/slide36.xml><?xml version="1.0" encoding="utf-8"?>
+<p:sld xmlns:a="http://schemas.openxmlformats.org/drawingml/2006/main" xmlns:r="http://schemas.openxmlformats.org/officeDocument/2006/relationships" xmlns:p="http://schemas.openxmlformats.org/presentationml/2006/main">
+  <p:cSld>
+    <p:spTree>
+      <p:nvGrpSpPr>
+        <p:cNvPr id="1" name=""/>
+        <p:cNvGrpSpPr/>
+        <p:nvPr/>
+      </p:nvGrpSpPr>
+      <p:grpSpPr>
+        <a:xfrm>
+          <a:off x="0" y="0"/>
+          <a:ext cx="0" cy="0"/>
+          <a:chOff x="0" y="0"/>
+          <a:chExt cx="0" cy="0"/>
+        </a:xfrm>
+      </p:grpSpPr>
+      <p:sp>
+        <p:nvSpPr>
           <p:cNvPr id="4" name="TextBox 3"/>
           <p:cNvSpPr txBox="1"/>
           <p:nvPr/>
@@ -23496,7 +24572,7 @@
     </p:spTree>
     <p:extLst>
       <p:ext uri="{BB962C8B-B14F-4D97-AF65-F5344CB8AC3E}">
-        <p14:creationId xmlns:p14="http://schemas.microsoft.com/office/powerpoint/2010/main" val="224840743"/>
+        <p14:creationId xmlns:p14="http://schemas.microsoft.com/office/powerpoint/2010/main" val="4007898504"/>
       </p:ext>
     </p:extLst>
   </p:cSld>
@@ -23506,7 +24582,125 @@
 </p:sld>
 </file>
 
-<file path=ppt/slides/slide32.xml><?xml version="1.0" encoding="utf-8"?>
+<file path=ppt/slides/slide37.xml><?xml version="1.0" encoding="utf-8"?>
+<p:sld xmlns:a="http://schemas.openxmlformats.org/drawingml/2006/main" xmlns:r="http://schemas.openxmlformats.org/officeDocument/2006/relationships" xmlns:p="http://schemas.openxmlformats.org/presentationml/2006/main">
+  <p:cSld>
+    <p:spTree>
+      <p:nvGrpSpPr>
+        <p:cNvPr id="1" name=""/>
+        <p:cNvGrpSpPr/>
+        <p:nvPr/>
+      </p:nvGrpSpPr>
+      <p:grpSpPr>
+        <a:xfrm>
+          <a:off x="0" y="0"/>
+          <a:ext cx="0" cy="0"/>
+          <a:chOff x="0" y="0"/>
+          <a:chExt cx="0" cy="0"/>
+        </a:xfrm>
+      </p:grpSpPr>
+      <p:sp>
+        <p:nvSpPr>
+          <p:cNvPr id="2" name="Title 1"/>
+          <p:cNvSpPr>
+            <a:spLocks noGrp="1"/>
+          </p:cNvSpPr>
+          <p:nvPr>
+            <p:ph type="title"/>
+          </p:nvPr>
+        </p:nvSpPr>
+        <p:spPr/>
+        <p:txBody>
+          <a:bodyPr/>
+          <a:lstStyle/>
+          <a:p>
+            <a:r>
+              <a:rPr lang="en-US" dirty="0" smtClean="0"/>
+              <a:t>Resources</a:t>
+            </a:r>
+            <a:endParaRPr lang="en-US" dirty="0"/>
+          </a:p>
+        </p:txBody>
+      </p:sp>
+      <p:sp>
+        <p:nvSpPr>
+          <p:cNvPr id="3" name="Content Placeholder 2"/>
+          <p:cNvSpPr>
+            <a:spLocks noGrp="1"/>
+          </p:cNvSpPr>
+          <p:nvPr>
+            <p:ph idx="1"/>
+          </p:nvPr>
+        </p:nvSpPr>
+        <p:spPr/>
+        <p:txBody>
+          <a:bodyPr/>
+          <a:lstStyle/>
+          <a:p>
+            <a:r>
+              <a:rPr lang="en-US" dirty="0">
+                <a:hlinkClick r:id="rId2"/>
+              </a:rPr>
+              <a:t>http://www.windowsazure.com/en-us/manage/services/cache/net/how-to-cache-service</a:t>
+            </a:r>
+            <a:r>
+              <a:rPr lang="en-US" dirty="0" smtClean="0">
+                <a:hlinkClick r:id="rId2"/>
+              </a:rPr>
+              <a:t>/</a:t>
+            </a:r>
+            <a:r>
+              <a:rPr lang="en-US" dirty="0" smtClean="0"/>
+              <a:t> - aka.ms this</a:t>
+            </a:r>
+            <a:endParaRPr lang="en-US" dirty="0"/>
+          </a:p>
+        </p:txBody>
+      </p:sp>
+      <p:sp>
+        <p:nvSpPr>
+          <p:cNvPr id="4" name="Slide Number Placeholder 3"/>
+          <p:cNvSpPr>
+            <a:spLocks noGrp="1"/>
+          </p:cNvSpPr>
+          <p:nvPr>
+            <p:ph type="sldNum" sz="quarter" idx="12"/>
+          </p:nvPr>
+        </p:nvSpPr>
+        <p:spPr/>
+        <p:txBody>
+          <a:bodyPr/>
+          <a:lstStyle/>
+          <a:p>
+            <a:fld id="{0A164282-434E-41D4-9582-783D542A7B68}" type="slidenum">
+              <a:rPr lang="en-US" smtClean="0"/>
+              <a:t>37</a:t>
+            </a:fld>
+            <a:endParaRPr lang="en-US"/>
+          </a:p>
+        </p:txBody>
+      </p:sp>
+    </p:spTree>
+    <p:extLst>
+      <p:ext uri="{BB962C8B-B14F-4D97-AF65-F5344CB8AC3E}">
+        <p14:creationId xmlns:p14="http://schemas.microsoft.com/office/powerpoint/2010/main" val="2821683008"/>
+      </p:ext>
+    </p:extLst>
+  </p:cSld>
+  <p:clrMapOvr>
+    <a:masterClrMapping/>
+  </p:clrMapOvr>
+  <p:timing>
+    <p:tnLst>
+      <p:par>
+        <p:cTn id="1" dur="indefinite" restart="never" nodeType="tmRoot"/>
+      </p:par>
+    </p:tnLst>
+  </p:timing>
+</p:sld>
+</file>
+
+<file path=ppt/slides/slide38.xml><?xml version="1.0" encoding="utf-8"?>
 <p:sld xmlns:a="http://schemas.openxmlformats.org/drawingml/2006/main" xmlns:r="http://schemas.openxmlformats.org/officeDocument/2006/relationships" xmlns:p="http://schemas.openxmlformats.org/presentationml/2006/main">
   <p:cSld>
     <p:bg>
@@ -26096,7 +27290,11 @@
           <a:p>
             <a:r>
               <a:rPr lang="en-US" dirty="0" smtClean="0"/>
-              <a:t>Step 1: Static content to storage</a:t>
+              <a:t>Step 1: </a:t>
+            </a:r>
+            <a:r>
+              <a:rPr lang="en-US" dirty="0" smtClean="0"/>
+              <a:t>Preserve server bandwidth</a:t>
             </a:r>
             <a:endParaRPr lang="en-US" dirty="0"/>
           </a:p>
@@ -26242,7 +27440,11 @@
           <a:p>
             <a:r>
               <a:rPr lang="en-US" dirty="0" smtClean="0"/>
-              <a:t>Step 1: Static content to storage</a:t>
+              <a:t>Step 1: </a:t>
+            </a:r>
+            <a:r>
+              <a:rPr lang="en-US" dirty="0" smtClean="0"/>
+              <a:t>Preserve server bandwidth</a:t>
             </a:r>
             <a:endParaRPr lang="en-US" dirty="0"/>
           </a:p>
@@ -26283,7 +27485,30 @@
             </a:pPr>
             <a:r>
               <a:rPr lang="en-US" dirty="0" smtClean="0"/>
-              <a:t>Serve static files from blob storage.</a:t>
+              <a:t>Serve static files from blob storage</a:t>
+            </a:r>
+            <a:r>
+              <a:rPr lang="en-US" dirty="0" smtClean="0"/>
+              <a:t>.</a:t>
+            </a:r>
+          </a:p>
+          <a:p>
+            <a:pPr marL="0" indent="0">
+              <a:buNone/>
+            </a:pPr>
+            <a:endParaRPr lang="en-US" dirty="0"/>
+          </a:p>
+          <a:p>
+            <a:pPr marL="0" indent="0">
+              <a:buNone/>
+            </a:pPr>
+            <a:r>
+              <a:rPr lang="en-US" dirty="0"/>
+              <a:t>This is a step towards to delivering content from a content delivery network (CDN</a:t>
+            </a:r>
+            <a:r>
+              <a:rPr lang="en-US" dirty="0" smtClean="0"/>
+              <a:t>).</a:t>
             </a:r>
             <a:endParaRPr lang="en-US" dirty="0"/>
           </a:p>

</xml_diff>

<commit_message>
Updated Dev / Test / Multi-VM section
</commit_message>
<xml_diff>
--- a/6-ASPNET-in-Production.pptx
+++ b/6-ASPNET-in-Production.pptx
@@ -12,7 +12,7 @@
     <p:sldMasterId id="2147483784" r:id="rId8"/>
   </p:sldMasterIdLst>
   <p:notesMasterIdLst>
-    <p:notesMasterId r:id="rId47"/>
+    <p:notesMasterId r:id="rId49"/>
   </p:notesMasterIdLst>
   <p:sldIdLst>
     <p:sldId id="269" r:id="rId9"/>
@@ -48,11 +48,13 @@
     <p:sldId id="307" r:id="rId39"/>
     <p:sldId id="308" r:id="rId40"/>
     <p:sldId id="309" r:id="rId41"/>
-    <p:sldId id="310" r:id="rId42"/>
-    <p:sldId id="311" r:id="rId43"/>
-    <p:sldId id="313" r:id="rId44"/>
-    <p:sldId id="312" r:id="rId45"/>
-    <p:sldId id="263" r:id="rId46"/>
+    <p:sldId id="320" r:id="rId42"/>
+    <p:sldId id="317" r:id="rId43"/>
+    <p:sldId id="318" r:id="rId44"/>
+    <p:sldId id="315" r:id="rId45"/>
+    <p:sldId id="316" r:id="rId46"/>
+    <p:sldId id="314" r:id="rId47"/>
+    <p:sldId id="263" r:id="rId48"/>
   </p:sldIdLst>
   <p:sldSz cx="12192000" cy="6858000"/>
   <p:notesSz cx="6858000" cy="9144000"/>
@@ -241,7 +243,7 @@
           <a:p>
             <a:fld id="{0E990FE3-7537-4D15-A9F5-FDF1805FD5F8}" type="datetimeFigureOut">
               <a:rPr lang="en-US" smtClean="0"/>
-              <a:t>10/20/2013</a:t>
+              <a:t>10/28/2013</a:t>
             </a:fld>
             <a:endParaRPr lang="en-US"/>
           </a:p>
@@ -509,6 +511,525 @@
 </p:notesMaster>
 </file>
 
+<file path=ppt/notesSlides/notesSlide1.xml><?xml version="1.0" encoding="utf-8"?>
+<p:notes xmlns:a="http://schemas.openxmlformats.org/drawingml/2006/main" xmlns:r="http://schemas.openxmlformats.org/officeDocument/2006/relationships" xmlns:p="http://schemas.openxmlformats.org/presentationml/2006/main">
+  <p:cSld>
+    <p:spTree>
+      <p:nvGrpSpPr>
+        <p:cNvPr id="1" name=""/>
+        <p:cNvGrpSpPr/>
+        <p:nvPr/>
+      </p:nvGrpSpPr>
+      <p:grpSpPr>
+        <a:xfrm>
+          <a:off x="0" y="0"/>
+          <a:ext cx="0" cy="0"/>
+          <a:chOff x="0" y="0"/>
+          <a:chExt cx="0" cy="0"/>
+        </a:xfrm>
+      </p:grpSpPr>
+      <p:sp>
+        <p:nvSpPr>
+          <p:cNvPr id="2" name="Slide Image Placeholder 1"/>
+          <p:cNvSpPr>
+            <a:spLocks noGrp="1" noRot="1" noChangeAspect="1"/>
+          </p:cNvSpPr>
+          <p:nvPr>
+            <p:ph type="sldImg"/>
+          </p:nvPr>
+        </p:nvSpPr>
+        <p:spPr/>
+      </p:sp>
+      <p:sp>
+        <p:nvSpPr>
+          <p:cNvPr id="3" name="Notes Placeholder 2"/>
+          <p:cNvSpPr>
+            <a:spLocks noGrp="1"/>
+          </p:cNvSpPr>
+          <p:nvPr>
+            <p:ph type="body" idx="1"/>
+          </p:nvPr>
+        </p:nvSpPr>
+        <p:spPr/>
+        <p:txBody>
+          <a:bodyPr/>
+          <a:lstStyle/>
+          <a:p>
+            <a:pPr marL="0" marR="0" indent="0" algn="l" defTabSz="932503" rtl="0" eaLnBrk="1" fontAlgn="auto" latinLnBrk="0" hangingPunct="1">
+              <a:lnSpc>
+                <a:spcPct val="90000"/>
+              </a:lnSpc>
+              <a:spcBef>
+                <a:spcPts val="0"/>
+              </a:spcBef>
+              <a:spcAft>
+                <a:spcPts val="340"/>
+              </a:spcAft>
+              <a:buClrTx/>
+              <a:buSzTx/>
+              <a:buFontTx/>
+              <a:buNone/>
+              <a:tabLst/>
+              <a:defRPr/>
+            </a:pPr>
+            <a:r>
+              <a:rPr lang="en-US" sz="1000" kern="1200" dirty="0" smtClean="0">
+                <a:solidFill>
+                  <a:schemeClr val="tx1"/>
+                </a:solidFill>
+                <a:effectLst/>
+                <a:latin typeface="Segoe UI Light" pitchFamily="34" charset="0"/>
+                <a:ea typeface="+mn-ea"/>
+                <a:cs typeface="+mn-cs"/>
+              </a:rPr>
+              <a:t>Fastest Growing Hypervisor, taking share from VMWare”</a:t>
+            </a:r>
+          </a:p>
+          <a:p>
+            <a:pPr marL="0" marR="0" indent="0" algn="l" defTabSz="932503" rtl="0" eaLnBrk="1" fontAlgn="auto" latinLnBrk="0" hangingPunct="1">
+              <a:lnSpc>
+                <a:spcPct val="90000"/>
+              </a:lnSpc>
+              <a:spcBef>
+                <a:spcPts val="0"/>
+              </a:spcBef>
+              <a:spcAft>
+                <a:spcPts val="340"/>
+              </a:spcAft>
+              <a:buClrTx/>
+              <a:buSzTx/>
+              <a:buFontTx/>
+              <a:buNone/>
+              <a:tabLst/>
+              <a:defRPr/>
+            </a:pPr>
+            <a:endParaRPr lang="en-US" sz="1000" kern="1200" dirty="0" smtClean="0">
+              <a:solidFill>
+                <a:schemeClr val="tx1"/>
+              </a:solidFill>
+              <a:effectLst/>
+              <a:latin typeface="Segoe UI Light" pitchFamily="34" charset="0"/>
+              <a:ea typeface="+mn-ea"/>
+              <a:cs typeface="+mn-cs"/>
+            </a:endParaRPr>
+          </a:p>
+          <a:p>
+            <a:pPr marL="0" marR="0" lvl="0" indent="0" algn="l" defTabSz="932503" rtl="0" eaLnBrk="1" fontAlgn="auto" latinLnBrk="0" hangingPunct="1">
+              <a:lnSpc>
+                <a:spcPct val="90000"/>
+              </a:lnSpc>
+              <a:spcBef>
+                <a:spcPts val="0"/>
+              </a:spcBef>
+              <a:spcAft>
+                <a:spcPts val="340"/>
+              </a:spcAft>
+              <a:buClrTx/>
+              <a:buSzTx/>
+              <a:buFontTx/>
+              <a:buNone/>
+              <a:tabLst/>
+              <a:defRPr/>
+            </a:pPr>
+            <a:r>
+              <a:rPr lang="en-US" sz="1000" kern="1200" dirty="0" smtClean="0">
+                <a:solidFill>
+                  <a:schemeClr val="tx1"/>
+                </a:solidFill>
+                <a:effectLst/>
+                <a:latin typeface="Segoe UI Light" pitchFamily="34" charset="0"/>
+                <a:ea typeface="+mn-ea"/>
+                <a:cs typeface="+mn-cs"/>
+              </a:rPr>
+              <a:t>2 releases of Hyper-V since ESX 5.1 (WS2012 and WS2012 R2)</a:t>
+            </a:r>
+          </a:p>
+          <a:p>
+            <a:pPr marL="0" marR="0" lvl="0" indent="0" algn="l" defTabSz="932503" rtl="0" eaLnBrk="1" fontAlgn="auto" latinLnBrk="0" hangingPunct="1">
+              <a:lnSpc>
+                <a:spcPct val="90000"/>
+              </a:lnSpc>
+              <a:spcBef>
+                <a:spcPts val="0"/>
+              </a:spcBef>
+              <a:spcAft>
+                <a:spcPts val="340"/>
+              </a:spcAft>
+              <a:buClrTx/>
+              <a:buSzTx/>
+              <a:buFontTx/>
+              <a:buNone/>
+              <a:tabLst/>
+              <a:defRPr/>
+            </a:pPr>
+            <a:endParaRPr lang="en-US" sz="1000" kern="1200" dirty="0" smtClean="0">
+              <a:solidFill>
+                <a:schemeClr val="tx1"/>
+              </a:solidFill>
+              <a:effectLst/>
+              <a:latin typeface="Segoe UI Light" pitchFamily="34" charset="0"/>
+              <a:ea typeface="+mn-ea"/>
+              <a:cs typeface="+mn-cs"/>
+            </a:endParaRPr>
+          </a:p>
+          <a:p>
+            <a:pPr lvl="0"/>
+            <a:r>
+              <a:rPr lang="en-US" sz="1000" kern="1200" dirty="0" smtClean="0">
+                <a:solidFill>
+                  <a:schemeClr val="tx1"/>
+                </a:solidFill>
+                <a:effectLst/>
+                <a:latin typeface="Segoe UI Light" pitchFamily="34" charset="0"/>
+                <a:ea typeface="+mn-ea"/>
+                <a:cs typeface="+mn-cs"/>
+              </a:rPr>
+              <a:t>Hyper-V share is growing 3x that of VMW over the past 2 years</a:t>
+            </a:r>
+          </a:p>
+          <a:p>
+            <a:pPr lvl="0"/>
+            <a:endParaRPr lang="en-US" sz="1000" kern="1200" dirty="0" smtClean="0">
+              <a:solidFill>
+                <a:schemeClr val="tx1"/>
+              </a:solidFill>
+              <a:effectLst/>
+              <a:latin typeface="Segoe UI Light" pitchFamily="34" charset="0"/>
+              <a:ea typeface="+mn-ea"/>
+              <a:cs typeface="+mn-cs"/>
+            </a:endParaRPr>
+          </a:p>
+          <a:p>
+            <a:pPr lvl="0"/>
+            <a:r>
+              <a:rPr lang="en-US" sz="1000" kern="1200" dirty="0" smtClean="0">
+                <a:solidFill>
+                  <a:schemeClr val="tx1"/>
+                </a:solidFill>
+                <a:effectLst/>
+                <a:latin typeface="Segoe UI Light" pitchFamily="34" charset="0"/>
+                <a:ea typeface="+mn-ea"/>
+                <a:cs typeface="+mn-cs"/>
+              </a:rPr>
+              <a:t>Hyper-V steadily taking over a point of share per quarter</a:t>
+            </a:r>
+          </a:p>
+          <a:p>
+            <a:pPr lvl="0"/>
+            <a:r>
+              <a:rPr lang="en-US" sz="1000" kern="1200" dirty="0" smtClean="0">
+                <a:solidFill>
+                  <a:schemeClr val="tx1"/>
+                </a:solidFill>
+                <a:effectLst/>
+                <a:latin typeface="Segoe UI Light" pitchFamily="34" charset="0"/>
+                <a:ea typeface="+mn-ea"/>
+                <a:cs typeface="+mn-cs"/>
+              </a:rPr>
+              <a:t>Microsoft in the Gartner Virtualization Magic Quadrant for the 3</a:t>
+            </a:r>
+            <a:r>
+              <a:rPr lang="en-US" sz="1000" kern="1200" baseline="30000" dirty="0" smtClean="0">
+                <a:solidFill>
+                  <a:schemeClr val="tx1"/>
+                </a:solidFill>
+                <a:effectLst/>
+                <a:latin typeface="Segoe UI Light" pitchFamily="34" charset="0"/>
+                <a:ea typeface="+mn-ea"/>
+                <a:cs typeface="+mn-cs"/>
+              </a:rPr>
+              <a:t>rd</a:t>
+            </a:r>
+            <a:r>
+              <a:rPr lang="en-US" sz="1000" kern="1200" dirty="0" smtClean="0">
+                <a:solidFill>
+                  <a:schemeClr val="tx1"/>
+                </a:solidFill>
+                <a:effectLst/>
+                <a:latin typeface="Segoe UI Light" pitchFamily="34" charset="0"/>
+                <a:ea typeface="+mn-ea"/>
+                <a:cs typeface="+mn-cs"/>
+              </a:rPr>
+              <a:t> straight year and is the only vendor moving up and to the right</a:t>
+            </a:r>
+          </a:p>
+          <a:p>
+            <a:pPr lvl="0"/>
+            <a:endParaRPr lang="en-US" sz="1000" kern="1200" dirty="0" smtClean="0">
+              <a:solidFill>
+                <a:schemeClr val="tx1"/>
+              </a:solidFill>
+              <a:effectLst/>
+              <a:latin typeface="Segoe UI Light" pitchFamily="34" charset="0"/>
+              <a:ea typeface="+mn-ea"/>
+              <a:cs typeface="+mn-cs"/>
+            </a:endParaRPr>
+          </a:p>
+          <a:p>
+            <a:pPr lvl="0"/>
+            <a:r>
+              <a:rPr lang="en-US" sz="1000" kern="1200" dirty="0" smtClean="0">
+                <a:solidFill>
+                  <a:schemeClr val="tx1"/>
+                </a:solidFill>
+                <a:effectLst/>
+                <a:latin typeface="Segoe UI Light" pitchFamily="34" charset="0"/>
+                <a:ea typeface="+mn-ea"/>
+                <a:cs typeface="+mn-cs"/>
+              </a:rPr>
+              <a:t>Over 50 new services released this year</a:t>
+            </a:r>
+          </a:p>
+          <a:p>
+            <a:pPr lvl="0"/>
+            <a:r>
+              <a:rPr lang="en-US" sz="1000" kern="1200" dirty="0" smtClean="0">
+                <a:solidFill>
+                  <a:schemeClr val="tx1"/>
+                </a:solidFill>
+                <a:effectLst/>
+                <a:latin typeface="Segoe UI Light" pitchFamily="34" charset="0"/>
+                <a:ea typeface="+mn-ea"/>
+                <a:cs typeface="+mn-cs"/>
+              </a:rPr>
+              <a:t>Compute &amp; Storage Capacity doubling every 6 – 9 months</a:t>
+            </a:r>
+          </a:p>
+          <a:p>
+            <a:pPr lvl="0"/>
+            <a:endParaRPr lang="en-US" sz="1000" kern="1200" dirty="0" smtClean="0">
+              <a:solidFill>
+                <a:schemeClr val="tx1"/>
+              </a:solidFill>
+              <a:effectLst/>
+              <a:latin typeface="Segoe UI Light" pitchFamily="34" charset="0"/>
+              <a:ea typeface="+mn-ea"/>
+              <a:cs typeface="+mn-cs"/>
+            </a:endParaRPr>
+          </a:p>
+          <a:p>
+            <a:pPr marL="0" marR="0" lvl="0" indent="0" algn="l" defTabSz="932503" rtl="0" eaLnBrk="1" fontAlgn="auto" latinLnBrk="0" hangingPunct="1">
+              <a:lnSpc>
+                <a:spcPct val="90000"/>
+              </a:lnSpc>
+              <a:spcBef>
+                <a:spcPts val="0"/>
+              </a:spcBef>
+              <a:spcAft>
+                <a:spcPts val="340"/>
+              </a:spcAft>
+              <a:buClrTx/>
+              <a:buSzTx/>
+              <a:buFontTx/>
+              <a:buNone/>
+              <a:tabLst/>
+              <a:defRPr/>
+            </a:pPr>
+            <a:endParaRPr lang="en-US" sz="1000" kern="1200" dirty="0" smtClean="0">
+              <a:solidFill>
+                <a:schemeClr val="tx1"/>
+              </a:solidFill>
+              <a:effectLst/>
+              <a:latin typeface="Segoe UI Light" pitchFamily="34" charset="0"/>
+              <a:ea typeface="+mn-ea"/>
+              <a:cs typeface="+mn-cs"/>
+            </a:endParaRPr>
+          </a:p>
+          <a:p>
+            <a:pPr marL="0" marR="0" indent="0" algn="l" defTabSz="932503" rtl="0" eaLnBrk="1" fontAlgn="auto" latinLnBrk="0" hangingPunct="1">
+              <a:lnSpc>
+                <a:spcPct val="90000"/>
+              </a:lnSpc>
+              <a:spcBef>
+                <a:spcPts val="0"/>
+              </a:spcBef>
+              <a:spcAft>
+                <a:spcPts val="340"/>
+              </a:spcAft>
+              <a:buClrTx/>
+              <a:buSzTx/>
+              <a:buFontTx/>
+              <a:buNone/>
+              <a:tabLst/>
+              <a:defRPr/>
+            </a:pPr>
+            <a:endParaRPr lang="en-US" sz="1000" kern="1200" dirty="0" smtClean="0">
+              <a:solidFill>
+                <a:schemeClr val="tx1"/>
+              </a:solidFill>
+              <a:effectLst/>
+              <a:latin typeface="Segoe UI Light" pitchFamily="34" charset="0"/>
+              <a:ea typeface="+mn-ea"/>
+              <a:cs typeface="+mn-cs"/>
+            </a:endParaRPr>
+          </a:p>
+          <a:p>
+            <a:endParaRPr lang="en-US" dirty="0" smtClean="0"/>
+          </a:p>
+          <a:p>
+            <a:endParaRPr lang="en-US" dirty="0"/>
+          </a:p>
+        </p:txBody>
+      </p:sp>
+      <p:sp>
+        <p:nvSpPr>
+          <p:cNvPr id="4" name="Header Placeholder 3"/>
+          <p:cNvSpPr>
+            <a:spLocks noGrp="1"/>
+          </p:cNvSpPr>
+          <p:nvPr>
+            <p:ph type="hdr" sz="quarter" idx="10"/>
+          </p:nvPr>
+        </p:nvSpPr>
+        <p:spPr/>
+        <p:txBody>
+          <a:bodyPr/>
+          <a:lstStyle/>
+          <a:p>
+            <a:r>
+              <a:rPr lang="en-US" smtClean="0"/>
+              <a:t>Build 2012</a:t>
+            </a:r>
+            <a:endParaRPr lang="en-US" dirty="0"/>
+          </a:p>
+        </p:txBody>
+      </p:sp>
+      <p:sp>
+        <p:nvSpPr>
+          <p:cNvPr id="5" name="Footer Placeholder 4"/>
+          <p:cNvSpPr>
+            <a:spLocks noGrp="1"/>
+          </p:cNvSpPr>
+          <p:nvPr>
+            <p:ph type="ftr" sz="quarter" idx="11"/>
+          </p:nvPr>
+        </p:nvSpPr>
+        <p:spPr/>
+        <p:txBody>
+          <a:bodyPr/>
+          <a:lstStyle/>
+          <a:p>
+            <a:pPr defTabSz="932929" eaLnBrk="0" hangingPunct="0"/>
+            <a:r>
+              <a:rPr lang="en-US" sz="400" smtClean="0">
+                <a:gradFill>
+                  <a:gsLst>
+                    <a:gs pos="0">
+                      <a:prstClr val="black"/>
+                    </a:gs>
+                    <a:gs pos="100000">
+                      <a:prstClr val="black"/>
+                    </a:gs>
+                  </a:gsLst>
+                  <a:lin ang="5400000" scaled="0"/>
+                </a:gradFill>
+                <a:latin typeface="Segoe UI" pitchFamily="34" charset="0"/>
+                <a:ea typeface="Segoe UI" pitchFamily="34" charset="0"/>
+                <a:cs typeface="Segoe UI" pitchFamily="34" charset="0"/>
+              </a:rPr>
+              <a:t>© 2012 Microsoft Corporation. All rights reserved. Microsoft, Windows, and other product names are or may be registered trademarks and/or trademarks in the U.S. and/or other countries.</a:t>
+            </a:r>
+          </a:p>
+          <a:p>
+            <a:pPr defTabSz="932929" eaLnBrk="0" hangingPunct="0"/>
+            <a:r>
+              <a:rPr lang="en-US" sz="400" smtClean="0">
+                <a:gradFill>
+                  <a:gsLst>
+                    <a:gs pos="0">
+                      <a:prstClr val="black"/>
+                    </a:gs>
+                    <a:gs pos="100000">
+                      <a:prstClr val="black"/>
+                    </a:gs>
+                  </a:gsLst>
+                  <a:lin ang="5400000" scaled="0"/>
+                </a:gradFill>
+                <a:latin typeface="Segoe UI" pitchFamily="34" charset="0"/>
+                <a:ea typeface="Segoe UI" pitchFamily="34" charset="0"/>
+                <a:cs typeface="Segoe UI" pitchFamily="34" charset="0"/>
+              </a:rPr>
+              <a:t>The information herein is for informational purposes only and represents the current view of Microsoft Corporation as of the date of this presentation.  Because Microsoft must respond to changing market conditions, it should not be interpreted to be a commitment on the part of Microsoft, and Microsoft cannot guarantee the accuracy of any information provided after the date of this presentation.  MICROSOFT MAKES NO WARRANTIES, EXPRESS, IMPLIED OR STATUTORY, AS TO THE INFORMATION IN THIS PRESENTATION.</a:t>
+            </a:r>
+            <a:endParaRPr lang="en-US" sz="400" dirty="0" smtClean="0">
+              <a:gradFill>
+                <a:gsLst>
+                  <a:gs pos="0">
+                    <a:prstClr val="black"/>
+                  </a:gs>
+                  <a:gs pos="100000">
+                    <a:prstClr val="black"/>
+                  </a:gs>
+                </a:gsLst>
+                <a:lin ang="5400000" scaled="0"/>
+              </a:gradFill>
+              <a:latin typeface="Segoe UI" pitchFamily="34" charset="0"/>
+              <a:ea typeface="Segoe UI" pitchFamily="34" charset="0"/>
+              <a:cs typeface="Segoe UI" pitchFamily="34" charset="0"/>
+            </a:endParaRPr>
+          </a:p>
+        </p:txBody>
+      </p:sp>
+      <p:sp>
+        <p:nvSpPr>
+          <p:cNvPr id="6" name="Date Placeholder 5"/>
+          <p:cNvSpPr>
+            <a:spLocks noGrp="1"/>
+          </p:cNvSpPr>
+          <p:nvPr>
+            <p:ph type="dt" idx="12"/>
+          </p:nvPr>
+        </p:nvSpPr>
+        <p:spPr/>
+        <p:txBody>
+          <a:bodyPr/>
+          <a:lstStyle/>
+          <a:p>
+            <a:fld id="{50A28030-5D59-4E14-AFE9-B93D391AF3AF}" type="datetime1">
+              <a:rPr lang="en-US" smtClean="0"/>
+              <a:t>10/28/2013</a:t>
+            </a:fld>
+            <a:endParaRPr lang="en-US" dirty="0"/>
+          </a:p>
+        </p:txBody>
+      </p:sp>
+      <p:sp>
+        <p:nvSpPr>
+          <p:cNvPr id="7" name="Slide Number Placeholder 6"/>
+          <p:cNvSpPr>
+            <a:spLocks noGrp="1"/>
+          </p:cNvSpPr>
+          <p:nvPr>
+            <p:ph type="sldNum" sz="quarter" idx="13"/>
+          </p:nvPr>
+        </p:nvSpPr>
+        <p:spPr/>
+        <p:txBody>
+          <a:bodyPr/>
+          <a:lstStyle/>
+          <a:p>
+            <a:fld id="{B4008EB6-D09E-4580-8CD6-DDB14511944F}" type="slidenum">
+              <a:rPr lang="en-US" smtClean="0"/>
+              <a:pPr/>
+              <a:t>34</a:t>
+            </a:fld>
+            <a:endParaRPr lang="en-US" dirty="0"/>
+          </a:p>
+        </p:txBody>
+      </p:sp>
+    </p:spTree>
+    <p:extLst>
+      <p:ext uri="{BB962C8B-B14F-4D97-AF65-F5344CB8AC3E}">
+        <p14:creationId xmlns:p14="http://schemas.microsoft.com/office/powerpoint/2010/main" val="1225578455"/>
+      </p:ext>
+    </p:extLst>
+  </p:cSld>
+  <p:clrMapOvr>
+    <a:masterClrMapping/>
+  </p:clrMapOvr>
+</p:notes>
+</file>
+
 <file path=ppt/slideLayouts/slideLayout1.xml><?xml version="1.0" encoding="utf-8"?>
 <p:sldLayout xmlns:a="http://schemas.openxmlformats.org/drawingml/2006/main" xmlns:r="http://schemas.openxmlformats.org/officeDocument/2006/relationships" xmlns:p="http://schemas.openxmlformats.org/presentationml/2006/main" preserve="1" userDrawn="1">
   <p:cSld name="Custom Layout">
@@ -2294,6 +2815,48 @@
 </file>
 
 <file path=ppt/slideLayouts/slideLayout16.xml><?xml version="1.0" encoding="utf-8"?>
+<p:sldLayout xmlns:a="http://schemas.openxmlformats.org/drawingml/2006/main" xmlns:r="http://schemas.openxmlformats.org/officeDocument/2006/relationships" xmlns:p="http://schemas.openxmlformats.org/presentationml/2006/main" userDrawn="1">
+  <p:cSld name="Blank Layout">
+    <p:spTree>
+      <p:nvGrpSpPr>
+        <p:cNvPr id="1" name=""/>
+        <p:cNvGrpSpPr/>
+        <p:nvPr/>
+      </p:nvGrpSpPr>
+      <p:grpSpPr>
+        <a:xfrm>
+          <a:off x="0" y="0"/>
+          <a:ext cx="0" cy="0"/>
+          <a:chOff x="0" y="0"/>
+          <a:chExt cx="0" cy="0"/>
+        </a:xfrm>
+      </p:grpSpPr>
+    </p:spTree>
+    <p:extLst>
+      <p:ext uri="{BB962C8B-B14F-4D97-AF65-F5344CB8AC3E}">
+        <p14:creationId xmlns:p14="http://schemas.microsoft.com/office/powerpoint/2010/main" val="3845872081"/>
+      </p:ext>
+    </p:extLst>
+  </p:cSld>
+  <p:clrMapOvr>
+    <a:masterClrMapping/>
+  </p:clrMapOvr>
+  <mc:AlternateContent xmlns:mc="http://schemas.openxmlformats.org/markup-compatibility/2006">
+    <mc:Choice xmlns:p14="http://schemas.microsoft.com/office/powerpoint/2010/main" Requires="p14">
+      <p:transition spd="med" p14:dur="700">
+        <p:fade/>
+      </p:transition>
+    </mc:Choice>
+    <mc:Fallback>
+      <p:transition spd="med">
+        <p:fade/>
+      </p:transition>
+    </mc:Fallback>
+  </mc:AlternateContent>
+</p:sldLayout>
+</file>
+
+<file path=ppt/slideLayouts/slideLayout17.xml><?xml version="1.0" encoding="utf-8"?>
 <p:sldLayout xmlns:a="http://schemas.openxmlformats.org/drawingml/2006/main" xmlns:r="http://schemas.openxmlformats.org/officeDocument/2006/relationships" xmlns:p="http://schemas.openxmlformats.org/presentationml/2006/main" type="title" preserve="1">
   <p:cSld name="Title Slide">
     <p:bg>
@@ -2437,7 +3000,7 @@
 </p:sldLayout>
 </file>
 
-<file path=ppt/slideLayouts/slideLayout17.xml><?xml version="1.0" encoding="utf-8"?>
+<file path=ppt/slideLayouts/slideLayout18.xml><?xml version="1.0" encoding="utf-8"?>
 <p:sldLayout xmlns:a="http://schemas.openxmlformats.org/drawingml/2006/main" xmlns:r="http://schemas.openxmlformats.org/officeDocument/2006/relationships" xmlns:p="http://schemas.openxmlformats.org/presentationml/2006/main" type="obj" preserve="1">
   <p:cSld name="Title and Content">
     <p:bg>
@@ -2588,7 +3151,7 @@
 </p:sldLayout>
 </file>
 
-<file path=ppt/slideLayouts/slideLayout18.xml><?xml version="1.0" encoding="utf-8"?>
+<file path=ppt/slideLayouts/slideLayout19.xml><?xml version="1.0" encoding="utf-8"?>
 <p:sldLayout xmlns:a="http://schemas.openxmlformats.org/drawingml/2006/main" xmlns:r="http://schemas.openxmlformats.org/officeDocument/2006/relationships" xmlns:p="http://schemas.openxmlformats.org/presentationml/2006/main" preserve="1" userDrawn="1">
   <p:cSld name="1_Title and Content">
     <p:spTree>
@@ -2760,105 +3323,6 @@
     <p:extLst>
       <p:ext uri="{BB962C8B-B14F-4D97-AF65-F5344CB8AC3E}">
         <p14:creationId xmlns:p14="http://schemas.microsoft.com/office/powerpoint/2010/main" val="466151035"/>
-      </p:ext>
-    </p:extLst>
-  </p:cSld>
-  <p:clrMapOvr>
-    <a:masterClrMapping/>
-  </p:clrMapOvr>
-  <p:timing>
-    <p:tnLst>
-      <p:par>
-        <p:cTn id="1" dur="indefinite" restart="never" nodeType="tmRoot"/>
-      </p:par>
-    </p:tnLst>
-  </p:timing>
-</p:sldLayout>
-</file>
-
-<file path=ppt/slideLayouts/slideLayout19.xml><?xml version="1.0" encoding="utf-8"?>
-<p:sldLayout xmlns:a="http://schemas.openxmlformats.org/drawingml/2006/main" xmlns:r="http://schemas.openxmlformats.org/officeDocument/2006/relationships" xmlns:p="http://schemas.openxmlformats.org/presentationml/2006/main" type="titleOnly" preserve="1">
-  <p:cSld name="Title Only">
-    <p:bg>
-      <p:bgPr>
-        <a:solidFill>
-          <a:srgbClr val="80B940"/>
-        </a:solidFill>
-        <a:effectLst/>
-      </p:bgPr>
-    </p:bg>
-    <p:spTree>
-      <p:nvGrpSpPr>
-        <p:cNvPr id="1" name=""/>
-        <p:cNvGrpSpPr/>
-        <p:nvPr/>
-      </p:nvGrpSpPr>
-      <p:grpSpPr>
-        <a:xfrm>
-          <a:off x="0" y="0"/>
-          <a:ext cx="0" cy="0"/>
-          <a:chOff x="0" y="0"/>
-          <a:chExt cx="0" cy="0"/>
-        </a:xfrm>
-      </p:grpSpPr>
-      <p:sp>
-        <p:nvSpPr>
-          <p:cNvPr id="2" name="Title 1"/>
-          <p:cNvSpPr>
-            <a:spLocks noGrp="1"/>
-          </p:cNvSpPr>
-          <p:nvPr>
-            <p:ph type="title"/>
-          </p:nvPr>
-        </p:nvSpPr>
-        <p:spPr/>
-        <p:txBody>
-          <a:bodyPr/>
-          <a:lstStyle/>
-          <a:p>
-            <a:r>
-              <a:rPr lang="en-US" smtClean="0"/>
-              <a:t>Click to edit Master title style</a:t>
-            </a:r>
-            <a:endParaRPr lang="en-US"/>
-          </a:p>
-        </p:txBody>
-      </p:sp>
-      <p:sp>
-        <p:nvSpPr>
-          <p:cNvPr id="5" name="Slide Number Placeholder 4"/>
-          <p:cNvSpPr>
-            <a:spLocks noGrp="1"/>
-          </p:cNvSpPr>
-          <p:nvPr>
-            <p:ph type="sldNum" sz="quarter" idx="12"/>
-          </p:nvPr>
-        </p:nvSpPr>
-        <p:spPr>
-          <a:xfrm>
-            <a:off x="8897420" y="6256216"/>
-            <a:ext cx="2743200" cy="365125"/>
-          </a:xfrm>
-          <a:prstGeom prst="rect">
-            <a:avLst/>
-          </a:prstGeom>
-        </p:spPr>
-        <p:txBody>
-          <a:bodyPr/>
-          <a:lstStyle/>
-          <a:p>
-            <a:fld id="{0A164282-434E-41D4-9582-783D542A7B68}" type="slidenum">
-              <a:rPr lang="en-US" smtClean="0"/>
-              <a:t>‹#›</a:t>
-            </a:fld>
-            <a:endParaRPr lang="en-US"/>
-          </a:p>
-        </p:txBody>
-      </p:sp>
-    </p:spTree>
-    <p:extLst>
-      <p:ext uri="{BB962C8B-B14F-4D97-AF65-F5344CB8AC3E}">
-        <p14:creationId xmlns:p14="http://schemas.microsoft.com/office/powerpoint/2010/main" val="1977518048"/>
       </p:ext>
     </p:extLst>
   </p:cSld>
@@ -2987,6 +3451,105 @@
 </file>
 
 <file path=ppt/slideLayouts/slideLayout20.xml><?xml version="1.0" encoding="utf-8"?>
+<p:sldLayout xmlns:a="http://schemas.openxmlformats.org/drawingml/2006/main" xmlns:r="http://schemas.openxmlformats.org/officeDocument/2006/relationships" xmlns:p="http://schemas.openxmlformats.org/presentationml/2006/main" type="titleOnly" preserve="1">
+  <p:cSld name="Title Only">
+    <p:bg>
+      <p:bgPr>
+        <a:solidFill>
+          <a:srgbClr val="80B940"/>
+        </a:solidFill>
+        <a:effectLst/>
+      </p:bgPr>
+    </p:bg>
+    <p:spTree>
+      <p:nvGrpSpPr>
+        <p:cNvPr id="1" name=""/>
+        <p:cNvGrpSpPr/>
+        <p:nvPr/>
+      </p:nvGrpSpPr>
+      <p:grpSpPr>
+        <a:xfrm>
+          <a:off x="0" y="0"/>
+          <a:ext cx="0" cy="0"/>
+          <a:chOff x="0" y="0"/>
+          <a:chExt cx="0" cy="0"/>
+        </a:xfrm>
+      </p:grpSpPr>
+      <p:sp>
+        <p:nvSpPr>
+          <p:cNvPr id="2" name="Title 1"/>
+          <p:cNvSpPr>
+            <a:spLocks noGrp="1"/>
+          </p:cNvSpPr>
+          <p:nvPr>
+            <p:ph type="title"/>
+          </p:nvPr>
+        </p:nvSpPr>
+        <p:spPr/>
+        <p:txBody>
+          <a:bodyPr/>
+          <a:lstStyle/>
+          <a:p>
+            <a:r>
+              <a:rPr lang="en-US" smtClean="0"/>
+              <a:t>Click to edit Master title style</a:t>
+            </a:r>
+            <a:endParaRPr lang="en-US"/>
+          </a:p>
+        </p:txBody>
+      </p:sp>
+      <p:sp>
+        <p:nvSpPr>
+          <p:cNvPr id="5" name="Slide Number Placeholder 4"/>
+          <p:cNvSpPr>
+            <a:spLocks noGrp="1"/>
+          </p:cNvSpPr>
+          <p:nvPr>
+            <p:ph type="sldNum" sz="quarter" idx="12"/>
+          </p:nvPr>
+        </p:nvSpPr>
+        <p:spPr>
+          <a:xfrm>
+            <a:off x="8897420" y="6256216"/>
+            <a:ext cx="2743200" cy="365125"/>
+          </a:xfrm>
+          <a:prstGeom prst="rect">
+            <a:avLst/>
+          </a:prstGeom>
+        </p:spPr>
+        <p:txBody>
+          <a:bodyPr/>
+          <a:lstStyle/>
+          <a:p>
+            <a:fld id="{0A164282-434E-41D4-9582-783D542A7B68}" type="slidenum">
+              <a:rPr lang="en-US" smtClean="0"/>
+              <a:t>‹#›</a:t>
+            </a:fld>
+            <a:endParaRPr lang="en-US"/>
+          </a:p>
+        </p:txBody>
+      </p:sp>
+    </p:spTree>
+    <p:extLst>
+      <p:ext uri="{BB962C8B-B14F-4D97-AF65-F5344CB8AC3E}">
+        <p14:creationId xmlns:p14="http://schemas.microsoft.com/office/powerpoint/2010/main" val="1977518048"/>
+      </p:ext>
+    </p:extLst>
+  </p:cSld>
+  <p:clrMapOvr>
+    <a:masterClrMapping/>
+  </p:clrMapOvr>
+  <p:timing>
+    <p:tnLst>
+      <p:par>
+        <p:cTn id="1" dur="indefinite" restart="never" nodeType="tmRoot"/>
+      </p:par>
+    </p:tnLst>
+  </p:timing>
+</p:sldLayout>
+</file>
+
+<file path=ppt/slideLayouts/slideLayout21.xml><?xml version="1.0" encoding="utf-8"?>
 <p:sldLayout xmlns:a="http://schemas.openxmlformats.org/drawingml/2006/main" xmlns:r="http://schemas.openxmlformats.org/officeDocument/2006/relationships" xmlns:p="http://schemas.openxmlformats.org/presentationml/2006/main" preserve="1" userDrawn="1">
   <p:cSld name="1_Title Only">
     <p:spTree>
@@ -3963,7 +4526,7 @@
 </p:sldLayout>
 </file>
 
-<file path=ppt/slideLayouts/slideLayout21.xml><?xml version="1.0" encoding="utf-8"?>
+<file path=ppt/slideLayouts/slideLayout22.xml><?xml version="1.0" encoding="utf-8"?>
 <p:sldLayout xmlns:a="http://schemas.openxmlformats.org/drawingml/2006/main" xmlns:r="http://schemas.openxmlformats.org/officeDocument/2006/relationships" xmlns:p="http://schemas.openxmlformats.org/presentationml/2006/main" type="blank" preserve="1">
   <p:cSld name="Blank">
     <p:bg>
@@ -4039,7 +4602,7 @@
 </p:sldLayout>
 </file>
 
-<file path=ppt/slideLayouts/slideLayout22.xml><?xml version="1.0" encoding="utf-8"?>
+<file path=ppt/slideLayouts/slideLayout23.xml><?xml version="1.0" encoding="utf-8"?>
 <p:sldLayout xmlns:a="http://schemas.openxmlformats.org/drawingml/2006/main" xmlns:r="http://schemas.openxmlformats.org/officeDocument/2006/relationships" xmlns:p="http://schemas.openxmlformats.org/presentationml/2006/main" type="blank" preserve="1">
   <p:cSld name="1_Blank">
     <p:bg>
@@ -4084,7 +4647,7 @@
 </p:sldLayout>
 </file>
 
-<file path=ppt/slideLayouts/slideLayout23.xml><?xml version="1.0" encoding="utf-8"?>
+<file path=ppt/slideLayouts/slideLayout24.xml><?xml version="1.0" encoding="utf-8"?>
 <p:sldLayout xmlns:a="http://schemas.openxmlformats.org/drawingml/2006/main" xmlns:r="http://schemas.openxmlformats.org/officeDocument/2006/relationships" xmlns:p="http://schemas.openxmlformats.org/presentationml/2006/main" type="objTx" preserve="1">
   <p:cSld name="Content with Caption">
     <p:bg>
@@ -4356,7 +4919,7 @@
 </p:sldLayout>
 </file>
 
-<file path=ppt/slideLayouts/slideLayout24.xml><?xml version="1.0" encoding="utf-8"?>
+<file path=ppt/slideLayouts/slideLayout25.xml><?xml version="1.0" encoding="utf-8"?>
 <p:sldLayout xmlns:a="http://schemas.openxmlformats.org/drawingml/2006/main" xmlns:r="http://schemas.openxmlformats.org/officeDocument/2006/relationships" xmlns:p="http://schemas.openxmlformats.org/presentationml/2006/main" type="title" preserve="1">
   <p:cSld name="Title Slide">
     <p:bg>
@@ -4500,7 +5063,7 @@
 </p:sldLayout>
 </file>
 
-<file path=ppt/slideLayouts/slideLayout25.xml><?xml version="1.0" encoding="utf-8"?>
+<file path=ppt/slideLayouts/slideLayout26.xml><?xml version="1.0" encoding="utf-8"?>
 <p:sldLayout xmlns:a="http://schemas.openxmlformats.org/drawingml/2006/main" xmlns:r="http://schemas.openxmlformats.org/officeDocument/2006/relationships" xmlns:p="http://schemas.openxmlformats.org/presentationml/2006/main" type="obj" preserve="1">
   <p:cSld name="Title and Content">
     <p:bg>
@@ -4651,7 +5214,7 @@
 </p:sldLayout>
 </file>
 
-<file path=ppt/slideLayouts/slideLayout26.xml><?xml version="1.0" encoding="utf-8"?>
+<file path=ppt/slideLayouts/slideLayout27.xml><?xml version="1.0" encoding="utf-8"?>
 <p:sldLayout xmlns:a="http://schemas.openxmlformats.org/drawingml/2006/main" xmlns:r="http://schemas.openxmlformats.org/officeDocument/2006/relationships" xmlns:p="http://schemas.openxmlformats.org/presentationml/2006/main" preserve="1" userDrawn="1">
   <p:cSld name="1_Title and Content">
     <p:spTree>
@@ -4839,7 +5402,7 @@
 </p:sldLayout>
 </file>
 
-<file path=ppt/slideLayouts/slideLayout27.xml><?xml version="1.0" encoding="utf-8"?>
+<file path=ppt/slideLayouts/slideLayout28.xml><?xml version="1.0" encoding="utf-8"?>
 <p:sldLayout xmlns:a="http://schemas.openxmlformats.org/drawingml/2006/main" xmlns:r="http://schemas.openxmlformats.org/officeDocument/2006/relationships" xmlns:p="http://schemas.openxmlformats.org/presentationml/2006/main" type="titleOnly" preserve="1">
   <p:cSld name="Title Only">
     <p:bg>
@@ -4938,7 +5501,7 @@
 </p:sldLayout>
 </file>
 
-<file path=ppt/slideLayouts/slideLayout28.xml><?xml version="1.0" encoding="utf-8"?>
+<file path=ppt/slideLayouts/slideLayout29.xml><?xml version="1.0" encoding="utf-8"?>
 <p:sldLayout xmlns:a="http://schemas.openxmlformats.org/drawingml/2006/main" xmlns:r="http://schemas.openxmlformats.org/officeDocument/2006/relationships" xmlns:p="http://schemas.openxmlformats.org/presentationml/2006/main" preserve="1" userDrawn="1">
   <p:cSld name="1_Title Only">
     <p:spTree>
@@ -5971,82 +6534,6 @@
 </p:sldLayout>
 </file>
 
-<file path=ppt/slideLayouts/slideLayout29.xml><?xml version="1.0" encoding="utf-8"?>
-<p:sldLayout xmlns:a="http://schemas.openxmlformats.org/drawingml/2006/main" xmlns:r="http://schemas.openxmlformats.org/officeDocument/2006/relationships" xmlns:p="http://schemas.openxmlformats.org/presentationml/2006/main" type="blank" preserve="1">
-  <p:cSld name="Blank">
-    <p:bg>
-      <p:bgPr>
-        <a:solidFill>
-          <a:srgbClr val="3C454F"/>
-        </a:solidFill>
-        <a:effectLst/>
-      </p:bgPr>
-    </p:bg>
-    <p:spTree>
-      <p:nvGrpSpPr>
-        <p:cNvPr id="1" name=""/>
-        <p:cNvGrpSpPr/>
-        <p:nvPr/>
-      </p:nvGrpSpPr>
-      <p:grpSpPr>
-        <a:xfrm>
-          <a:off x="0" y="0"/>
-          <a:ext cx="0" cy="0"/>
-          <a:chOff x="0" y="0"/>
-          <a:chExt cx="0" cy="0"/>
-        </a:xfrm>
-      </p:grpSpPr>
-      <p:sp>
-        <p:nvSpPr>
-          <p:cNvPr id="4" name="Slide Number Placeholder 3"/>
-          <p:cNvSpPr>
-            <a:spLocks noGrp="1"/>
-          </p:cNvSpPr>
-          <p:nvPr>
-            <p:ph type="sldNum" sz="quarter" idx="12"/>
-          </p:nvPr>
-        </p:nvSpPr>
-        <p:spPr>
-          <a:xfrm>
-            <a:off x="8903414" y="6256216"/>
-            <a:ext cx="2743200" cy="365125"/>
-          </a:xfrm>
-          <a:prstGeom prst="rect">
-            <a:avLst/>
-          </a:prstGeom>
-        </p:spPr>
-        <p:txBody>
-          <a:bodyPr/>
-          <a:lstStyle/>
-          <a:p>
-            <a:fld id="{0A164282-434E-41D4-9582-783D542A7B68}" type="slidenum">
-              <a:rPr lang="en-US" smtClean="0"/>
-              <a:t>‹#›</a:t>
-            </a:fld>
-            <a:endParaRPr lang="en-US"/>
-          </a:p>
-        </p:txBody>
-      </p:sp>
-    </p:spTree>
-    <p:extLst>
-      <p:ext uri="{BB962C8B-B14F-4D97-AF65-F5344CB8AC3E}">
-        <p14:creationId xmlns:p14="http://schemas.microsoft.com/office/powerpoint/2010/main" val="794198732"/>
-      </p:ext>
-    </p:extLst>
-  </p:cSld>
-  <p:clrMapOvr>
-    <a:masterClrMapping/>
-  </p:clrMapOvr>
-  <p:timing>
-    <p:tnLst>
-      <p:par>
-        <p:cTn id="1" dur="indefinite" restart="never" nodeType="tmRoot"/>
-      </p:par>
-    </p:tnLst>
-  </p:timing>
-</p:sldLayout>
-</file>
-
 <file path=ppt/slideLayouts/slideLayout3.xml><?xml version="1.0" encoding="utf-8"?>
 <p:sldLayout xmlns:a="http://schemas.openxmlformats.org/drawingml/2006/main" xmlns:r="http://schemas.openxmlformats.org/officeDocument/2006/relationships" xmlns:p="http://schemas.openxmlformats.org/presentationml/2006/main" preserve="1" userDrawn="1">
   <p:cSld name="2_Custom Layout">
@@ -6159,6 +6646,82 @@
 </file>
 
 <file path=ppt/slideLayouts/slideLayout30.xml><?xml version="1.0" encoding="utf-8"?>
+<p:sldLayout xmlns:a="http://schemas.openxmlformats.org/drawingml/2006/main" xmlns:r="http://schemas.openxmlformats.org/officeDocument/2006/relationships" xmlns:p="http://schemas.openxmlformats.org/presentationml/2006/main" type="blank" preserve="1">
+  <p:cSld name="Blank">
+    <p:bg>
+      <p:bgPr>
+        <a:solidFill>
+          <a:srgbClr val="3C454F"/>
+        </a:solidFill>
+        <a:effectLst/>
+      </p:bgPr>
+    </p:bg>
+    <p:spTree>
+      <p:nvGrpSpPr>
+        <p:cNvPr id="1" name=""/>
+        <p:cNvGrpSpPr/>
+        <p:nvPr/>
+      </p:nvGrpSpPr>
+      <p:grpSpPr>
+        <a:xfrm>
+          <a:off x="0" y="0"/>
+          <a:ext cx="0" cy="0"/>
+          <a:chOff x="0" y="0"/>
+          <a:chExt cx="0" cy="0"/>
+        </a:xfrm>
+      </p:grpSpPr>
+      <p:sp>
+        <p:nvSpPr>
+          <p:cNvPr id="4" name="Slide Number Placeholder 3"/>
+          <p:cNvSpPr>
+            <a:spLocks noGrp="1"/>
+          </p:cNvSpPr>
+          <p:nvPr>
+            <p:ph type="sldNum" sz="quarter" idx="12"/>
+          </p:nvPr>
+        </p:nvSpPr>
+        <p:spPr>
+          <a:xfrm>
+            <a:off x="8903414" y="6256216"/>
+            <a:ext cx="2743200" cy="365125"/>
+          </a:xfrm>
+          <a:prstGeom prst="rect">
+            <a:avLst/>
+          </a:prstGeom>
+        </p:spPr>
+        <p:txBody>
+          <a:bodyPr/>
+          <a:lstStyle/>
+          <a:p>
+            <a:fld id="{0A164282-434E-41D4-9582-783D542A7B68}" type="slidenum">
+              <a:rPr lang="en-US" smtClean="0"/>
+              <a:t>‹#›</a:t>
+            </a:fld>
+            <a:endParaRPr lang="en-US"/>
+          </a:p>
+        </p:txBody>
+      </p:sp>
+    </p:spTree>
+    <p:extLst>
+      <p:ext uri="{BB962C8B-B14F-4D97-AF65-F5344CB8AC3E}">
+        <p14:creationId xmlns:p14="http://schemas.microsoft.com/office/powerpoint/2010/main" val="794198732"/>
+      </p:ext>
+    </p:extLst>
+  </p:cSld>
+  <p:clrMapOvr>
+    <a:masterClrMapping/>
+  </p:clrMapOvr>
+  <p:timing>
+    <p:tnLst>
+      <p:par>
+        <p:cTn id="1" dur="indefinite" restart="never" nodeType="tmRoot"/>
+      </p:par>
+    </p:tnLst>
+  </p:timing>
+</p:sldLayout>
+</file>
+
+<file path=ppt/slideLayouts/slideLayout31.xml><?xml version="1.0" encoding="utf-8"?>
 <p:sldLayout xmlns:a="http://schemas.openxmlformats.org/drawingml/2006/main" xmlns:r="http://schemas.openxmlformats.org/officeDocument/2006/relationships" xmlns:p="http://schemas.openxmlformats.org/presentationml/2006/main" type="blank" preserve="1">
   <p:cSld name="1_Blank">
     <p:bg>
@@ -6203,7 +6766,7 @@
 </p:sldLayout>
 </file>
 
-<file path=ppt/slideLayouts/slideLayout31.xml><?xml version="1.0" encoding="utf-8"?>
+<file path=ppt/slideLayouts/slideLayout32.xml><?xml version="1.0" encoding="utf-8"?>
 <p:sldLayout xmlns:a="http://schemas.openxmlformats.org/drawingml/2006/main" xmlns:r="http://schemas.openxmlformats.org/officeDocument/2006/relationships" xmlns:p="http://schemas.openxmlformats.org/presentationml/2006/main" type="objTx" preserve="1">
   <p:cSld name="Content with Caption">
     <p:bg>
@@ -6475,7 +7038,7 @@
 </p:sldLayout>
 </file>
 
-<file path=ppt/slideLayouts/slideLayout32.xml><?xml version="1.0" encoding="utf-8"?>
+<file path=ppt/slideLayouts/slideLayout33.xml><?xml version="1.0" encoding="utf-8"?>
 <p:sldLayout xmlns:a="http://schemas.openxmlformats.org/drawingml/2006/main" xmlns:r="http://schemas.openxmlformats.org/officeDocument/2006/relationships" xmlns:p="http://schemas.openxmlformats.org/presentationml/2006/main" type="title" preserve="1">
   <p:cSld name="Title Slide">
     <p:bg>
@@ -6619,7 +7182,7 @@
 </p:sldLayout>
 </file>
 
-<file path=ppt/slideLayouts/slideLayout33.xml><?xml version="1.0" encoding="utf-8"?>
+<file path=ppt/slideLayouts/slideLayout34.xml><?xml version="1.0" encoding="utf-8"?>
 <p:sldLayout xmlns:a="http://schemas.openxmlformats.org/drawingml/2006/main" xmlns:r="http://schemas.openxmlformats.org/officeDocument/2006/relationships" xmlns:p="http://schemas.openxmlformats.org/presentationml/2006/main" type="obj" preserve="1">
   <p:cSld name="Title and Content">
     <p:bg>
@@ -6770,7 +7333,7 @@
 </p:sldLayout>
 </file>
 
-<file path=ppt/slideLayouts/slideLayout34.xml><?xml version="1.0" encoding="utf-8"?>
+<file path=ppt/slideLayouts/slideLayout35.xml><?xml version="1.0" encoding="utf-8"?>
 <p:sldLayout xmlns:a="http://schemas.openxmlformats.org/drawingml/2006/main" xmlns:r="http://schemas.openxmlformats.org/officeDocument/2006/relationships" xmlns:p="http://schemas.openxmlformats.org/presentationml/2006/main" preserve="1" userDrawn="1">
   <p:cSld name="1_Title and Content">
     <p:spTree>
@@ -6958,7 +7521,7 @@
 </p:sldLayout>
 </file>
 
-<file path=ppt/slideLayouts/slideLayout35.xml><?xml version="1.0" encoding="utf-8"?>
+<file path=ppt/slideLayouts/slideLayout36.xml><?xml version="1.0" encoding="utf-8"?>
 <p:sldLayout xmlns:a="http://schemas.openxmlformats.org/drawingml/2006/main" xmlns:r="http://schemas.openxmlformats.org/officeDocument/2006/relationships" xmlns:p="http://schemas.openxmlformats.org/presentationml/2006/main" type="titleOnly" preserve="1">
   <p:cSld name="Title Only">
     <p:bg>
@@ -7057,7 +7620,7 @@
 </p:sldLayout>
 </file>
 
-<file path=ppt/slideLayouts/slideLayout36.xml><?xml version="1.0" encoding="utf-8"?>
+<file path=ppt/slideLayouts/slideLayout37.xml><?xml version="1.0" encoding="utf-8"?>
 <p:sldLayout xmlns:a="http://schemas.openxmlformats.org/drawingml/2006/main" xmlns:r="http://schemas.openxmlformats.org/officeDocument/2006/relationships" xmlns:p="http://schemas.openxmlformats.org/presentationml/2006/main" preserve="1" userDrawn="1">
   <p:cSld name="1_Title Only">
     <p:spTree>
@@ -8092,7 +8655,7 @@
 </p:sldLayout>
 </file>
 
-<file path=ppt/slideLayouts/slideLayout37.xml><?xml version="1.0" encoding="utf-8"?>
+<file path=ppt/slideLayouts/slideLayout38.xml><?xml version="1.0" encoding="utf-8"?>
 <p:sldLayout xmlns:a="http://schemas.openxmlformats.org/drawingml/2006/main" xmlns:r="http://schemas.openxmlformats.org/officeDocument/2006/relationships" xmlns:p="http://schemas.openxmlformats.org/presentationml/2006/main" type="blank" preserve="1">
   <p:cSld name="Blank">
     <p:bg>
@@ -8168,7 +8731,7 @@
 </p:sldLayout>
 </file>
 
-<file path=ppt/slideLayouts/slideLayout38.xml><?xml version="1.0" encoding="utf-8"?>
+<file path=ppt/slideLayouts/slideLayout39.xml><?xml version="1.0" encoding="utf-8"?>
 <p:sldLayout xmlns:a="http://schemas.openxmlformats.org/drawingml/2006/main" xmlns:r="http://schemas.openxmlformats.org/officeDocument/2006/relationships" xmlns:p="http://schemas.openxmlformats.org/presentationml/2006/main" type="blank" preserve="1">
   <p:cSld name="1_Blank">
     <p:bg>
@@ -8213,7 +8776,118 @@
 </p:sldLayout>
 </file>
 
-<file path=ppt/slideLayouts/slideLayout39.xml><?xml version="1.0" encoding="utf-8"?>
+<file path=ppt/slideLayouts/slideLayout4.xml><?xml version="1.0" encoding="utf-8"?>
+<p:sldLayout xmlns:a="http://schemas.openxmlformats.org/drawingml/2006/main" xmlns:r="http://schemas.openxmlformats.org/officeDocument/2006/relationships" xmlns:p="http://schemas.openxmlformats.org/presentationml/2006/main" preserve="1" userDrawn="1">
+  <p:cSld name="3_Custom Layout">
+    <p:bg>
+      <p:bgPr>
+        <a:solidFill>
+          <a:srgbClr val="617081"/>
+        </a:solidFill>
+        <a:effectLst/>
+      </p:bgPr>
+    </p:bg>
+    <p:spTree>
+      <p:nvGrpSpPr>
+        <p:cNvPr id="1" name=""/>
+        <p:cNvGrpSpPr/>
+        <p:nvPr/>
+      </p:nvGrpSpPr>
+      <p:grpSpPr>
+        <a:xfrm>
+          <a:off x="0" y="0"/>
+          <a:ext cx="0" cy="0"/>
+          <a:chOff x="0" y="0"/>
+          <a:chExt cx="0" cy="0"/>
+        </a:xfrm>
+      </p:grpSpPr>
+      <p:sp>
+        <p:nvSpPr>
+          <p:cNvPr id="4" name="Title 3"/>
+          <p:cNvSpPr>
+            <a:spLocks noGrp="1"/>
+          </p:cNvSpPr>
+          <p:nvPr>
+            <p:ph type="title"/>
+          </p:nvPr>
+        </p:nvSpPr>
+        <p:spPr/>
+        <p:txBody>
+          <a:bodyPr anchor="b"/>
+          <a:lstStyle/>
+          <a:p>
+            <a:r>
+              <a:rPr lang="en-US" smtClean="0"/>
+              <a:t>Click to edit Master title style</a:t>
+            </a:r>
+            <a:endParaRPr lang="en-US"/>
+          </a:p>
+        </p:txBody>
+      </p:sp>
+      <p:sp>
+        <p:nvSpPr>
+          <p:cNvPr id="6" name="Text Placeholder 5"/>
+          <p:cNvSpPr>
+            <a:spLocks noGrp="1"/>
+          </p:cNvSpPr>
+          <p:nvPr>
+            <p:ph type="body" sz="quarter" idx="10" hasCustomPrompt="1"/>
+          </p:nvPr>
+        </p:nvSpPr>
+        <p:spPr>
+          <a:xfrm>
+            <a:off x="6638425" y="5517221"/>
+            <a:ext cx="5013325" cy="1026863"/>
+          </a:xfrm>
+        </p:spPr>
+        <p:txBody>
+          <a:bodyPr/>
+          <a:lstStyle>
+            <a:lvl1pPr>
+              <a:defRPr>
+                <a:solidFill>
+                  <a:srgbClr val="BDCD2C"/>
+                </a:solidFill>
+              </a:defRPr>
+            </a:lvl1pPr>
+          </a:lstStyle>
+          <a:p>
+            <a:pPr lvl="0"/>
+            <a:r>
+              <a:rPr lang="en-US" dirty="0" smtClean="0"/>
+              <a:t>Presenter Name</a:t>
+            </a:r>
+          </a:p>
+          <a:p>
+            <a:pPr lvl="0"/>
+            <a:r>
+              <a:rPr lang="en-US" dirty="0" smtClean="0"/>
+              <a:t>Title/role</a:t>
+            </a:r>
+          </a:p>
+        </p:txBody>
+      </p:sp>
+    </p:spTree>
+    <p:extLst>
+      <p:ext uri="{BB962C8B-B14F-4D97-AF65-F5344CB8AC3E}">
+        <p14:creationId xmlns:p14="http://schemas.microsoft.com/office/powerpoint/2010/main" val="127618525"/>
+      </p:ext>
+    </p:extLst>
+  </p:cSld>
+  <p:clrMapOvr>
+    <a:masterClrMapping/>
+  </p:clrMapOvr>
+  <p:timing>
+    <p:tnLst>
+      <p:par>
+        <p:cTn id="1" dur="indefinite" restart="never" nodeType="tmRoot"/>
+      </p:par>
+    </p:tnLst>
+  </p:timing>
+</p:sldLayout>
+</file>
+
+<file path=ppt/slideLayouts/slideLayout40.xml><?xml version="1.0" encoding="utf-8"?>
 <p:sldLayout xmlns:a="http://schemas.openxmlformats.org/drawingml/2006/main" xmlns:r="http://schemas.openxmlformats.org/officeDocument/2006/relationships" xmlns:p="http://schemas.openxmlformats.org/presentationml/2006/main" type="objTx" preserve="1">
   <p:cSld name="Content with Caption">
     <p:bg>
@@ -8485,118 +9159,7 @@
 </p:sldLayout>
 </file>
 
-<file path=ppt/slideLayouts/slideLayout4.xml><?xml version="1.0" encoding="utf-8"?>
-<p:sldLayout xmlns:a="http://schemas.openxmlformats.org/drawingml/2006/main" xmlns:r="http://schemas.openxmlformats.org/officeDocument/2006/relationships" xmlns:p="http://schemas.openxmlformats.org/presentationml/2006/main" preserve="1" userDrawn="1">
-  <p:cSld name="3_Custom Layout">
-    <p:bg>
-      <p:bgPr>
-        <a:solidFill>
-          <a:srgbClr val="617081"/>
-        </a:solidFill>
-        <a:effectLst/>
-      </p:bgPr>
-    </p:bg>
-    <p:spTree>
-      <p:nvGrpSpPr>
-        <p:cNvPr id="1" name=""/>
-        <p:cNvGrpSpPr/>
-        <p:nvPr/>
-      </p:nvGrpSpPr>
-      <p:grpSpPr>
-        <a:xfrm>
-          <a:off x="0" y="0"/>
-          <a:ext cx="0" cy="0"/>
-          <a:chOff x="0" y="0"/>
-          <a:chExt cx="0" cy="0"/>
-        </a:xfrm>
-      </p:grpSpPr>
-      <p:sp>
-        <p:nvSpPr>
-          <p:cNvPr id="4" name="Title 3"/>
-          <p:cNvSpPr>
-            <a:spLocks noGrp="1"/>
-          </p:cNvSpPr>
-          <p:nvPr>
-            <p:ph type="title"/>
-          </p:nvPr>
-        </p:nvSpPr>
-        <p:spPr/>
-        <p:txBody>
-          <a:bodyPr anchor="b"/>
-          <a:lstStyle/>
-          <a:p>
-            <a:r>
-              <a:rPr lang="en-US" smtClean="0"/>
-              <a:t>Click to edit Master title style</a:t>
-            </a:r>
-            <a:endParaRPr lang="en-US"/>
-          </a:p>
-        </p:txBody>
-      </p:sp>
-      <p:sp>
-        <p:nvSpPr>
-          <p:cNvPr id="6" name="Text Placeholder 5"/>
-          <p:cNvSpPr>
-            <a:spLocks noGrp="1"/>
-          </p:cNvSpPr>
-          <p:nvPr>
-            <p:ph type="body" sz="quarter" idx="10" hasCustomPrompt="1"/>
-          </p:nvPr>
-        </p:nvSpPr>
-        <p:spPr>
-          <a:xfrm>
-            <a:off x="6638425" y="5517221"/>
-            <a:ext cx="5013325" cy="1026863"/>
-          </a:xfrm>
-        </p:spPr>
-        <p:txBody>
-          <a:bodyPr/>
-          <a:lstStyle>
-            <a:lvl1pPr>
-              <a:defRPr>
-                <a:solidFill>
-                  <a:srgbClr val="BDCD2C"/>
-                </a:solidFill>
-              </a:defRPr>
-            </a:lvl1pPr>
-          </a:lstStyle>
-          <a:p>
-            <a:pPr lvl="0"/>
-            <a:r>
-              <a:rPr lang="en-US" dirty="0" smtClean="0"/>
-              <a:t>Presenter Name</a:t>
-            </a:r>
-          </a:p>
-          <a:p>
-            <a:pPr lvl="0"/>
-            <a:r>
-              <a:rPr lang="en-US" dirty="0" smtClean="0"/>
-              <a:t>Title/role</a:t>
-            </a:r>
-          </a:p>
-        </p:txBody>
-      </p:sp>
-    </p:spTree>
-    <p:extLst>
-      <p:ext uri="{BB962C8B-B14F-4D97-AF65-F5344CB8AC3E}">
-        <p14:creationId xmlns:p14="http://schemas.microsoft.com/office/powerpoint/2010/main" val="127618525"/>
-      </p:ext>
-    </p:extLst>
-  </p:cSld>
-  <p:clrMapOvr>
-    <a:masterClrMapping/>
-  </p:clrMapOvr>
-  <p:timing>
-    <p:tnLst>
-      <p:par>
-        <p:cTn id="1" dur="indefinite" restart="never" nodeType="tmRoot"/>
-      </p:par>
-    </p:tnLst>
-  </p:timing>
-</p:sldLayout>
-</file>
-
-<file path=ppt/slideLayouts/slideLayout40.xml><?xml version="1.0" encoding="utf-8"?>
+<file path=ppt/slideLayouts/slideLayout41.xml><?xml version="1.0" encoding="utf-8"?>
 <p:sldLayout xmlns:a="http://schemas.openxmlformats.org/drawingml/2006/main" xmlns:r="http://schemas.openxmlformats.org/officeDocument/2006/relationships" xmlns:p="http://schemas.openxmlformats.org/presentationml/2006/main" type="title" preserve="1">
   <p:cSld name="Title Slide">
     <p:bg>
@@ -8740,7 +9303,7 @@
 </p:sldLayout>
 </file>
 
-<file path=ppt/slideLayouts/slideLayout41.xml><?xml version="1.0" encoding="utf-8"?>
+<file path=ppt/slideLayouts/slideLayout42.xml><?xml version="1.0" encoding="utf-8"?>
 <p:sldLayout xmlns:a="http://schemas.openxmlformats.org/drawingml/2006/main" xmlns:r="http://schemas.openxmlformats.org/officeDocument/2006/relationships" xmlns:p="http://schemas.openxmlformats.org/presentationml/2006/main" type="obj" preserve="1">
   <p:cSld name="Title and Content">
     <p:bg>
@@ -8891,7 +9454,7 @@
 </p:sldLayout>
 </file>
 
-<file path=ppt/slideLayouts/slideLayout42.xml><?xml version="1.0" encoding="utf-8"?>
+<file path=ppt/slideLayouts/slideLayout43.xml><?xml version="1.0" encoding="utf-8"?>
 <p:sldLayout xmlns:a="http://schemas.openxmlformats.org/drawingml/2006/main" xmlns:r="http://schemas.openxmlformats.org/officeDocument/2006/relationships" xmlns:p="http://schemas.openxmlformats.org/presentationml/2006/main" preserve="1" userDrawn="1">
   <p:cSld name="1_Title and Content">
     <p:spTree>
@@ -9079,7 +9642,7 @@
 </p:sldLayout>
 </file>
 
-<file path=ppt/slideLayouts/slideLayout43.xml><?xml version="1.0" encoding="utf-8"?>
+<file path=ppt/slideLayouts/slideLayout44.xml><?xml version="1.0" encoding="utf-8"?>
 <p:sldLayout xmlns:a="http://schemas.openxmlformats.org/drawingml/2006/main" xmlns:r="http://schemas.openxmlformats.org/officeDocument/2006/relationships" xmlns:p="http://schemas.openxmlformats.org/presentationml/2006/main" type="titleOnly" preserve="1">
   <p:cSld name="Title Only">
     <p:bg>
@@ -9178,7 +9741,7 @@
 </p:sldLayout>
 </file>
 
-<file path=ppt/slideLayouts/slideLayout44.xml><?xml version="1.0" encoding="utf-8"?>
+<file path=ppt/slideLayouts/slideLayout45.xml><?xml version="1.0" encoding="utf-8"?>
 <p:sldLayout xmlns:a="http://schemas.openxmlformats.org/drawingml/2006/main" xmlns:r="http://schemas.openxmlformats.org/officeDocument/2006/relationships" xmlns:p="http://schemas.openxmlformats.org/presentationml/2006/main" preserve="1" userDrawn="1">
   <p:cSld name="1_Title Only">
     <p:spTree>
@@ -10213,7 +10776,7 @@
 </p:sldLayout>
 </file>
 
-<file path=ppt/slideLayouts/slideLayout45.xml><?xml version="1.0" encoding="utf-8"?>
+<file path=ppt/slideLayouts/slideLayout46.xml><?xml version="1.0" encoding="utf-8"?>
 <p:sldLayout xmlns:a="http://schemas.openxmlformats.org/drawingml/2006/main" xmlns:r="http://schemas.openxmlformats.org/officeDocument/2006/relationships" xmlns:p="http://schemas.openxmlformats.org/presentationml/2006/main" type="blank" preserve="1">
   <p:cSld name="Blank">
     <p:bg>
@@ -10289,7 +10852,7 @@
 </p:sldLayout>
 </file>
 
-<file path=ppt/slideLayouts/slideLayout46.xml><?xml version="1.0" encoding="utf-8"?>
+<file path=ppt/slideLayouts/slideLayout47.xml><?xml version="1.0" encoding="utf-8"?>
 <p:sldLayout xmlns:a="http://schemas.openxmlformats.org/drawingml/2006/main" xmlns:r="http://schemas.openxmlformats.org/officeDocument/2006/relationships" xmlns:p="http://schemas.openxmlformats.org/presentationml/2006/main" type="blank" preserve="1">
   <p:cSld name="1_Blank">
     <p:bg>
@@ -10334,7 +10897,7 @@
 </p:sldLayout>
 </file>
 
-<file path=ppt/slideLayouts/slideLayout47.xml><?xml version="1.0" encoding="utf-8"?>
+<file path=ppt/slideLayouts/slideLayout48.xml><?xml version="1.0" encoding="utf-8"?>
 <p:sldLayout xmlns:a="http://schemas.openxmlformats.org/drawingml/2006/main" xmlns:r="http://schemas.openxmlformats.org/officeDocument/2006/relationships" xmlns:p="http://schemas.openxmlformats.org/presentationml/2006/main" type="objTx" preserve="1">
   <p:cSld name="Content with Caption">
     <p:bg>
@@ -10606,7 +11169,7 @@
 </p:sldLayout>
 </file>
 
-<file path=ppt/slideLayouts/slideLayout48.xml><?xml version="1.0" encoding="utf-8"?>
+<file path=ppt/slideLayouts/slideLayout49.xml><?xml version="1.0" encoding="utf-8"?>
 <p:sldLayout xmlns:a="http://schemas.openxmlformats.org/drawingml/2006/main" xmlns:r="http://schemas.openxmlformats.org/officeDocument/2006/relationships" xmlns:p="http://schemas.openxmlformats.org/presentationml/2006/main" type="title" preserve="1">
   <p:cSld name="Title Slide">
     <p:bg>
@@ -10750,157 +11313,6 @@
 </p:sldLayout>
 </file>
 
-<file path=ppt/slideLayouts/slideLayout49.xml><?xml version="1.0" encoding="utf-8"?>
-<p:sldLayout xmlns:a="http://schemas.openxmlformats.org/drawingml/2006/main" xmlns:r="http://schemas.openxmlformats.org/officeDocument/2006/relationships" xmlns:p="http://schemas.openxmlformats.org/presentationml/2006/main" type="obj" preserve="1">
-  <p:cSld name="Title and Content">
-    <p:bg>
-      <p:bgPr>
-        <a:solidFill>
-          <a:schemeClr val="tx1"/>
-        </a:solidFill>
-        <a:effectLst/>
-      </p:bgPr>
-    </p:bg>
-    <p:spTree>
-      <p:nvGrpSpPr>
-        <p:cNvPr id="1" name=""/>
-        <p:cNvGrpSpPr/>
-        <p:nvPr/>
-      </p:nvGrpSpPr>
-      <p:grpSpPr>
-        <a:xfrm>
-          <a:off x="0" y="0"/>
-          <a:ext cx="0" cy="0"/>
-          <a:chOff x="0" y="0"/>
-          <a:chExt cx="0" cy="0"/>
-        </a:xfrm>
-      </p:grpSpPr>
-      <p:sp>
-        <p:nvSpPr>
-          <p:cNvPr id="2" name="Title 1"/>
-          <p:cNvSpPr>
-            <a:spLocks noGrp="1"/>
-          </p:cNvSpPr>
-          <p:nvPr>
-            <p:ph type="title"/>
-          </p:nvPr>
-        </p:nvSpPr>
-        <p:spPr/>
-        <p:txBody>
-          <a:bodyPr/>
-          <a:lstStyle/>
-          <a:p>
-            <a:r>
-              <a:rPr lang="en-US" smtClean="0"/>
-              <a:t>Click to edit Master title style</a:t>
-            </a:r>
-            <a:endParaRPr lang="en-US"/>
-          </a:p>
-        </p:txBody>
-      </p:sp>
-      <p:sp>
-        <p:nvSpPr>
-          <p:cNvPr id="3" name="Content Placeholder 2"/>
-          <p:cNvSpPr>
-            <a:spLocks noGrp="1"/>
-          </p:cNvSpPr>
-          <p:nvPr>
-            <p:ph idx="1"/>
-          </p:nvPr>
-        </p:nvSpPr>
-        <p:spPr/>
-        <p:txBody>
-          <a:bodyPr/>
-          <a:lstStyle/>
-          <a:p>
-            <a:pPr lvl="0"/>
-            <a:r>
-              <a:rPr lang="en-US" smtClean="0"/>
-              <a:t>Click to edit Master text styles</a:t>
-            </a:r>
-          </a:p>
-          <a:p>
-            <a:pPr lvl="1"/>
-            <a:r>
-              <a:rPr lang="en-US" smtClean="0"/>
-              <a:t>Second level</a:t>
-            </a:r>
-          </a:p>
-          <a:p>
-            <a:pPr lvl="2"/>
-            <a:r>
-              <a:rPr lang="en-US" smtClean="0"/>
-              <a:t>Third level</a:t>
-            </a:r>
-          </a:p>
-          <a:p>
-            <a:pPr lvl="3"/>
-            <a:r>
-              <a:rPr lang="en-US" smtClean="0"/>
-              <a:t>Fourth level</a:t>
-            </a:r>
-          </a:p>
-          <a:p>
-            <a:pPr lvl="4"/>
-            <a:r>
-              <a:rPr lang="en-US" smtClean="0"/>
-              <a:t>Fifth level</a:t>
-            </a:r>
-            <a:endParaRPr lang="en-US"/>
-          </a:p>
-        </p:txBody>
-      </p:sp>
-      <p:sp>
-        <p:nvSpPr>
-          <p:cNvPr id="6" name="Slide Number Placeholder 5"/>
-          <p:cNvSpPr>
-            <a:spLocks noGrp="1"/>
-          </p:cNvSpPr>
-          <p:nvPr>
-            <p:ph type="sldNum" sz="quarter" idx="12"/>
-          </p:nvPr>
-        </p:nvSpPr>
-        <p:spPr>
-          <a:xfrm>
-            <a:off x="8897420" y="6256216"/>
-            <a:ext cx="2743200" cy="365125"/>
-          </a:xfrm>
-          <a:prstGeom prst="rect">
-            <a:avLst/>
-          </a:prstGeom>
-        </p:spPr>
-        <p:txBody>
-          <a:bodyPr/>
-          <a:lstStyle/>
-          <a:p>
-            <a:fld id="{0A164282-434E-41D4-9582-783D542A7B68}" type="slidenum">
-              <a:rPr lang="en-US" smtClean="0"/>
-              <a:t>‹#›</a:t>
-            </a:fld>
-            <a:endParaRPr lang="en-US"/>
-          </a:p>
-        </p:txBody>
-      </p:sp>
-    </p:spTree>
-    <p:extLst>
-      <p:ext uri="{BB962C8B-B14F-4D97-AF65-F5344CB8AC3E}">
-        <p14:creationId xmlns:p14="http://schemas.microsoft.com/office/powerpoint/2010/main" val="3995736214"/>
-      </p:ext>
-    </p:extLst>
-  </p:cSld>
-  <p:clrMapOvr>
-    <a:masterClrMapping/>
-  </p:clrMapOvr>
-  <p:timing>
-    <p:tnLst>
-      <p:par>
-        <p:cTn id="1" dur="indefinite" restart="never" nodeType="tmRoot"/>
-      </p:par>
-    </p:tnLst>
-  </p:timing>
-</p:sldLayout>
-</file>
-
 <file path=ppt/slideLayouts/slideLayout5.xml><?xml version="1.0" encoding="utf-8"?>
 <p:sldLayout xmlns:a="http://schemas.openxmlformats.org/drawingml/2006/main" xmlns:r="http://schemas.openxmlformats.org/officeDocument/2006/relationships" xmlns:p="http://schemas.openxmlformats.org/presentationml/2006/main" preserve="1" userDrawn="1">
   <p:cSld name="4_Custom Layout">
@@ -11021,6 +11433,157 @@
 </file>
 
 <file path=ppt/slideLayouts/slideLayout50.xml><?xml version="1.0" encoding="utf-8"?>
+<p:sldLayout xmlns:a="http://schemas.openxmlformats.org/drawingml/2006/main" xmlns:r="http://schemas.openxmlformats.org/officeDocument/2006/relationships" xmlns:p="http://schemas.openxmlformats.org/presentationml/2006/main" type="obj" preserve="1">
+  <p:cSld name="Title and Content">
+    <p:bg>
+      <p:bgPr>
+        <a:solidFill>
+          <a:schemeClr val="tx1"/>
+        </a:solidFill>
+        <a:effectLst/>
+      </p:bgPr>
+    </p:bg>
+    <p:spTree>
+      <p:nvGrpSpPr>
+        <p:cNvPr id="1" name=""/>
+        <p:cNvGrpSpPr/>
+        <p:nvPr/>
+      </p:nvGrpSpPr>
+      <p:grpSpPr>
+        <a:xfrm>
+          <a:off x="0" y="0"/>
+          <a:ext cx="0" cy="0"/>
+          <a:chOff x="0" y="0"/>
+          <a:chExt cx="0" cy="0"/>
+        </a:xfrm>
+      </p:grpSpPr>
+      <p:sp>
+        <p:nvSpPr>
+          <p:cNvPr id="2" name="Title 1"/>
+          <p:cNvSpPr>
+            <a:spLocks noGrp="1"/>
+          </p:cNvSpPr>
+          <p:nvPr>
+            <p:ph type="title"/>
+          </p:nvPr>
+        </p:nvSpPr>
+        <p:spPr/>
+        <p:txBody>
+          <a:bodyPr/>
+          <a:lstStyle/>
+          <a:p>
+            <a:r>
+              <a:rPr lang="en-US" smtClean="0"/>
+              <a:t>Click to edit Master title style</a:t>
+            </a:r>
+            <a:endParaRPr lang="en-US"/>
+          </a:p>
+        </p:txBody>
+      </p:sp>
+      <p:sp>
+        <p:nvSpPr>
+          <p:cNvPr id="3" name="Content Placeholder 2"/>
+          <p:cNvSpPr>
+            <a:spLocks noGrp="1"/>
+          </p:cNvSpPr>
+          <p:nvPr>
+            <p:ph idx="1"/>
+          </p:nvPr>
+        </p:nvSpPr>
+        <p:spPr/>
+        <p:txBody>
+          <a:bodyPr/>
+          <a:lstStyle/>
+          <a:p>
+            <a:pPr lvl="0"/>
+            <a:r>
+              <a:rPr lang="en-US" smtClean="0"/>
+              <a:t>Click to edit Master text styles</a:t>
+            </a:r>
+          </a:p>
+          <a:p>
+            <a:pPr lvl="1"/>
+            <a:r>
+              <a:rPr lang="en-US" smtClean="0"/>
+              <a:t>Second level</a:t>
+            </a:r>
+          </a:p>
+          <a:p>
+            <a:pPr lvl="2"/>
+            <a:r>
+              <a:rPr lang="en-US" smtClean="0"/>
+              <a:t>Third level</a:t>
+            </a:r>
+          </a:p>
+          <a:p>
+            <a:pPr lvl="3"/>
+            <a:r>
+              <a:rPr lang="en-US" smtClean="0"/>
+              <a:t>Fourth level</a:t>
+            </a:r>
+          </a:p>
+          <a:p>
+            <a:pPr lvl="4"/>
+            <a:r>
+              <a:rPr lang="en-US" smtClean="0"/>
+              <a:t>Fifth level</a:t>
+            </a:r>
+            <a:endParaRPr lang="en-US"/>
+          </a:p>
+        </p:txBody>
+      </p:sp>
+      <p:sp>
+        <p:nvSpPr>
+          <p:cNvPr id="6" name="Slide Number Placeholder 5"/>
+          <p:cNvSpPr>
+            <a:spLocks noGrp="1"/>
+          </p:cNvSpPr>
+          <p:nvPr>
+            <p:ph type="sldNum" sz="quarter" idx="12"/>
+          </p:nvPr>
+        </p:nvSpPr>
+        <p:spPr>
+          <a:xfrm>
+            <a:off x="8897420" y="6256216"/>
+            <a:ext cx="2743200" cy="365125"/>
+          </a:xfrm>
+          <a:prstGeom prst="rect">
+            <a:avLst/>
+          </a:prstGeom>
+        </p:spPr>
+        <p:txBody>
+          <a:bodyPr/>
+          <a:lstStyle/>
+          <a:p>
+            <a:fld id="{0A164282-434E-41D4-9582-783D542A7B68}" type="slidenum">
+              <a:rPr lang="en-US" smtClean="0"/>
+              <a:t>‹#›</a:t>
+            </a:fld>
+            <a:endParaRPr lang="en-US"/>
+          </a:p>
+        </p:txBody>
+      </p:sp>
+    </p:spTree>
+    <p:extLst>
+      <p:ext uri="{BB962C8B-B14F-4D97-AF65-F5344CB8AC3E}">
+        <p14:creationId xmlns:p14="http://schemas.microsoft.com/office/powerpoint/2010/main" val="3995736214"/>
+      </p:ext>
+    </p:extLst>
+  </p:cSld>
+  <p:clrMapOvr>
+    <a:masterClrMapping/>
+  </p:clrMapOvr>
+  <p:timing>
+    <p:tnLst>
+      <p:par>
+        <p:cTn id="1" dur="indefinite" restart="never" nodeType="tmRoot"/>
+      </p:par>
+    </p:tnLst>
+  </p:timing>
+</p:sldLayout>
+</file>
+
+<file path=ppt/slideLayouts/slideLayout51.xml><?xml version="1.0" encoding="utf-8"?>
 <p:sldLayout xmlns:a="http://schemas.openxmlformats.org/drawingml/2006/main" xmlns:r="http://schemas.openxmlformats.org/officeDocument/2006/relationships" xmlns:p="http://schemas.openxmlformats.org/presentationml/2006/main" preserve="1" userDrawn="1">
   <p:cSld name="1_Title and Content">
     <p:spTree>
@@ -11208,7 +11771,7 @@
 </p:sldLayout>
 </file>
 
-<file path=ppt/slideLayouts/slideLayout51.xml><?xml version="1.0" encoding="utf-8"?>
+<file path=ppt/slideLayouts/slideLayout52.xml><?xml version="1.0" encoding="utf-8"?>
 <p:sldLayout xmlns:a="http://schemas.openxmlformats.org/drawingml/2006/main" xmlns:r="http://schemas.openxmlformats.org/officeDocument/2006/relationships" xmlns:p="http://schemas.openxmlformats.org/presentationml/2006/main" type="titleOnly" preserve="1">
   <p:cSld name="Title Only">
     <p:bg>
@@ -11307,7 +11870,7 @@
 </p:sldLayout>
 </file>
 
-<file path=ppt/slideLayouts/slideLayout52.xml><?xml version="1.0" encoding="utf-8"?>
+<file path=ppt/slideLayouts/slideLayout53.xml><?xml version="1.0" encoding="utf-8"?>
 <p:sldLayout xmlns:a="http://schemas.openxmlformats.org/drawingml/2006/main" xmlns:r="http://schemas.openxmlformats.org/officeDocument/2006/relationships" xmlns:p="http://schemas.openxmlformats.org/presentationml/2006/main" type="blank" preserve="1">
   <p:cSld name="Blank">
     <p:bg>
@@ -11383,7 +11946,7 @@
 </p:sldLayout>
 </file>
 
-<file path=ppt/slideLayouts/slideLayout53.xml><?xml version="1.0" encoding="utf-8"?>
+<file path=ppt/slideLayouts/slideLayout54.xml><?xml version="1.0" encoding="utf-8"?>
 <p:sldLayout xmlns:a="http://schemas.openxmlformats.org/drawingml/2006/main" xmlns:r="http://schemas.openxmlformats.org/officeDocument/2006/relationships" xmlns:p="http://schemas.openxmlformats.org/presentationml/2006/main" type="blank" preserve="1">
   <p:cSld name="1_Blank">
     <p:bg>
@@ -11428,7 +11991,7 @@
 </p:sldLayout>
 </file>
 
-<file path=ppt/slideLayouts/slideLayout54.xml><?xml version="1.0" encoding="utf-8"?>
+<file path=ppt/slideLayouts/slideLayout55.xml><?xml version="1.0" encoding="utf-8"?>
 <p:sldLayout xmlns:a="http://schemas.openxmlformats.org/drawingml/2006/main" xmlns:r="http://schemas.openxmlformats.org/officeDocument/2006/relationships" xmlns:p="http://schemas.openxmlformats.org/presentationml/2006/main" type="objTx" preserve="1">
   <p:cSld name="Content with Caption">
     <p:bg>
@@ -11700,7 +12263,7 @@
 </p:sldLayout>
 </file>
 
-<file path=ppt/slideLayouts/slideLayout55.xml><?xml version="1.0" encoding="utf-8"?>
+<file path=ppt/slideLayouts/slideLayout56.xml><?xml version="1.0" encoding="utf-8"?>
 <p:sldLayout xmlns:a="http://schemas.openxmlformats.org/drawingml/2006/main" xmlns:r="http://schemas.openxmlformats.org/officeDocument/2006/relationships" xmlns:p="http://schemas.openxmlformats.org/presentationml/2006/main" type="title" preserve="1">
   <p:cSld name="Title Slide">
     <p:bg>
@@ -11844,7 +12407,7 @@
 </p:sldLayout>
 </file>
 
-<file path=ppt/slideLayouts/slideLayout56.xml><?xml version="1.0" encoding="utf-8"?>
+<file path=ppt/slideLayouts/slideLayout57.xml><?xml version="1.0" encoding="utf-8"?>
 <p:sldLayout xmlns:a="http://schemas.openxmlformats.org/drawingml/2006/main" xmlns:r="http://schemas.openxmlformats.org/officeDocument/2006/relationships" xmlns:p="http://schemas.openxmlformats.org/presentationml/2006/main" type="obj" preserve="1">
   <p:cSld name="Title and Content">
     <p:bg>
@@ -11996,7 +12559,7 @@
 </p:sldLayout>
 </file>
 
-<file path=ppt/slideLayouts/slideLayout57.xml><?xml version="1.0" encoding="utf-8"?>
+<file path=ppt/slideLayouts/slideLayout58.xml><?xml version="1.0" encoding="utf-8"?>
 <p:sldLayout xmlns:a="http://schemas.openxmlformats.org/drawingml/2006/main" xmlns:r="http://schemas.openxmlformats.org/officeDocument/2006/relationships" xmlns:p="http://schemas.openxmlformats.org/presentationml/2006/main" preserve="1" userDrawn="1">
   <p:cSld name="1_Title and Content">
     <p:spTree>
@@ -12185,7 +12748,7 @@
 </p:sldLayout>
 </file>
 
-<file path=ppt/slideLayouts/slideLayout58.xml><?xml version="1.0" encoding="utf-8"?>
+<file path=ppt/slideLayouts/slideLayout59.xml><?xml version="1.0" encoding="utf-8"?>
 <p:sldLayout xmlns:a="http://schemas.openxmlformats.org/drawingml/2006/main" xmlns:r="http://schemas.openxmlformats.org/officeDocument/2006/relationships" xmlns:p="http://schemas.openxmlformats.org/presentationml/2006/main" type="titleOnly" preserve="1">
   <p:cSld name="Title Only">
     <p:bg>
@@ -12285,7 +12848,143 @@
 </p:sldLayout>
 </file>
 
-<file path=ppt/slideLayouts/slideLayout59.xml><?xml version="1.0" encoding="utf-8"?>
+<file path=ppt/slideLayouts/slideLayout6.xml><?xml version="1.0" encoding="utf-8"?>
+<p:sldLayout xmlns:a="http://schemas.openxmlformats.org/drawingml/2006/main" xmlns:r="http://schemas.openxmlformats.org/officeDocument/2006/relationships" xmlns:p="http://schemas.openxmlformats.org/presentationml/2006/main" type="title" preserve="1">
+  <p:cSld name="Title Slide">
+    <p:spTree>
+      <p:nvGrpSpPr>
+        <p:cNvPr id="1" name=""/>
+        <p:cNvGrpSpPr/>
+        <p:nvPr/>
+      </p:nvGrpSpPr>
+      <p:grpSpPr>
+        <a:xfrm>
+          <a:off x="0" y="0"/>
+          <a:ext cx="0" cy="0"/>
+          <a:chOff x="0" y="0"/>
+          <a:chExt cx="0" cy="0"/>
+        </a:xfrm>
+      </p:grpSpPr>
+      <p:sp>
+        <p:nvSpPr>
+          <p:cNvPr id="2" name="Title 1"/>
+          <p:cNvSpPr>
+            <a:spLocks noGrp="1"/>
+          </p:cNvSpPr>
+          <p:nvPr>
+            <p:ph type="ctrTitle"/>
+          </p:nvPr>
+        </p:nvSpPr>
+        <p:spPr>
+          <a:xfrm>
+            <a:off x="606175" y="1122363"/>
+            <a:ext cx="11034445" cy="2387600"/>
+          </a:xfrm>
+        </p:spPr>
+        <p:txBody>
+          <a:bodyPr anchor="b"/>
+          <a:lstStyle>
+            <a:lvl1pPr algn="l">
+              <a:defRPr sz="6000"/>
+            </a:lvl1pPr>
+          </a:lstStyle>
+          <a:p>
+            <a:r>
+              <a:rPr lang="en-US" dirty="0" smtClean="0"/>
+              <a:t>Click to edit Master title style</a:t>
+            </a:r>
+            <a:endParaRPr lang="en-US" dirty="0"/>
+          </a:p>
+        </p:txBody>
+      </p:sp>
+      <p:sp>
+        <p:nvSpPr>
+          <p:cNvPr id="3" name="Subtitle 2"/>
+          <p:cNvSpPr>
+            <a:spLocks noGrp="1"/>
+          </p:cNvSpPr>
+          <p:nvPr>
+            <p:ph type="subTitle" idx="1"/>
+          </p:nvPr>
+        </p:nvSpPr>
+        <p:spPr>
+          <a:xfrm>
+            <a:off x="606175" y="3602038"/>
+            <a:ext cx="11034445" cy="1655762"/>
+          </a:xfrm>
+        </p:spPr>
+        <p:txBody>
+          <a:bodyPr>
+            <a:normAutofit/>
+          </a:bodyPr>
+          <a:lstStyle>
+            <a:lvl1pPr marL="0" indent="0" algn="l">
+              <a:buNone/>
+              <a:defRPr sz="3600"/>
+            </a:lvl1pPr>
+            <a:lvl2pPr marL="457200" indent="0" algn="ctr">
+              <a:buNone/>
+              <a:defRPr sz="2000"/>
+            </a:lvl2pPr>
+            <a:lvl3pPr marL="914400" indent="0" algn="ctr">
+              <a:buNone/>
+              <a:defRPr sz="1800"/>
+            </a:lvl3pPr>
+            <a:lvl4pPr marL="1371600" indent="0" algn="ctr">
+              <a:buNone/>
+              <a:defRPr sz="1600"/>
+            </a:lvl4pPr>
+            <a:lvl5pPr marL="1828800" indent="0" algn="ctr">
+              <a:buNone/>
+              <a:defRPr sz="1600"/>
+            </a:lvl5pPr>
+            <a:lvl6pPr marL="2286000" indent="0" algn="ctr">
+              <a:buNone/>
+              <a:defRPr sz="1600"/>
+            </a:lvl6pPr>
+            <a:lvl7pPr marL="2743200" indent="0" algn="ctr">
+              <a:buNone/>
+              <a:defRPr sz="1600"/>
+            </a:lvl7pPr>
+            <a:lvl8pPr marL="3200400" indent="0" algn="ctr">
+              <a:buNone/>
+              <a:defRPr sz="1600"/>
+            </a:lvl8pPr>
+            <a:lvl9pPr marL="3657600" indent="0" algn="ctr">
+              <a:buNone/>
+              <a:defRPr sz="1600"/>
+            </a:lvl9pPr>
+          </a:lstStyle>
+          <a:p>
+            <a:r>
+              <a:rPr lang="en-US" dirty="0" smtClean="0"/>
+              <a:t>Click to edit Master subtitle style</a:t>
+            </a:r>
+            <a:endParaRPr lang="en-US" dirty="0"/>
+          </a:p>
+        </p:txBody>
+      </p:sp>
+    </p:spTree>
+    <p:extLst>
+      <p:ext uri="{BB962C8B-B14F-4D97-AF65-F5344CB8AC3E}">
+        <p14:creationId xmlns:p14="http://schemas.microsoft.com/office/powerpoint/2010/main" val="1878425647"/>
+      </p:ext>
+    </p:extLst>
+  </p:cSld>
+  <p:clrMapOvr>
+    <a:masterClrMapping/>
+  </p:clrMapOvr>
+  <p:timing>
+    <p:tnLst>
+      <p:par>
+        <p:cTn id="1" dur="indefinite" restart="never" nodeType="tmRoot"/>
+      </p:par>
+    </p:tnLst>
+  </p:timing>
+</p:sldLayout>
+</file>
+
+<file path=ppt/slideLayouts/slideLayout60.xml><?xml version="1.0" encoding="utf-8"?>
 <p:sldLayout xmlns:a="http://schemas.openxmlformats.org/drawingml/2006/main" xmlns:r="http://schemas.openxmlformats.org/officeDocument/2006/relationships" xmlns:p="http://schemas.openxmlformats.org/presentationml/2006/main" preserve="1" userDrawn="1">
   <p:cSld name="1_Title Only">
     <p:spTree>
@@ -13315,143 +14014,7 @@
 </p:sldLayout>
 </file>
 
-<file path=ppt/slideLayouts/slideLayout6.xml><?xml version="1.0" encoding="utf-8"?>
-<p:sldLayout xmlns:a="http://schemas.openxmlformats.org/drawingml/2006/main" xmlns:r="http://schemas.openxmlformats.org/officeDocument/2006/relationships" xmlns:p="http://schemas.openxmlformats.org/presentationml/2006/main" type="title" preserve="1">
-  <p:cSld name="Title Slide">
-    <p:spTree>
-      <p:nvGrpSpPr>
-        <p:cNvPr id="1" name=""/>
-        <p:cNvGrpSpPr/>
-        <p:nvPr/>
-      </p:nvGrpSpPr>
-      <p:grpSpPr>
-        <a:xfrm>
-          <a:off x="0" y="0"/>
-          <a:ext cx="0" cy="0"/>
-          <a:chOff x="0" y="0"/>
-          <a:chExt cx="0" cy="0"/>
-        </a:xfrm>
-      </p:grpSpPr>
-      <p:sp>
-        <p:nvSpPr>
-          <p:cNvPr id="2" name="Title 1"/>
-          <p:cNvSpPr>
-            <a:spLocks noGrp="1"/>
-          </p:cNvSpPr>
-          <p:nvPr>
-            <p:ph type="ctrTitle"/>
-          </p:nvPr>
-        </p:nvSpPr>
-        <p:spPr>
-          <a:xfrm>
-            <a:off x="606175" y="1122363"/>
-            <a:ext cx="11034445" cy="2387600"/>
-          </a:xfrm>
-        </p:spPr>
-        <p:txBody>
-          <a:bodyPr anchor="b"/>
-          <a:lstStyle>
-            <a:lvl1pPr algn="l">
-              <a:defRPr sz="6000"/>
-            </a:lvl1pPr>
-          </a:lstStyle>
-          <a:p>
-            <a:r>
-              <a:rPr lang="en-US" dirty="0" smtClean="0"/>
-              <a:t>Click to edit Master title style</a:t>
-            </a:r>
-            <a:endParaRPr lang="en-US" dirty="0"/>
-          </a:p>
-        </p:txBody>
-      </p:sp>
-      <p:sp>
-        <p:nvSpPr>
-          <p:cNvPr id="3" name="Subtitle 2"/>
-          <p:cNvSpPr>
-            <a:spLocks noGrp="1"/>
-          </p:cNvSpPr>
-          <p:nvPr>
-            <p:ph type="subTitle" idx="1"/>
-          </p:nvPr>
-        </p:nvSpPr>
-        <p:spPr>
-          <a:xfrm>
-            <a:off x="606175" y="3602038"/>
-            <a:ext cx="11034445" cy="1655762"/>
-          </a:xfrm>
-        </p:spPr>
-        <p:txBody>
-          <a:bodyPr>
-            <a:normAutofit/>
-          </a:bodyPr>
-          <a:lstStyle>
-            <a:lvl1pPr marL="0" indent="0" algn="l">
-              <a:buNone/>
-              <a:defRPr sz="3600"/>
-            </a:lvl1pPr>
-            <a:lvl2pPr marL="457200" indent="0" algn="ctr">
-              <a:buNone/>
-              <a:defRPr sz="2000"/>
-            </a:lvl2pPr>
-            <a:lvl3pPr marL="914400" indent="0" algn="ctr">
-              <a:buNone/>
-              <a:defRPr sz="1800"/>
-            </a:lvl3pPr>
-            <a:lvl4pPr marL="1371600" indent="0" algn="ctr">
-              <a:buNone/>
-              <a:defRPr sz="1600"/>
-            </a:lvl4pPr>
-            <a:lvl5pPr marL="1828800" indent="0" algn="ctr">
-              <a:buNone/>
-              <a:defRPr sz="1600"/>
-            </a:lvl5pPr>
-            <a:lvl6pPr marL="2286000" indent="0" algn="ctr">
-              <a:buNone/>
-              <a:defRPr sz="1600"/>
-            </a:lvl6pPr>
-            <a:lvl7pPr marL="2743200" indent="0" algn="ctr">
-              <a:buNone/>
-              <a:defRPr sz="1600"/>
-            </a:lvl7pPr>
-            <a:lvl8pPr marL="3200400" indent="0" algn="ctr">
-              <a:buNone/>
-              <a:defRPr sz="1600"/>
-            </a:lvl8pPr>
-            <a:lvl9pPr marL="3657600" indent="0" algn="ctr">
-              <a:buNone/>
-              <a:defRPr sz="1600"/>
-            </a:lvl9pPr>
-          </a:lstStyle>
-          <a:p>
-            <a:r>
-              <a:rPr lang="en-US" dirty="0" smtClean="0"/>
-              <a:t>Click to edit Master subtitle style</a:t>
-            </a:r>
-            <a:endParaRPr lang="en-US" dirty="0"/>
-          </a:p>
-        </p:txBody>
-      </p:sp>
-    </p:spTree>
-    <p:extLst>
-      <p:ext uri="{BB962C8B-B14F-4D97-AF65-F5344CB8AC3E}">
-        <p14:creationId xmlns:p14="http://schemas.microsoft.com/office/powerpoint/2010/main" val="1878425647"/>
-      </p:ext>
-    </p:extLst>
-  </p:cSld>
-  <p:clrMapOvr>
-    <a:masterClrMapping/>
-  </p:clrMapOvr>
-  <p:timing>
-    <p:tnLst>
-      <p:par>
-        <p:cTn id="1" dur="indefinite" restart="never" nodeType="tmRoot"/>
-      </p:par>
-    </p:tnLst>
-  </p:timing>
-</p:sldLayout>
-</file>
-
-<file path=ppt/slideLayouts/slideLayout60.xml><?xml version="1.0" encoding="utf-8"?>
+<file path=ppt/slideLayouts/slideLayout61.xml><?xml version="1.0" encoding="utf-8"?>
 <p:sldLayout xmlns:a="http://schemas.openxmlformats.org/drawingml/2006/main" xmlns:r="http://schemas.openxmlformats.org/officeDocument/2006/relationships" xmlns:p="http://schemas.openxmlformats.org/presentationml/2006/main" type="blank" preserve="1">
   <p:cSld name="Blank">
     <p:bg>
@@ -13528,7 +14091,7 @@
 </p:sldLayout>
 </file>
 
-<file path=ppt/slideLayouts/slideLayout61.xml><?xml version="1.0" encoding="utf-8"?>
+<file path=ppt/slideLayouts/slideLayout62.xml><?xml version="1.0" encoding="utf-8"?>
 <p:sldLayout xmlns:a="http://schemas.openxmlformats.org/drawingml/2006/main" xmlns:r="http://schemas.openxmlformats.org/officeDocument/2006/relationships" xmlns:p="http://schemas.openxmlformats.org/presentationml/2006/main" type="blank" preserve="1">
   <p:cSld name="1_Blank">
     <p:bg>
@@ -13573,7 +14136,7 @@
 </p:sldLayout>
 </file>
 
-<file path=ppt/slideLayouts/slideLayout62.xml><?xml version="1.0" encoding="utf-8"?>
+<file path=ppt/slideLayouts/slideLayout63.xml><?xml version="1.0" encoding="utf-8"?>
 <p:sldLayout xmlns:a="http://schemas.openxmlformats.org/drawingml/2006/main" xmlns:r="http://schemas.openxmlformats.org/officeDocument/2006/relationships" xmlns:p="http://schemas.openxmlformats.org/presentationml/2006/main" type="objTx" preserve="1">
   <p:cSld name="Content with Caption">
     <p:bg>
@@ -13846,7 +14409,7 @@
 </p:sldLayout>
 </file>
 
-<file path=ppt/slideLayouts/slideLayout63.xml><?xml version="1.0" encoding="utf-8"?>
+<file path=ppt/slideLayouts/slideLayout64.xml><?xml version="1.0" encoding="utf-8"?>
 <p:sldLayout xmlns:a="http://schemas.openxmlformats.org/drawingml/2006/main" xmlns:r="http://schemas.openxmlformats.org/officeDocument/2006/relationships" xmlns:p="http://schemas.openxmlformats.org/presentationml/2006/main" userDrawn="1">
   <p:cSld name="1_Logo on Background">
     <p:bg>
@@ -14010,7 +14573,7 @@
 </p:sldLayout>
 </file>
 
-<file path=ppt/slideLayouts/slideLayout64.xml><?xml version="1.0" encoding="utf-8"?>
+<file path=ppt/slideLayouts/slideLayout65.xml><?xml version="1.0" encoding="utf-8"?>
 <p:sldLayout xmlns:a="http://schemas.openxmlformats.org/drawingml/2006/main" xmlns:r="http://schemas.openxmlformats.org/officeDocument/2006/relationships" xmlns:p="http://schemas.openxmlformats.org/presentationml/2006/main" userDrawn="1">
   <p:cSld name="3_Custom Layout">
     <p:bg>
@@ -15076,7 +15639,7 @@
           <p:nvPr userDrawn="1"/>
         </p:nvPicPr>
         <p:blipFill>
-          <a:blip r:embed="rId12"/>
+          <a:blip r:embed="rId13"/>
           <a:stretch>
             <a:fillRect/>
           </a:stretch>
@@ -15473,6 +16036,7 @@
     <p:sldLayoutId id="2147483722" r:id="rId8"/>
     <p:sldLayoutId id="2147483772" r:id="rId9"/>
     <p:sldLayoutId id="2147483795" r:id="rId10"/>
+    <p:sldLayoutId id="2147483796" r:id="rId11"/>
   </p:sldLayoutIdLst>
   <p:timing>
     <p:tnLst>
@@ -23825,8 +24389,54 @@
             </a:pPr>
             <a:r>
               <a:rPr lang="en-US" dirty="0" smtClean="0"/>
-              <a:t>Running a real site requires several environments.</a:t>
-            </a:r>
+              <a:t>Running a real site requires </a:t>
+            </a:r>
+            <a:r>
+              <a:rPr lang="en-US" dirty="0" smtClean="0"/>
+              <a:t>multiple internal environments.</a:t>
+            </a:r>
+          </a:p>
+          <a:p>
+            <a:pPr marL="0" indent="0">
+              <a:buNone/>
+            </a:pPr>
+            <a:endParaRPr lang="en-US" dirty="0" smtClean="0"/>
+          </a:p>
+          <a:p>
+            <a:pPr marL="0" indent="0">
+              <a:buNone/>
+            </a:pPr>
+            <a:r>
+              <a:rPr lang="en-US" dirty="0" smtClean="0"/>
+              <a:t>Global availability requires </a:t>
+            </a:r>
+            <a:r>
+              <a:rPr lang="en-US" dirty="0"/>
+              <a:t>multiple </a:t>
+            </a:r>
+            <a:r>
+              <a:rPr lang="en-US" dirty="0" smtClean="0"/>
+              <a:t>worldwide deployments.</a:t>
+            </a:r>
+            <a:endParaRPr lang="en-US" dirty="0"/>
+          </a:p>
+          <a:p>
+            <a:pPr marL="0" indent="0">
+              <a:buNone/>
+            </a:pPr>
+            <a:endParaRPr lang="en-US" dirty="0"/>
+          </a:p>
+          <a:p>
+            <a:pPr marL="0" indent="0">
+              <a:buNone/>
+            </a:pPr>
+            <a:endParaRPr lang="en-US" dirty="0"/>
+          </a:p>
+          <a:p>
+            <a:pPr marL="0" indent="0">
+              <a:buNone/>
+            </a:pPr>
+            <a:endParaRPr lang="en-US" dirty="0" smtClean="0"/>
           </a:p>
         </p:txBody>
       </p:sp>
@@ -23900,7 +24510,15 @@
           <a:p>
             <a:r>
               <a:rPr lang="en-US" dirty="0" smtClean="0"/>
-              <a:t>Step 1: Continuous Integration</a:t>
+              <a:t>Step 1: </a:t>
+            </a:r>
+            <a:r>
+              <a:rPr lang="en-US" dirty="0" err="1" smtClean="0"/>
+              <a:t>Dev</a:t>
+            </a:r>
+            <a:r>
+              <a:rPr lang="en-US" dirty="0" smtClean="0"/>
+              <a:t> / Test environments</a:t>
             </a:r>
             <a:endParaRPr lang="en-US" dirty="0"/>
           </a:p>
@@ -23941,15 +24559,23 @@
             </a:pPr>
             <a:r>
               <a:rPr lang="en-US" dirty="0" smtClean="0"/>
-              <a:t>Bugs and issues in your code get harder to fix the longer it takes to find out about them.</a:t>
-            </a:r>
-            <a:endParaRPr lang="en-US" dirty="0"/>
+              <a:t>Setting up development web server environments is time consuming.</a:t>
+            </a:r>
           </a:p>
           <a:p>
             <a:pPr marL="0" indent="0">
               <a:buNone/>
             </a:pPr>
             <a:endParaRPr lang="en-US" dirty="0" smtClean="0"/>
+          </a:p>
+          <a:p>
+            <a:pPr marL="0" indent="0">
+              <a:buNone/>
+            </a:pPr>
+            <a:r>
+              <a:rPr lang="en-US" dirty="0" smtClean="0"/>
+              <a:t>You need to see your code running somewhere other than deployment before deploying.</a:t>
+            </a:r>
           </a:p>
         </p:txBody>
       </p:sp>
@@ -24023,7 +24649,15 @@
           <a:p>
             <a:r>
               <a:rPr lang="en-US" dirty="0" smtClean="0"/>
-              <a:t>Step 1: Continuous Integration</a:t>
+              <a:t>Step 1: </a:t>
+            </a:r>
+            <a:r>
+              <a:rPr lang="en-US" dirty="0" err="1"/>
+              <a:t>Dev</a:t>
+            </a:r>
+            <a:r>
+              <a:rPr lang="en-US" dirty="0"/>
+              <a:t> / Test environments</a:t>
             </a:r>
             <a:endParaRPr lang="en-US" dirty="0"/>
           </a:p>
@@ -24064,8 +24698,34 @@
             </a:pPr>
             <a:r>
               <a:rPr lang="en-US" dirty="0" smtClean="0"/>
-              <a:t>[Cory?]</a:t>
-            </a:r>
+              <a:t>Environment consistency via deployment setup in Windows Azure Web Sites or VM images.</a:t>
+            </a:r>
+          </a:p>
+          <a:p>
+            <a:pPr marL="0" indent="0">
+              <a:buNone/>
+            </a:pPr>
+            <a:endParaRPr lang="en-US" dirty="0"/>
+          </a:p>
+          <a:p>
+            <a:pPr marL="0" indent="0">
+              <a:buNone/>
+            </a:pPr>
+            <a:r>
+              <a:rPr lang="en-US" dirty="0" smtClean="0"/>
+              <a:t>Cost savings by paying only for what you need.</a:t>
+            </a:r>
+          </a:p>
+          <a:p>
+            <a:pPr marL="0" indent="0">
+              <a:buNone/>
+            </a:pPr>
+            <a:endParaRPr lang="en-US" dirty="0"/>
+          </a:p>
+          <a:p>
+            <a:pPr marL="0" indent="0">
+              <a:buNone/>
+            </a:pPr>
             <a:endParaRPr lang="en-US" dirty="0"/>
           </a:p>
         </p:txBody>
@@ -24123,87 +24783,1334 @@
           <a:chExt cx="0" cy="0"/>
         </a:xfrm>
       </p:grpSpPr>
-      <p:sp>
-        <p:nvSpPr>
-          <p:cNvPr id="2" name="Title 1"/>
-          <p:cNvSpPr>
-            <a:spLocks noGrp="1"/>
-          </p:cNvSpPr>
-          <p:nvPr>
-            <p:ph type="title"/>
-          </p:nvPr>
-        </p:nvSpPr>
-        <p:spPr/>
-        <p:txBody>
-          <a:bodyPr/>
-          <a:lstStyle/>
-          <a:p>
-            <a:r>
-              <a:rPr lang="en-US" dirty="0" smtClean="0"/>
-              <a:t>Scenario description</a:t>
-            </a:r>
-            <a:endParaRPr lang="en-US" dirty="0"/>
-          </a:p>
-        </p:txBody>
-      </p:sp>
-      <p:sp>
-        <p:nvSpPr>
-          <p:cNvPr id="3" name="Content Placeholder 2"/>
-          <p:cNvSpPr>
-            <a:spLocks noGrp="1"/>
-          </p:cNvSpPr>
-          <p:nvPr>
-            <p:ph idx="1"/>
-          </p:nvPr>
-        </p:nvSpPr>
-        <p:spPr/>
-        <p:txBody>
-          <a:bodyPr/>
-          <a:lstStyle/>
-          <a:p>
-            <a:pPr marL="0" indent="0">
-              <a:buNone/>
-            </a:pPr>
-            <a:r>
-              <a:rPr lang="en-US" dirty="0" smtClean="0"/>
-              <a:t>Running a real site requires several environments.</a:t>
-            </a:r>
-          </a:p>
-        </p:txBody>
-      </p:sp>
-      <p:sp>
-        <p:nvSpPr>
-          <p:cNvPr id="4" name="Slide Number Placeholder 3"/>
-          <p:cNvSpPr>
-            <a:spLocks noGrp="1"/>
-          </p:cNvSpPr>
-          <p:nvPr>
-            <p:ph type="sldNum" sz="quarter" idx="12"/>
-          </p:nvPr>
-        </p:nvSpPr>
-        <p:spPr/>
-        <p:txBody>
-          <a:bodyPr/>
-          <a:lstStyle/>
-          <a:p>
-            <a:fld id="{0A164282-434E-41D4-9582-783D542A7B68}" type="slidenum">
-              <a:rPr lang="en-US" smtClean="0"/>
-              <a:t>34</a:t>
-            </a:fld>
-            <a:endParaRPr lang="en-US"/>
-          </a:p>
-        </p:txBody>
-      </p:sp>
+      <p:grpSp>
+        <p:nvGrpSpPr>
+          <p:cNvPr id="15" name="Group 14"/>
+          <p:cNvGrpSpPr/>
+          <p:nvPr/>
+        </p:nvGrpSpPr>
+        <p:grpSpPr>
+          <a:xfrm>
+            <a:off x="138727" y="263732"/>
+            <a:ext cx="3679529" cy="2941124"/>
+            <a:chOff x="8411036" y="3864393"/>
+            <a:chExt cx="3753311" cy="2663944"/>
+          </a:xfrm>
+        </p:grpSpPr>
+        <p:sp>
+          <p:nvSpPr>
+            <p:cNvPr id="13" name="TextBox 12"/>
+            <p:cNvSpPr txBox="1"/>
+            <p:nvPr/>
+          </p:nvSpPr>
+          <p:spPr>
+            <a:xfrm>
+              <a:off x="8615511" y="5818552"/>
+              <a:ext cx="3497263" cy="709785"/>
+            </a:xfrm>
+            <a:prstGeom prst="rect">
+              <a:avLst/>
+            </a:prstGeom>
+            <a:noFill/>
+          </p:spPr>
+          <p:txBody>
+            <a:bodyPr wrap="square" rtlCol="0">
+              <a:spAutoFit/>
+            </a:bodyPr>
+            <a:lstStyle/>
+            <a:p>
+              <a:r>
+                <a:rPr lang="en-US" sz="1961" b="1" dirty="0" smtClean="0">
+                  <a:solidFill>
+                    <a:srgbClr val="FFFFFF"/>
+                  </a:solidFill>
+                  <a:cs typeface="Segoe UI Light" panose="020B0502040204020203" pitchFamily="34" charset="0"/>
+                </a:rPr>
+                <a:t>DISCOUNT</a:t>
+              </a:r>
+              <a:br>
+                <a:rPr lang="en-US" sz="1961" b="1" dirty="0" smtClean="0">
+                  <a:solidFill>
+                    <a:srgbClr val="FFFFFF"/>
+                  </a:solidFill>
+                  <a:cs typeface="Segoe UI Light" panose="020B0502040204020203" pitchFamily="34" charset="0"/>
+                </a:rPr>
+              </a:br>
+              <a:r>
+                <a:rPr lang="en-US" sz="1961" dirty="0" smtClean="0">
+                  <a:solidFill>
+                    <a:srgbClr val="FFFFFF"/>
+                  </a:solidFill>
+                  <a:cs typeface="Segoe UI Light" panose="020B0502040204020203" pitchFamily="34" charset="0"/>
+                </a:rPr>
+                <a:t>VIRTUAL MACHINES</a:t>
+              </a:r>
+              <a:endParaRPr lang="en-US" sz="1961" dirty="0">
+                <a:solidFill>
+                  <a:srgbClr val="FFFFFF"/>
+                </a:solidFill>
+              </a:endParaRPr>
+            </a:p>
+          </p:txBody>
+        </p:sp>
+        <p:sp>
+          <p:nvSpPr>
+            <p:cNvPr id="39" name="Rectangle 38"/>
+            <p:cNvSpPr/>
+            <p:nvPr/>
+          </p:nvSpPr>
+          <p:spPr>
+            <a:xfrm>
+              <a:off x="8411036" y="3864393"/>
+              <a:ext cx="3753311" cy="2109808"/>
+            </a:xfrm>
+            <a:prstGeom prst="rect">
+              <a:avLst/>
+            </a:prstGeom>
+          </p:spPr>
+          <p:txBody>
+            <a:bodyPr wrap="square" anchor="ctr">
+              <a:spAutoFit/>
+            </a:bodyPr>
+            <a:lstStyle/>
+            <a:p>
+              <a:pPr algn="ctr">
+                <a:lnSpc>
+                  <a:spcPct val="95000"/>
+                </a:lnSpc>
+                <a:buSzPct val="90000"/>
+              </a:pPr>
+              <a:r>
+                <a:rPr lang="en-US" sz="13528" dirty="0" smtClean="0">
+                  <a:solidFill>
+                    <a:schemeClr val="bg1"/>
+                  </a:solidFill>
+                  <a:latin typeface="Segoe UI Light" panose="020B0502040204020203" pitchFamily="34" charset="0"/>
+                  <a:cs typeface="Segoe UI Light" panose="020B0502040204020203" pitchFamily="34" charset="0"/>
+                </a:rPr>
+                <a:t>33</a:t>
+              </a:r>
+              <a:r>
+                <a:rPr lang="en-US" sz="13600" dirty="0">
+                  <a:solidFill>
+                    <a:srgbClr val="11C1FF"/>
+                  </a:solidFill>
+                  <a:latin typeface="Segoe UI Light" panose="020B0502040204020203" pitchFamily="34" charset="0"/>
+                  <a:cs typeface="Segoe UI Light" panose="020B0502040204020203" pitchFamily="34" charset="0"/>
+                </a:rPr>
+                <a:t>%</a:t>
+              </a:r>
+            </a:p>
+          </p:txBody>
+        </p:sp>
+      </p:grpSp>
+      <p:grpSp>
+        <p:nvGrpSpPr>
+          <p:cNvPr id="16" name="Group 15"/>
+          <p:cNvGrpSpPr/>
+          <p:nvPr/>
+        </p:nvGrpSpPr>
+        <p:grpSpPr>
+          <a:xfrm>
+            <a:off x="4419419" y="226803"/>
+            <a:ext cx="3534874" cy="2974136"/>
+            <a:chOff x="4563187" y="3841057"/>
+            <a:chExt cx="3605756" cy="2569844"/>
+          </a:xfrm>
+        </p:grpSpPr>
+        <p:sp>
+          <p:nvSpPr>
+            <p:cNvPr id="51" name="Rectangle 50"/>
+            <p:cNvSpPr/>
+            <p:nvPr/>
+          </p:nvSpPr>
+          <p:spPr>
+            <a:xfrm>
+              <a:off x="4563187" y="3841057"/>
+              <a:ext cx="3605756" cy="2109808"/>
+            </a:xfrm>
+            <a:prstGeom prst="rect">
+              <a:avLst/>
+            </a:prstGeom>
+          </p:spPr>
+          <p:txBody>
+            <a:bodyPr wrap="square" anchor="ctr">
+              <a:spAutoFit/>
+            </a:bodyPr>
+            <a:lstStyle/>
+            <a:p>
+              <a:pPr>
+                <a:lnSpc>
+                  <a:spcPct val="95000"/>
+                </a:lnSpc>
+                <a:buSzPct val="90000"/>
+              </a:pPr>
+              <a:r>
+                <a:rPr lang="en-US" sz="13528" dirty="0" smtClean="0">
+                  <a:solidFill>
+                    <a:schemeClr val="bg1"/>
+                  </a:solidFill>
+                  <a:latin typeface="Segoe UI Light" panose="020B0502040204020203" pitchFamily="34" charset="0"/>
+                  <a:cs typeface="Segoe UI Light" panose="020B0502040204020203" pitchFamily="34" charset="0"/>
+                </a:rPr>
+                <a:t>25</a:t>
+              </a:r>
+              <a:r>
+                <a:rPr lang="en-US" sz="13600" dirty="0">
+                  <a:solidFill>
+                    <a:srgbClr val="11C1FF"/>
+                  </a:solidFill>
+                  <a:latin typeface="Segoe UI Light" panose="020B0502040204020203" pitchFamily="34" charset="0"/>
+                  <a:cs typeface="Segoe UI Light" panose="020B0502040204020203" pitchFamily="34" charset="0"/>
+                </a:rPr>
+                <a:t>%</a:t>
+              </a:r>
+              <a:endParaRPr lang="en-US" sz="13600" dirty="0">
+                <a:solidFill>
+                  <a:srgbClr val="11C1FF"/>
+                </a:solidFill>
+                <a:latin typeface="Segoe UI Light" panose="020B0502040204020203" pitchFamily="34" charset="0"/>
+                <a:cs typeface="Segoe UI Light" panose="020B0502040204020203" pitchFamily="34" charset="0"/>
+              </a:endParaRPr>
+            </a:p>
+          </p:txBody>
+        </p:sp>
+        <p:sp>
+          <p:nvSpPr>
+            <p:cNvPr id="52" name="Rectangle 51"/>
+            <p:cNvSpPr/>
+            <p:nvPr/>
+          </p:nvSpPr>
+          <p:spPr>
+            <a:xfrm>
+              <a:off x="4597712" y="5587986"/>
+              <a:ext cx="3571231" cy="822915"/>
+            </a:xfrm>
+            <a:prstGeom prst="rect">
+              <a:avLst/>
+            </a:prstGeom>
+          </p:spPr>
+          <p:txBody>
+            <a:bodyPr wrap="square" anchor="ctr">
+              <a:spAutoFit/>
+            </a:bodyPr>
+            <a:lstStyle/>
+            <a:p>
+              <a:pPr>
+                <a:lnSpc>
+                  <a:spcPct val="95000"/>
+                </a:lnSpc>
+                <a:buSzPct val="90000"/>
+              </a:pPr>
+              <a:r>
+                <a:rPr lang="en-US" sz="1961" b="1" dirty="0">
+                  <a:solidFill>
+                    <a:srgbClr val="FFFFFF"/>
+                  </a:solidFill>
+                  <a:cs typeface="Segoe UI Light" panose="020B0502040204020203" pitchFamily="34" charset="0"/>
+                </a:rPr>
+                <a:t>DISCOUNT</a:t>
+              </a:r>
+              <a:br>
+                <a:rPr lang="en-US" sz="1961" b="1" dirty="0">
+                  <a:solidFill>
+                    <a:srgbClr val="FFFFFF"/>
+                  </a:solidFill>
+                  <a:cs typeface="Segoe UI Light" panose="020B0502040204020203" pitchFamily="34" charset="0"/>
+                </a:rPr>
+              </a:br>
+              <a:r>
+                <a:rPr lang="en-US" sz="1961" dirty="0" smtClean="0">
+                  <a:solidFill>
+                    <a:srgbClr val="FFFFFF"/>
+                  </a:solidFill>
+                  <a:cs typeface="Segoe UI Light" panose="020B0502040204020203" pitchFamily="34" charset="0"/>
+                </a:rPr>
+                <a:t>RESERVED </a:t>
+              </a:r>
+              <a:r>
+                <a:rPr lang="en-US" sz="1961" dirty="0">
+                  <a:solidFill>
+                    <a:srgbClr val="FFFFFF"/>
+                  </a:solidFill>
+                  <a:cs typeface="Segoe UI Light" panose="020B0502040204020203" pitchFamily="34" charset="0"/>
+                </a:rPr>
+                <a:t>WEB </a:t>
+              </a:r>
+              <a:r>
+                <a:rPr lang="en-US" sz="1961" dirty="0" smtClean="0">
+                  <a:solidFill>
+                    <a:srgbClr val="FFFFFF"/>
+                  </a:solidFill>
+                  <a:cs typeface="Segoe UI Light" panose="020B0502040204020203" pitchFamily="34" charset="0"/>
+                </a:rPr>
+                <a:t>SITES</a:t>
+              </a:r>
+              <a:br>
+                <a:rPr lang="en-US" sz="1961" dirty="0" smtClean="0">
+                  <a:solidFill>
+                    <a:srgbClr val="FFFFFF"/>
+                  </a:solidFill>
+                  <a:cs typeface="Segoe UI Light" panose="020B0502040204020203" pitchFamily="34" charset="0"/>
+                </a:rPr>
+              </a:br>
+              <a:r>
+                <a:rPr lang="en-US" sz="1961" dirty="0" smtClean="0">
+                  <a:solidFill>
+                    <a:srgbClr val="FFFFFF"/>
+                  </a:solidFill>
+                  <a:cs typeface="Segoe UI Light" panose="020B0502040204020203" pitchFamily="34" charset="0"/>
+                </a:rPr>
+                <a:t>CLOUD SERVICES, HDINSIGHT</a:t>
+              </a:r>
+              <a:endParaRPr lang="en-US" sz="1961" dirty="0">
+                <a:solidFill>
+                  <a:srgbClr val="FFFFFF"/>
+                </a:solidFill>
+                <a:cs typeface="Segoe UI Light" panose="020B0502040204020203" pitchFamily="34" charset="0"/>
+              </a:endParaRPr>
+            </a:p>
+          </p:txBody>
+        </p:sp>
+      </p:grpSp>
+      <p:cxnSp>
+        <p:nvCxnSpPr>
+          <p:cNvPr id="27" name="Straight Connector 26"/>
+          <p:cNvCxnSpPr/>
+          <p:nvPr/>
+        </p:nvCxnSpPr>
+        <p:spPr>
+          <a:xfrm>
+            <a:off x="4064288" y="487"/>
+            <a:ext cx="0" cy="6857027"/>
+          </a:xfrm>
+          <a:prstGeom prst="line">
+            <a:avLst/>
+          </a:prstGeom>
+          <a:ln>
+            <a:solidFill>
+              <a:srgbClr val="289FD7"/>
+            </a:solidFill>
+          </a:ln>
+        </p:spPr>
+        <p:style>
+          <a:lnRef idx="1">
+            <a:schemeClr val="accent1"/>
+          </a:lnRef>
+          <a:fillRef idx="0">
+            <a:schemeClr val="accent1"/>
+          </a:fillRef>
+          <a:effectRef idx="0">
+            <a:schemeClr val="accent1"/>
+          </a:effectRef>
+          <a:fontRef idx="minor">
+            <a:schemeClr val="tx1"/>
+          </a:fontRef>
+        </p:style>
+      </p:cxnSp>
+      <p:cxnSp>
+        <p:nvCxnSpPr>
+          <p:cNvPr id="31" name="Straight Connector 30"/>
+          <p:cNvCxnSpPr/>
+          <p:nvPr/>
+        </p:nvCxnSpPr>
+        <p:spPr>
+          <a:xfrm>
+            <a:off x="8097236" y="487"/>
+            <a:ext cx="0" cy="6857027"/>
+          </a:xfrm>
+          <a:prstGeom prst="line">
+            <a:avLst/>
+          </a:prstGeom>
+          <a:ln>
+            <a:solidFill>
+              <a:srgbClr val="289FD7"/>
+            </a:solidFill>
+          </a:ln>
+        </p:spPr>
+        <p:style>
+          <a:lnRef idx="1">
+            <a:schemeClr val="accent1"/>
+          </a:lnRef>
+          <a:fillRef idx="0">
+            <a:schemeClr val="accent1"/>
+          </a:fillRef>
+          <a:effectRef idx="0">
+            <a:schemeClr val="accent1"/>
+          </a:effectRef>
+          <a:fontRef idx="minor">
+            <a:schemeClr val="tx1"/>
+          </a:fontRef>
+        </p:style>
+      </p:cxnSp>
+      <p:cxnSp>
+        <p:nvCxnSpPr>
+          <p:cNvPr id="32" name="Straight Connector 31"/>
+          <p:cNvCxnSpPr/>
+          <p:nvPr/>
+        </p:nvCxnSpPr>
+        <p:spPr>
+          <a:xfrm>
+            <a:off x="865" y="3453445"/>
+            <a:ext cx="12190271" cy="0"/>
+          </a:xfrm>
+          <a:prstGeom prst="line">
+            <a:avLst/>
+          </a:prstGeom>
+          <a:ln>
+            <a:solidFill>
+              <a:srgbClr val="289FD7"/>
+            </a:solidFill>
+          </a:ln>
+        </p:spPr>
+        <p:style>
+          <a:lnRef idx="1">
+            <a:schemeClr val="accent1"/>
+          </a:lnRef>
+          <a:fillRef idx="0">
+            <a:schemeClr val="accent1"/>
+          </a:fillRef>
+          <a:effectRef idx="0">
+            <a:schemeClr val="accent1"/>
+          </a:effectRef>
+          <a:fontRef idx="minor">
+            <a:schemeClr val="tx1"/>
+          </a:fontRef>
+        </p:style>
+      </p:cxnSp>
+      <p:grpSp>
+        <p:nvGrpSpPr>
+          <p:cNvPr id="44" name="Group 43"/>
+          <p:cNvGrpSpPr/>
+          <p:nvPr/>
+        </p:nvGrpSpPr>
+        <p:grpSpPr>
+          <a:xfrm>
+            <a:off x="208050" y="3468689"/>
+            <a:ext cx="3679529" cy="2895745"/>
+            <a:chOff x="8411036" y="3977051"/>
+            <a:chExt cx="3753311" cy="2622841"/>
+          </a:xfrm>
+        </p:grpSpPr>
+        <p:sp>
+          <p:nvSpPr>
+            <p:cNvPr id="45" name="TextBox 44"/>
+            <p:cNvSpPr txBox="1"/>
+            <p:nvPr/>
+          </p:nvSpPr>
+          <p:spPr>
+            <a:xfrm>
+              <a:off x="8655806" y="5696326"/>
+              <a:ext cx="3497263" cy="903566"/>
+            </a:xfrm>
+            <a:prstGeom prst="rect">
+              <a:avLst/>
+            </a:prstGeom>
+            <a:noFill/>
+          </p:spPr>
+          <p:txBody>
+            <a:bodyPr wrap="square" rtlCol="0">
+              <a:spAutoFit/>
+            </a:bodyPr>
+            <a:lstStyle/>
+            <a:p>
+              <a:r>
+                <a:rPr lang="en-US" sz="1961" b="1" dirty="0" smtClean="0">
+                  <a:solidFill>
+                    <a:srgbClr val="FFFFFF"/>
+                  </a:solidFill>
+                  <a:cs typeface="Segoe UI Light" panose="020B0502040204020203" pitchFamily="34" charset="0"/>
+                </a:rPr>
+                <a:t>MONTHLY CREDIT</a:t>
+              </a:r>
+            </a:p>
+            <a:p>
+              <a:r>
+                <a:rPr lang="en-US" sz="1961" dirty="0" smtClean="0">
+                  <a:solidFill>
+                    <a:srgbClr val="FFFFFF"/>
+                  </a:solidFill>
+                  <a:cs typeface="Segoe UI Light" panose="020B0502040204020203" pitchFamily="34" charset="0"/>
+                </a:rPr>
+                <a:t>VISUAL STUDIO </a:t>
+              </a:r>
+              <a:r>
+                <a:rPr lang="en-US" sz="1961" b="1" dirty="0" smtClean="0">
+                  <a:solidFill>
+                    <a:srgbClr val="FFFFFF"/>
+                  </a:solidFill>
+                  <a:cs typeface="Segoe UI Light" panose="020B0502040204020203" pitchFamily="34" charset="0"/>
+                </a:rPr>
+                <a:t>ULTIMATE</a:t>
+              </a:r>
+              <a:r>
+                <a:rPr lang="en-US" sz="1961" dirty="0" smtClean="0">
+                  <a:solidFill>
+                    <a:srgbClr val="FFFFFF"/>
+                  </a:solidFill>
+                  <a:cs typeface="Segoe UI Light" panose="020B0502040204020203" pitchFamily="34" charset="0"/>
+                </a:rPr>
+                <a:t/>
+              </a:r>
+              <a:br>
+                <a:rPr lang="en-US" sz="1961" dirty="0" smtClean="0">
+                  <a:solidFill>
+                    <a:srgbClr val="FFFFFF"/>
+                  </a:solidFill>
+                  <a:cs typeface="Segoe UI Light" panose="020B0502040204020203" pitchFamily="34" charset="0"/>
+                </a:rPr>
+              </a:br>
+              <a:r>
+                <a:rPr lang="en-US" sz="1961" dirty="0" smtClean="0">
+                  <a:solidFill>
+                    <a:srgbClr val="FFFFFF"/>
+                  </a:solidFill>
+                  <a:cs typeface="Segoe UI Light" panose="020B0502040204020203" pitchFamily="34" charset="0"/>
+                </a:rPr>
+                <a:t>WITH MSDN</a:t>
+              </a:r>
+              <a:endParaRPr lang="en-US" sz="1961" dirty="0">
+                <a:solidFill>
+                  <a:srgbClr val="FFFFFF"/>
+                </a:solidFill>
+              </a:endParaRPr>
+            </a:p>
+          </p:txBody>
+        </p:sp>
+        <p:sp>
+          <p:nvSpPr>
+            <p:cNvPr id="46" name="Rectangle 45"/>
+            <p:cNvSpPr/>
+            <p:nvPr/>
+          </p:nvSpPr>
+          <p:spPr>
+            <a:xfrm>
+              <a:off x="8411036" y="3977051"/>
+              <a:ext cx="3753311" cy="1884491"/>
+            </a:xfrm>
+            <a:prstGeom prst="rect">
+              <a:avLst/>
+            </a:prstGeom>
+          </p:spPr>
+          <p:txBody>
+            <a:bodyPr wrap="square" anchor="ctr">
+              <a:spAutoFit/>
+            </a:bodyPr>
+            <a:lstStyle/>
+            <a:p>
+              <a:pPr algn="ctr">
+                <a:lnSpc>
+                  <a:spcPct val="95000"/>
+                </a:lnSpc>
+                <a:buSzPct val="90000"/>
+              </a:pPr>
+              <a:r>
+                <a:rPr lang="en-US" sz="13600" dirty="0" smtClean="0">
+                  <a:solidFill>
+                    <a:srgbClr val="11C1FF"/>
+                  </a:solidFill>
+                  <a:latin typeface="Segoe UI Light" panose="020B0502040204020203" pitchFamily="34" charset="0"/>
+                  <a:cs typeface="Segoe UI Light" panose="020B0502040204020203" pitchFamily="34" charset="0"/>
+                </a:rPr>
+                <a:t>$</a:t>
+              </a:r>
+              <a:r>
+                <a:rPr lang="en-US" sz="13600" dirty="0" smtClean="0">
+                  <a:solidFill>
+                    <a:schemeClr val="bg1"/>
+                  </a:solidFill>
+                  <a:latin typeface="Segoe UI Light" panose="020B0502040204020203" pitchFamily="34" charset="0"/>
+                  <a:cs typeface="Segoe UI Light" panose="020B0502040204020203" pitchFamily="34" charset="0"/>
+                </a:rPr>
+                <a:t>150</a:t>
+              </a:r>
+              <a:endParaRPr lang="en-US" sz="13600" dirty="0">
+                <a:solidFill>
+                  <a:schemeClr val="bg1"/>
+                </a:solidFill>
+                <a:latin typeface="Segoe UI Light" panose="020B0502040204020203" pitchFamily="34" charset="0"/>
+                <a:cs typeface="Segoe UI Light" panose="020B0502040204020203" pitchFamily="34" charset="0"/>
+              </a:endParaRPr>
+            </a:p>
+          </p:txBody>
+        </p:sp>
+      </p:grpSp>
+      <p:grpSp>
+        <p:nvGrpSpPr>
+          <p:cNvPr id="47" name="Group 46"/>
+          <p:cNvGrpSpPr/>
+          <p:nvPr/>
+        </p:nvGrpSpPr>
+        <p:grpSpPr>
+          <a:xfrm>
+            <a:off x="8450655" y="297561"/>
+            <a:ext cx="3679529" cy="2427189"/>
+            <a:chOff x="8411036" y="3977051"/>
+            <a:chExt cx="3753311" cy="2198444"/>
+          </a:xfrm>
+        </p:grpSpPr>
+        <p:sp>
+          <p:nvSpPr>
+            <p:cNvPr id="48" name="TextBox 47"/>
+            <p:cNvSpPr txBox="1"/>
+            <p:nvPr/>
+          </p:nvSpPr>
+          <p:spPr>
+            <a:xfrm>
+              <a:off x="8615511" y="5818552"/>
+              <a:ext cx="3497263" cy="356943"/>
+            </a:xfrm>
+            <a:prstGeom prst="rect">
+              <a:avLst/>
+            </a:prstGeom>
+            <a:noFill/>
+          </p:spPr>
+          <p:txBody>
+            <a:bodyPr wrap="square" rtlCol="0">
+              <a:spAutoFit/>
+            </a:bodyPr>
+            <a:lstStyle/>
+            <a:p>
+              <a:r>
+                <a:rPr lang="en-US" sz="1961" b="1" dirty="0" smtClean="0">
+                  <a:solidFill>
+                    <a:srgbClr val="FFFFFF"/>
+                  </a:solidFill>
+                  <a:cs typeface="Segoe UI Light" panose="020B0502040204020203" pitchFamily="34" charset="0"/>
+                </a:rPr>
+                <a:t>CREDIT CARD REQUIRED</a:t>
+              </a:r>
+            </a:p>
+          </p:txBody>
+        </p:sp>
+        <p:sp>
+          <p:nvSpPr>
+            <p:cNvPr id="49" name="Rectangle 48"/>
+            <p:cNvSpPr/>
+            <p:nvPr/>
+          </p:nvSpPr>
+          <p:spPr>
+            <a:xfrm>
+              <a:off x="8411036" y="3977051"/>
+              <a:ext cx="3753311" cy="1884491"/>
+            </a:xfrm>
+            <a:prstGeom prst="rect">
+              <a:avLst/>
+            </a:prstGeom>
+          </p:spPr>
+          <p:txBody>
+            <a:bodyPr wrap="square" anchor="ctr">
+              <a:spAutoFit/>
+            </a:bodyPr>
+            <a:lstStyle/>
+            <a:p>
+              <a:pPr algn="ctr">
+                <a:lnSpc>
+                  <a:spcPct val="95000"/>
+                </a:lnSpc>
+                <a:buSzPct val="90000"/>
+              </a:pPr>
+              <a:r>
+                <a:rPr lang="en-US" sz="13600" dirty="0" smtClean="0">
+                  <a:solidFill>
+                    <a:schemeClr val="bg1"/>
+                  </a:solidFill>
+                  <a:latin typeface="Segoe UI Light" panose="020B0502040204020203" pitchFamily="34" charset="0"/>
+                  <a:cs typeface="Segoe UI Light" panose="020B0502040204020203" pitchFamily="34" charset="0"/>
+                </a:rPr>
+                <a:t>NO</a:t>
+              </a:r>
+              <a:endParaRPr lang="en-US" sz="13600" dirty="0">
+                <a:solidFill>
+                  <a:schemeClr val="bg1"/>
+                </a:solidFill>
+                <a:latin typeface="Segoe UI Light" panose="020B0502040204020203" pitchFamily="34" charset="0"/>
+                <a:cs typeface="Segoe UI Light" panose="020B0502040204020203" pitchFamily="34" charset="0"/>
+              </a:endParaRPr>
+            </a:p>
+          </p:txBody>
+        </p:sp>
+      </p:grpSp>
+      <p:grpSp>
+        <p:nvGrpSpPr>
+          <p:cNvPr id="58" name="Group 57"/>
+          <p:cNvGrpSpPr/>
+          <p:nvPr/>
+        </p:nvGrpSpPr>
+        <p:grpSpPr>
+          <a:xfrm>
+            <a:off x="4229940" y="3429001"/>
+            <a:ext cx="3690585" cy="2935434"/>
+            <a:chOff x="8411036" y="3977051"/>
+            <a:chExt cx="3764589" cy="2658790"/>
+          </a:xfrm>
+        </p:grpSpPr>
+        <p:sp>
+          <p:nvSpPr>
+            <p:cNvPr id="59" name="TextBox 58"/>
+            <p:cNvSpPr txBox="1"/>
+            <p:nvPr/>
+          </p:nvSpPr>
+          <p:spPr>
+            <a:xfrm>
+              <a:off x="8678362" y="5732275"/>
+              <a:ext cx="3497263" cy="903566"/>
+            </a:xfrm>
+            <a:prstGeom prst="rect">
+              <a:avLst/>
+            </a:prstGeom>
+            <a:noFill/>
+          </p:spPr>
+          <p:txBody>
+            <a:bodyPr wrap="square" rtlCol="0">
+              <a:spAutoFit/>
+            </a:bodyPr>
+            <a:lstStyle/>
+            <a:p>
+              <a:r>
+                <a:rPr lang="en-US" sz="1961" b="1" dirty="0" smtClean="0">
+                  <a:solidFill>
+                    <a:srgbClr val="FFFFFF"/>
+                  </a:solidFill>
+                  <a:cs typeface="Segoe UI Light" panose="020B0502040204020203" pitchFamily="34" charset="0"/>
+                </a:rPr>
+                <a:t>MONTHLY CREDIT</a:t>
+              </a:r>
+            </a:p>
+            <a:p>
+              <a:r>
+                <a:rPr lang="en-US" sz="1961" dirty="0" smtClean="0">
+                  <a:solidFill>
+                    <a:srgbClr val="FFFFFF"/>
+                  </a:solidFill>
+                  <a:cs typeface="Segoe UI Light" panose="020B0502040204020203" pitchFamily="34" charset="0"/>
+                </a:rPr>
+                <a:t>VISUAL STUDIO </a:t>
+              </a:r>
+              <a:r>
+                <a:rPr lang="en-US" sz="1961" b="1" dirty="0" smtClean="0">
+                  <a:solidFill>
+                    <a:srgbClr val="FFFFFF"/>
+                  </a:solidFill>
+                  <a:cs typeface="Segoe UI Light" panose="020B0502040204020203" pitchFamily="34" charset="0"/>
+                </a:rPr>
+                <a:t>PREMIUM</a:t>
+              </a:r>
+            </a:p>
+            <a:p>
+              <a:r>
+                <a:rPr lang="en-US" sz="1961" dirty="0" smtClean="0">
+                  <a:solidFill>
+                    <a:srgbClr val="FFFFFF"/>
+                  </a:solidFill>
+                  <a:cs typeface="Segoe UI Light" panose="020B0502040204020203" pitchFamily="34" charset="0"/>
+                </a:rPr>
+                <a:t>WITH MSDN</a:t>
+              </a:r>
+              <a:endParaRPr lang="en-US" sz="1961" dirty="0">
+                <a:solidFill>
+                  <a:srgbClr val="FFFFFF"/>
+                </a:solidFill>
+              </a:endParaRPr>
+            </a:p>
+          </p:txBody>
+        </p:sp>
+        <p:sp>
+          <p:nvSpPr>
+            <p:cNvPr id="60" name="Rectangle 59"/>
+            <p:cNvSpPr/>
+            <p:nvPr/>
+          </p:nvSpPr>
+          <p:spPr>
+            <a:xfrm>
+              <a:off x="8411036" y="3977051"/>
+              <a:ext cx="3753311" cy="1884491"/>
+            </a:xfrm>
+            <a:prstGeom prst="rect">
+              <a:avLst/>
+            </a:prstGeom>
+          </p:spPr>
+          <p:txBody>
+            <a:bodyPr wrap="square" anchor="ctr">
+              <a:spAutoFit/>
+            </a:bodyPr>
+            <a:lstStyle/>
+            <a:p>
+              <a:pPr algn="ctr">
+                <a:lnSpc>
+                  <a:spcPct val="95000"/>
+                </a:lnSpc>
+                <a:buSzPct val="90000"/>
+              </a:pPr>
+              <a:r>
+                <a:rPr lang="en-US" sz="13600" dirty="0" smtClean="0">
+                  <a:solidFill>
+                    <a:srgbClr val="11C1FF"/>
+                  </a:solidFill>
+                  <a:latin typeface="Segoe UI Light" panose="020B0502040204020203" pitchFamily="34" charset="0"/>
+                  <a:cs typeface="Segoe UI Light" panose="020B0502040204020203" pitchFamily="34" charset="0"/>
+                </a:rPr>
+                <a:t>$</a:t>
+              </a:r>
+              <a:r>
+                <a:rPr lang="en-US" sz="13600" dirty="0" smtClean="0">
+                  <a:solidFill>
+                    <a:schemeClr val="bg1"/>
+                  </a:solidFill>
+                  <a:latin typeface="Segoe UI Light" panose="020B0502040204020203" pitchFamily="34" charset="0"/>
+                  <a:cs typeface="Segoe UI Light" panose="020B0502040204020203" pitchFamily="34" charset="0"/>
+                </a:rPr>
+                <a:t>100</a:t>
+              </a:r>
+              <a:endParaRPr lang="en-US" sz="13600" dirty="0">
+                <a:solidFill>
+                  <a:schemeClr val="bg1"/>
+                </a:solidFill>
+                <a:latin typeface="Segoe UI Light" panose="020B0502040204020203" pitchFamily="34" charset="0"/>
+                <a:cs typeface="Segoe UI Light" panose="020B0502040204020203" pitchFamily="34" charset="0"/>
+              </a:endParaRPr>
+            </a:p>
+          </p:txBody>
+        </p:sp>
+      </p:grpSp>
+      <p:grpSp>
+        <p:nvGrpSpPr>
+          <p:cNvPr id="61" name="Group 60"/>
+          <p:cNvGrpSpPr/>
+          <p:nvPr/>
+        </p:nvGrpSpPr>
+        <p:grpSpPr>
+          <a:xfrm>
+            <a:off x="8262885" y="3393388"/>
+            <a:ext cx="3816737" cy="2971047"/>
+            <a:chOff x="8411035" y="3977051"/>
+            <a:chExt cx="3893271" cy="2691047"/>
+          </a:xfrm>
+        </p:grpSpPr>
+        <p:sp>
+          <p:nvSpPr>
+            <p:cNvPr id="62" name="TextBox 61"/>
+            <p:cNvSpPr txBox="1"/>
+            <p:nvPr/>
+          </p:nvSpPr>
+          <p:spPr>
+            <a:xfrm>
+              <a:off x="8411035" y="5764532"/>
+              <a:ext cx="3893271" cy="903566"/>
+            </a:xfrm>
+            <a:prstGeom prst="rect">
+              <a:avLst/>
+            </a:prstGeom>
+            <a:noFill/>
+          </p:spPr>
+          <p:txBody>
+            <a:bodyPr wrap="square" rtlCol="0">
+              <a:spAutoFit/>
+            </a:bodyPr>
+            <a:lstStyle/>
+            <a:p>
+              <a:r>
+                <a:rPr lang="en-US" sz="1961" b="1" dirty="0" smtClean="0">
+                  <a:solidFill>
+                    <a:srgbClr val="FFFFFF"/>
+                  </a:solidFill>
+                  <a:cs typeface="Segoe UI Light" panose="020B0502040204020203" pitchFamily="34" charset="0"/>
+                </a:rPr>
+                <a:t>MONTHLY CREDIT</a:t>
+              </a:r>
+            </a:p>
+            <a:p>
+              <a:r>
+                <a:rPr lang="en-US" sz="1961" dirty="0" smtClean="0">
+                  <a:solidFill>
+                    <a:srgbClr val="FFFFFF"/>
+                  </a:solidFill>
+                  <a:cs typeface="Segoe UI Light" panose="020B0502040204020203" pitchFamily="34" charset="0"/>
+                </a:rPr>
+                <a:t>VISUAL STUDIO </a:t>
+              </a:r>
+              <a:r>
+                <a:rPr lang="en-US" sz="1961" b="1" dirty="0" smtClean="0">
+                  <a:solidFill>
+                    <a:srgbClr val="FFFFFF"/>
+                  </a:solidFill>
+                  <a:cs typeface="Segoe UI Light" panose="020B0502040204020203" pitchFamily="34" charset="0"/>
+                </a:rPr>
+                <a:t>PROFESSIONAL</a:t>
+              </a:r>
+              <a:r>
+                <a:rPr lang="en-US" sz="1961" dirty="0" smtClean="0">
+                  <a:solidFill>
+                    <a:srgbClr val="FFFFFF"/>
+                  </a:solidFill>
+                  <a:cs typeface="Segoe UI Light" panose="020B0502040204020203" pitchFamily="34" charset="0"/>
+                </a:rPr>
+                <a:t> WITH MSDN</a:t>
+              </a:r>
+              <a:endParaRPr lang="en-US" sz="1961" dirty="0">
+                <a:solidFill>
+                  <a:srgbClr val="FFFFFF"/>
+                </a:solidFill>
+              </a:endParaRPr>
+            </a:p>
+          </p:txBody>
+        </p:sp>
+        <p:sp>
+          <p:nvSpPr>
+            <p:cNvPr id="63" name="Rectangle 62"/>
+            <p:cNvSpPr/>
+            <p:nvPr/>
+          </p:nvSpPr>
+          <p:spPr>
+            <a:xfrm>
+              <a:off x="8411036" y="3977051"/>
+              <a:ext cx="3753311" cy="1884491"/>
+            </a:xfrm>
+            <a:prstGeom prst="rect">
+              <a:avLst/>
+            </a:prstGeom>
+          </p:spPr>
+          <p:txBody>
+            <a:bodyPr wrap="square" anchor="ctr">
+              <a:spAutoFit/>
+            </a:bodyPr>
+            <a:lstStyle/>
+            <a:p>
+              <a:pPr algn="ctr">
+                <a:lnSpc>
+                  <a:spcPct val="95000"/>
+                </a:lnSpc>
+                <a:buSzPct val="90000"/>
+              </a:pPr>
+              <a:r>
+                <a:rPr lang="en-US" sz="13600" dirty="0" smtClean="0">
+                  <a:solidFill>
+                    <a:srgbClr val="11C1FF"/>
+                  </a:solidFill>
+                  <a:latin typeface="Segoe UI Light" panose="020B0502040204020203" pitchFamily="34" charset="0"/>
+                  <a:cs typeface="Segoe UI Light" panose="020B0502040204020203" pitchFamily="34" charset="0"/>
+                </a:rPr>
+                <a:t>$</a:t>
+              </a:r>
+              <a:r>
+                <a:rPr lang="en-US" sz="13600" dirty="0">
+                  <a:solidFill>
+                    <a:schemeClr val="bg1"/>
+                  </a:solidFill>
+                  <a:latin typeface="Segoe UI Light" panose="020B0502040204020203" pitchFamily="34" charset="0"/>
+                  <a:cs typeface="Segoe UI Light" panose="020B0502040204020203" pitchFamily="34" charset="0"/>
+                </a:rPr>
+                <a:t>5</a:t>
+              </a:r>
+              <a:r>
+                <a:rPr lang="en-US" sz="13600" dirty="0" smtClean="0">
+                  <a:solidFill>
+                    <a:schemeClr val="bg1"/>
+                  </a:solidFill>
+                  <a:latin typeface="Segoe UI Light" panose="020B0502040204020203" pitchFamily="34" charset="0"/>
+                  <a:cs typeface="Segoe UI Light" panose="020B0502040204020203" pitchFamily="34" charset="0"/>
+                </a:rPr>
+                <a:t>0</a:t>
+              </a:r>
+              <a:endParaRPr lang="en-US" sz="13600" dirty="0">
+                <a:solidFill>
+                  <a:schemeClr val="bg1"/>
+                </a:solidFill>
+                <a:latin typeface="Segoe UI Light" panose="020B0502040204020203" pitchFamily="34" charset="0"/>
+                <a:cs typeface="Segoe UI Light" panose="020B0502040204020203" pitchFamily="34" charset="0"/>
+              </a:endParaRPr>
+            </a:p>
+          </p:txBody>
+        </p:sp>
+      </p:grpSp>
     </p:spTree>
     <p:extLst>
       <p:ext uri="{BB962C8B-B14F-4D97-AF65-F5344CB8AC3E}">
-        <p14:creationId xmlns:p14="http://schemas.microsoft.com/office/powerpoint/2010/main" val="3947867443"/>
+        <p14:creationId xmlns:p14="http://schemas.microsoft.com/office/powerpoint/2010/main" val="2369948323"/>
       </p:ext>
     </p:extLst>
   </p:cSld>
   <p:clrMapOvr>
     <a:masterClrMapping/>
   </p:clrMapOvr>
+  <mc:AlternateContent xmlns:mc="http://schemas.openxmlformats.org/markup-compatibility/2006">
+    <mc:Choice xmlns:p14="http://schemas.microsoft.com/office/powerpoint/2010/main" Requires="p14">
+      <p:transition spd="med" p14:dur="700">
+        <p:fade/>
+      </p:transition>
+    </mc:Choice>
+    <mc:Fallback>
+      <p:transition spd="med">
+        <p:fade/>
+      </p:transition>
+    </mc:Fallback>
+  </mc:AlternateContent>
+  <p:timing>
+    <p:tnLst>
+      <p:par>
+        <p:cTn id="1" dur="indefinite" restart="never" nodeType="tmRoot">
+          <p:childTnLst>
+            <p:seq concurrent="1" nextAc="seek">
+              <p:cTn id="2" dur="indefinite" nodeType="mainSeq">
+                <p:childTnLst>
+                  <p:par>
+                    <p:cTn id="3" fill="hold">
+                      <p:stCondLst>
+                        <p:cond delay="indefinite"/>
+                        <p:cond evt="onBegin" delay="0">
+                          <p:tn val="2"/>
+                        </p:cond>
+                      </p:stCondLst>
+                      <p:childTnLst>
+                        <p:par>
+                          <p:cTn id="4" fill="hold">
+                            <p:stCondLst>
+                              <p:cond delay="0"/>
+                            </p:stCondLst>
+                            <p:childTnLst>
+                              <p:par>
+                                <p:cTn id="5" presetID="22" presetClass="entr" presetSubtype="8" fill="hold" nodeType="withEffect">
+                                  <p:stCondLst>
+                                    <p:cond delay="0"/>
+                                  </p:stCondLst>
+                                  <p:childTnLst>
+                                    <p:set>
+                                      <p:cBhvr>
+                                        <p:cTn id="6" dur="1" fill="hold">
+                                          <p:stCondLst>
+                                            <p:cond delay="0"/>
+                                          </p:stCondLst>
+                                        </p:cTn>
+                                        <p:tgtEl>
+                                          <p:spTgt spid="27"/>
+                                        </p:tgtEl>
+                                        <p:attrNameLst>
+                                          <p:attrName>style.visibility</p:attrName>
+                                        </p:attrNameLst>
+                                      </p:cBhvr>
+                                      <p:to>
+                                        <p:strVal val="visible"/>
+                                      </p:to>
+                                    </p:set>
+                                    <p:animEffect transition="in" filter="wipe(left)">
+                                      <p:cBhvr>
+                                        <p:cTn id="7" dur="500"/>
+                                        <p:tgtEl>
+                                          <p:spTgt spid="27"/>
+                                        </p:tgtEl>
+                                      </p:cBhvr>
+                                    </p:animEffect>
+                                  </p:childTnLst>
+                                </p:cTn>
+                              </p:par>
+                              <p:par>
+                                <p:cTn id="8" presetID="22" presetClass="entr" presetSubtype="8" fill="hold" nodeType="withEffect">
+                                  <p:stCondLst>
+                                    <p:cond delay="0"/>
+                                  </p:stCondLst>
+                                  <p:childTnLst>
+                                    <p:set>
+                                      <p:cBhvr>
+                                        <p:cTn id="9" dur="1" fill="hold">
+                                          <p:stCondLst>
+                                            <p:cond delay="0"/>
+                                          </p:stCondLst>
+                                        </p:cTn>
+                                        <p:tgtEl>
+                                          <p:spTgt spid="31"/>
+                                        </p:tgtEl>
+                                        <p:attrNameLst>
+                                          <p:attrName>style.visibility</p:attrName>
+                                        </p:attrNameLst>
+                                      </p:cBhvr>
+                                      <p:to>
+                                        <p:strVal val="visible"/>
+                                      </p:to>
+                                    </p:set>
+                                    <p:animEffect transition="in" filter="wipe(left)">
+                                      <p:cBhvr>
+                                        <p:cTn id="10" dur="500"/>
+                                        <p:tgtEl>
+                                          <p:spTgt spid="31"/>
+                                        </p:tgtEl>
+                                      </p:cBhvr>
+                                    </p:animEffect>
+                                  </p:childTnLst>
+                                </p:cTn>
+                              </p:par>
+                              <p:par>
+                                <p:cTn id="11" presetID="22" presetClass="entr" presetSubtype="8" fill="hold" nodeType="withEffect">
+                                  <p:stCondLst>
+                                    <p:cond delay="0"/>
+                                  </p:stCondLst>
+                                  <p:childTnLst>
+                                    <p:set>
+                                      <p:cBhvr>
+                                        <p:cTn id="12" dur="1" fill="hold">
+                                          <p:stCondLst>
+                                            <p:cond delay="0"/>
+                                          </p:stCondLst>
+                                        </p:cTn>
+                                        <p:tgtEl>
+                                          <p:spTgt spid="32"/>
+                                        </p:tgtEl>
+                                        <p:attrNameLst>
+                                          <p:attrName>style.visibility</p:attrName>
+                                        </p:attrNameLst>
+                                      </p:cBhvr>
+                                      <p:to>
+                                        <p:strVal val="visible"/>
+                                      </p:to>
+                                    </p:set>
+                                    <p:animEffect transition="in" filter="wipe(left)">
+                                      <p:cBhvr>
+                                        <p:cTn id="13" dur="500"/>
+                                        <p:tgtEl>
+                                          <p:spTgt spid="32"/>
+                                        </p:tgtEl>
+                                      </p:cBhvr>
+                                    </p:animEffect>
+                                  </p:childTnLst>
+                                </p:cTn>
+                              </p:par>
+                              <p:par>
+                                <p:cTn id="14" presetID="10" presetClass="entr" presetSubtype="0" fill="hold" nodeType="withEffect">
+                                  <p:stCondLst>
+                                    <p:cond delay="100"/>
+                                  </p:stCondLst>
+                                  <p:childTnLst>
+                                    <p:set>
+                                      <p:cBhvr>
+                                        <p:cTn id="15" dur="1" fill="hold">
+                                          <p:stCondLst>
+                                            <p:cond delay="0"/>
+                                          </p:stCondLst>
+                                        </p:cTn>
+                                        <p:tgtEl>
+                                          <p:spTgt spid="15"/>
+                                        </p:tgtEl>
+                                        <p:attrNameLst>
+                                          <p:attrName>style.visibility</p:attrName>
+                                        </p:attrNameLst>
+                                      </p:cBhvr>
+                                      <p:to>
+                                        <p:strVal val="visible"/>
+                                      </p:to>
+                                    </p:set>
+                                    <p:animEffect transition="in" filter="fade">
+                                      <p:cBhvr>
+                                        <p:cTn id="16" dur="250"/>
+                                        <p:tgtEl>
+                                          <p:spTgt spid="15"/>
+                                        </p:tgtEl>
+                                      </p:cBhvr>
+                                    </p:animEffect>
+                                  </p:childTnLst>
+                                </p:cTn>
+                              </p:par>
+                              <p:par>
+                                <p:cTn id="17" presetID="10" presetClass="entr" presetSubtype="0" fill="hold" nodeType="withEffect">
+                                  <p:stCondLst>
+                                    <p:cond delay="200"/>
+                                  </p:stCondLst>
+                                  <p:childTnLst>
+                                    <p:set>
+                                      <p:cBhvr>
+                                        <p:cTn id="18" dur="1" fill="hold">
+                                          <p:stCondLst>
+                                            <p:cond delay="0"/>
+                                          </p:stCondLst>
+                                        </p:cTn>
+                                        <p:tgtEl>
+                                          <p:spTgt spid="16"/>
+                                        </p:tgtEl>
+                                        <p:attrNameLst>
+                                          <p:attrName>style.visibility</p:attrName>
+                                        </p:attrNameLst>
+                                      </p:cBhvr>
+                                      <p:to>
+                                        <p:strVal val="visible"/>
+                                      </p:to>
+                                    </p:set>
+                                    <p:animEffect transition="in" filter="fade">
+                                      <p:cBhvr>
+                                        <p:cTn id="19" dur="250"/>
+                                        <p:tgtEl>
+                                          <p:spTgt spid="16"/>
+                                        </p:tgtEl>
+                                      </p:cBhvr>
+                                    </p:animEffect>
+                                  </p:childTnLst>
+                                </p:cTn>
+                              </p:par>
+                              <p:par>
+                                <p:cTn id="20" presetID="10" presetClass="entr" presetSubtype="0" fill="hold" nodeType="withEffect">
+                                  <p:stCondLst>
+                                    <p:cond delay="100"/>
+                                  </p:stCondLst>
+                                  <p:childTnLst>
+                                    <p:set>
+                                      <p:cBhvr>
+                                        <p:cTn id="21" dur="1" fill="hold">
+                                          <p:stCondLst>
+                                            <p:cond delay="0"/>
+                                          </p:stCondLst>
+                                        </p:cTn>
+                                        <p:tgtEl>
+                                          <p:spTgt spid="44"/>
+                                        </p:tgtEl>
+                                        <p:attrNameLst>
+                                          <p:attrName>style.visibility</p:attrName>
+                                        </p:attrNameLst>
+                                      </p:cBhvr>
+                                      <p:to>
+                                        <p:strVal val="visible"/>
+                                      </p:to>
+                                    </p:set>
+                                    <p:animEffect transition="in" filter="fade">
+                                      <p:cBhvr>
+                                        <p:cTn id="22" dur="250"/>
+                                        <p:tgtEl>
+                                          <p:spTgt spid="44"/>
+                                        </p:tgtEl>
+                                      </p:cBhvr>
+                                    </p:animEffect>
+                                  </p:childTnLst>
+                                </p:cTn>
+                              </p:par>
+                              <p:par>
+                                <p:cTn id="23" presetID="10" presetClass="entr" presetSubtype="0" fill="hold" nodeType="withEffect">
+                                  <p:stCondLst>
+                                    <p:cond delay="100"/>
+                                  </p:stCondLst>
+                                  <p:childTnLst>
+                                    <p:set>
+                                      <p:cBhvr>
+                                        <p:cTn id="24" dur="1" fill="hold">
+                                          <p:stCondLst>
+                                            <p:cond delay="0"/>
+                                          </p:stCondLst>
+                                        </p:cTn>
+                                        <p:tgtEl>
+                                          <p:spTgt spid="47"/>
+                                        </p:tgtEl>
+                                        <p:attrNameLst>
+                                          <p:attrName>style.visibility</p:attrName>
+                                        </p:attrNameLst>
+                                      </p:cBhvr>
+                                      <p:to>
+                                        <p:strVal val="visible"/>
+                                      </p:to>
+                                    </p:set>
+                                    <p:animEffect transition="in" filter="fade">
+                                      <p:cBhvr>
+                                        <p:cTn id="25" dur="250"/>
+                                        <p:tgtEl>
+                                          <p:spTgt spid="47"/>
+                                        </p:tgtEl>
+                                      </p:cBhvr>
+                                    </p:animEffect>
+                                  </p:childTnLst>
+                                </p:cTn>
+                              </p:par>
+                              <p:par>
+                                <p:cTn id="26" presetID="10" presetClass="entr" presetSubtype="0" fill="hold" nodeType="withEffect">
+                                  <p:stCondLst>
+                                    <p:cond delay="100"/>
+                                  </p:stCondLst>
+                                  <p:childTnLst>
+                                    <p:set>
+                                      <p:cBhvr>
+                                        <p:cTn id="27" dur="1" fill="hold">
+                                          <p:stCondLst>
+                                            <p:cond delay="0"/>
+                                          </p:stCondLst>
+                                        </p:cTn>
+                                        <p:tgtEl>
+                                          <p:spTgt spid="58"/>
+                                        </p:tgtEl>
+                                        <p:attrNameLst>
+                                          <p:attrName>style.visibility</p:attrName>
+                                        </p:attrNameLst>
+                                      </p:cBhvr>
+                                      <p:to>
+                                        <p:strVal val="visible"/>
+                                      </p:to>
+                                    </p:set>
+                                    <p:animEffect transition="in" filter="fade">
+                                      <p:cBhvr>
+                                        <p:cTn id="28" dur="250"/>
+                                        <p:tgtEl>
+                                          <p:spTgt spid="58"/>
+                                        </p:tgtEl>
+                                      </p:cBhvr>
+                                    </p:animEffect>
+                                  </p:childTnLst>
+                                </p:cTn>
+                              </p:par>
+                              <p:par>
+                                <p:cTn id="29" presetID="10" presetClass="entr" presetSubtype="0" fill="hold" nodeType="withEffect">
+                                  <p:stCondLst>
+                                    <p:cond delay="100"/>
+                                  </p:stCondLst>
+                                  <p:childTnLst>
+                                    <p:set>
+                                      <p:cBhvr>
+                                        <p:cTn id="30" dur="1" fill="hold">
+                                          <p:stCondLst>
+                                            <p:cond delay="0"/>
+                                          </p:stCondLst>
+                                        </p:cTn>
+                                        <p:tgtEl>
+                                          <p:spTgt spid="61"/>
+                                        </p:tgtEl>
+                                        <p:attrNameLst>
+                                          <p:attrName>style.visibility</p:attrName>
+                                        </p:attrNameLst>
+                                      </p:cBhvr>
+                                      <p:to>
+                                        <p:strVal val="visible"/>
+                                      </p:to>
+                                    </p:set>
+                                    <p:animEffect transition="in" filter="fade">
+                                      <p:cBhvr>
+                                        <p:cTn id="31" dur="250"/>
+                                        <p:tgtEl>
+                                          <p:spTgt spid="61"/>
+                                        </p:tgtEl>
+                                      </p:cBhvr>
+                                    </p:animEffect>
+                                  </p:childTnLst>
+                                </p:cTn>
+                              </p:par>
+                            </p:childTnLst>
+                          </p:cTn>
+                        </p:par>
+                      </p:childTnLst>
+                    </p:cTn>
+                  </p:par>
+                </p:childTnLst>
+              </p:cTn>
+              <p:prevCondLst>
+                <p:cond evt="onPrev" delay="0">
+                  <p:tgtEl>
+                    <p:sldTgt/>
+                  </p:tgtEl>
+                </p:cond>
+              </p:prevCondLst>
+              <p:nextCondLst>
+                <p:cond evt="onNext" delay="0">
+                  <p:tgtEl>
+                    <p:sldTgt/>
+                  </p:tgtEl>
+                </p:cond>
+              </p:nextCondLst>
+            </p:seq>
+          </p:childTnLst>
+        </p:cTn>
+      </p:par>
+    </p:tnLst>
+  </p:timing>
 </p:sld>
 </file>
 
@@ -24236,18 +26143,16 @@
         </p:nvSpPr>
         <p:spPr/>
         <p:txBody>
-          <a:bodyPr>
-            <a:normAutofit fontScale="90000"/>
-          </a:bodyPr>
+          <a:bodyPr/>
           <a:lstStyle/>
           <a:p>
             <a:r>
-              <a:rPr lang="en-US" dirty="0"/>
-              <a:t>Running, improving and maintaining a site in the real </a:t>
-            </a:r>
-            <a:r>
               <a:rPr lang="en-US" dirty="0" smtClean="0"/>
-              <a:t>world</a:t>
+              <a:t>Step </a:t>
+            </a:r>
+            <a:r>
+              <a:rPr lang="en-US" dirty="0" smtClean="0"/>
+              <a:t>2: Global Reach</a:t>
             </a:r>
             <a:endParaRPr lang="en-US" dirty="0"/>
           </a:p>
@@ -24263,245 +26168,69 @@
             <p:ph idx="1"/>
           </p:nvPr>
         </p:nvSpPr>
-        <p:spPr>
-          <a:xfrm>
-            <a:off x="838199" y="1825624"/>
-            <a:ext cx="10681607" cy="4681311"/>
-          </a:xfrm>
-        </p:spPr>
-        <p:txBody>
-          <a:bodyPr>
-            <a:normAutofit fontScale="25000" lnSpcReduction="20000"/>
-          </a:bodyPr>
+        <p:spPr/>
+        <p:txBody>
+          <a:bodyPr/>
           <a:lstStyle/>
           <a:p>
+            <a:pPr marL="0" indent="0">
+              <a:buNone/>
+            </a:pPr>
             <a:r>
               <a:rPr lang="en-US" dirty="0" smtClean="0"/>
-              <a:t>60 minutes</a:t>
-            </a:r>
-          </a:p>
-          <a:p>
+              <a:t>PROBLEM:</a:t>
+            </a:r>
+          </a:p>
+          <a:p>
+            <a:pPr marL="0" indent="0">
+              <a:buNone/>
+            </a:pPr>
+            <a:endParaRPr lang="en-US" dirty="0" smtClean="0"/>
+          </a:p>
+          <a:p>
+            <a:pPr marL="0" indent="0">
+              <a:buNone/>
+            </a:pPr>
             <a:r>
               <a:rPr lang="en-US" dirty="0" smtClean="0"/>
-              <a:t>“Real world” content</a:t>
-            </a:r>
-          </a:p>
-          <a:p>
-            <a:r>
-              <a:rPr lang="en-US" dirty="0" smtClean="0"/>
-              <a:t>Scenario: Scale</a:t>
-            </a:r>
-          </a:p>
-          <a:p>
-            <a:pPr marL="914400" lvl="1" indent="-457200">
-              <a:buFont typeface="+mj-lt"/>
-              <a:buAutoNum type="arabicPeriod"/>
-            </a:pPr>
-            <a:r>
-              <a:rPr lang="en-US" dirty="0" smtClean="0"/>
-              <a:t>Static content to storage (using URL rewrite)</a:t>
-            </a:r>
-          </a:p>
-          <a:p>
-            <a:pPr marL="914400" lvl="1" indent="-457200">
-              <a:buFont typeface="+mj-lt"/>
-              <a:buAutoNum type="arabicPeriod"/>
-            </a:pPr>
-            <a:r>
-              <a:rPr lang="en-US" dirty="0" smtClean="0"/>
-              <a:t>Manual scale</a:t>
-            </a:r>
-          </a:p>
-          <a:p>
-            <a:pPr marL="914400" lvl="1" indent="-457200">
-              <a:buFont typeface="+mj-lt"/>
-              <a:buAutoNum type="arabicPeriod"/>
-            </a:pPr>
-            <a:r>
-              <a:rPr lang="en-US" dirty="0" smtClean="0"/>
-              <a:t>Auto-scale</a:t>
-            </a:r>
-          </a:p>
-          <a:p>
-            <a:pPr marL="914400" lvl="1" indent="-457200">
-              <a:buFont typeface="+mj-lt"/>
-              <a:buAutoNum type="arabicPeriod"/>
-            </a:pPr>
-            <a:r>
-              <a:rPr lang="en-US" dirty="0" smtClean="0"/>
-              <a:t>Caching</a:t>
-            </a:r>
-          </a:p>
-          <a:p>
-            <a:pPr lvl="1"/>
-            <a:r>
-              <a:rPr lang="en-US" dirty="0" smtClean="0"/>
-              <a:t>Use WCAT to show load?</a:t>
-            </a:r>
-          </a:p>
-          <a:p>
-            <a:r>
-              <a:rPr lang="en-US" dirty="0" smtClean="0"/>
-              <a:t>Scenario: Change</a:t>
-            </a:r>
-          </a:p>
-          <a:p>
-            <a:pPr lvl="1"/>
-            <a:r>
-              <a:rPr lang="en-US" dirty="0" smtClean="0"/>
-              <a:t>EF Migrations – both up and down (mention other migration options?)</a:t>
-            </a:r>
-          </a:p>
-          <a:p>
-            <a:pPr lvl="1"/>
-            <a:r>
-              <a:rPr lang="en-US" dirty="0" smtClean="0"/>
-              <a:t>Deployment rollback (</a:t>
-            </a:r>
-            <a:r>
-              <a:rPr lang="en-US" dirty="0" err="1" smtClean="0"/>
-              <a:t>Git</a:t>
-            </a:r>
-            <a:r>
-              <a:rPr lang="en-US" dirty="0" smtClean="0"/>
-              <a:t> / TFS)</a:t>
-            </a:r>
-          </a:p>
-          <a:p>
-            <a:pPr lvl="1"/>
-            <a:r>
-              <a:rPr lang="en-US" dirty="0" smtClean="0"/>
-              <a:t>WAAD (selling private label version of site w/ AD support)</a:t>
-            </a:r>
-          </a:p>
-          <a:p>
-            <a:r>
-              <a:rPr lang="en-US" dirty="0" smtClean="0"/>
-              <a:t>Scenario: </a:t>
-            </a:r>
-            <a:r>
-              <a:rPr lang="en-US" dirty="0" err="1" smtClean="0"/>
-              <a:t>Dev</a:t>
-            </a:r>
-            <a:r>
-              <a:rPr lang="en-US" dirty="0" smtClean="0"/>
-              <a:t> / Test</a:t>
-            </a:r>
-          </a:p>
-          <a:p>
-            <a:pPr lvl="1"/>
-            <a:r>
-              <a:rPr lang="en-US" dirty="0" smtClean="0"/>
-              <a:t>Continuous Integration</a:t>
-            </a:r>
-          </a:p>
-          <a:p>
-            <a:pPr lvl="1"/>
-            <a:r>
-              <a:rPr lang="en-US" dirty="0" smtClean="0"/>
-              <a:t>Multi-environment</a:t>
-            </a:r>
-          </a:p>
-          <a:p>
-            <a:pPr lvl="1"/>
-            <a:r>
-              <a:rPr lang="en-US" dirty="0" smtClean="0"/>
-              <a:t>VM</a:t>
-            </a:r>
-          </a:p>
-          <a:p>
-            <a:pPr lvl="1"/>
-            <a:r>
-              <a:rPr lang="en-US" dirty="0" smtClean="0"/>
-              <a:t>Test Manager?</a:t>
-            </a:r>
-          </a:p>
-          <a:p>
-            <a:pPr lvl="1"/>
-            <a:endParaRPr lang="en-US" dirty="0"/>
-          </a:p>
-          <a:p>
-            <a:r>
-              <a:rPr lang="en-US" dirty="0" smtClean="0"/>
-              <a:t>Note: </a:t>
-            </a:r>
-          </a:p>
-          <a:p>
-            <a:pPr lvl="1"/>
-            <a:r>
-              <a:rPr lang="en-US" dirty="0" smtClean="0"/>
-              <a:t>AD here + SSL (slide driven) – Note: Talk to Vittorio about ACS / AD</a:t>
-            </a:r>
-          </a:p>
-          <a:p>
-            <a:pPr lvl="1"/>
-            <a:r>
-              <a:rPr lang="en-US" dirty="0" smtClean="0"/>
-              <a:t>Slides in appendix to go in depth</a:t>
-            </a:r>
-          </a:p>
-          <a:p>
-            <a:pPr lvl="1"/>
-            <a:r>
-              <a:rPr lang="en-US" dirty="0" smtClean="0"/>
-              <a:t>Make this 75-90 minutes?</a:t>
-            </a:r>
-          </a:p>
-          <a:p>
-            <a:pPr lvl="1"/>
-            <a:r>
-              <a:rPr lang="en-US" dirty="0" smtClean="0"/>
-              <a:t>3 Calls to action for each scenario</a:t>
-            </a:r>
-          </a:p>
-          <a:p>
-            <a:pPr lvl="1"/>
-            <a:r>
-              <a:rPr lang="en-US" dirty="0" smtClean="0"/>
-              <a:t>Include New Relic, maybe Glimpse too</a:t>
-            </a:r>
-          </a:p>
-          <a:p>
-            <a:pPr lvl="1"/>
-            <a:r>
-              <a:rPr lang="en-US" dirty="0" smtClean="0"/>
-              <a:t>Optimization – Web </a:t>
-            </a:r>
-            <a:r>
-              <a:rPr lang="en-US" dirty="0" err="1" smtClean="0"/>
-              <a:t>Dev</a:t>
-            </a:r>
-            <a:r>
-              <a:rPr lang="en-US" dirty="0" smtClean="0"/>
-              <a:t> Checklist</a:t>
-            </a:r>
-          </a:p>
-          <a:p>
-            <a:pPr lvl="1"/>
-            <a:r>
-              <a:rPr lang="en-US" dirty="0" smtClean="0"/>
-              <a:t>Selective publishing</a:t>
-            </a:r>
+              <a:t>It’s hard to deploy a consistent environment in multiple datacenters.</a:t>
+            </a:r>
+          </a:p>
+        </p:txBody>
+      </p:sp>
+      <p:sp>
+        <p:nvSpPr>
+          <p:cNvPr id="4" name="Slide Number Placeholder 3"/>
+          <p:cNvSpPr>
+            <a:spLocks noGrp="1"/>
+          </p:cNvSpPr>
+          <p:nvPr>
+            <p:ph type="sldNum" sz="quarter" idx="12"/>
+          </p:nvPr>
+        </p:nvSpPr>
+        <p:spPr/>
+        <p:txBody>
+          <a:bodyPr/>
+          <a:lstStyle/>
+          <a:p>
+            <a:fld id="{0A164282-434E-41D4-9582-783D542A7B68}" type="slidenum">
+              <a:rPr lang="en-US" smtClean="0"/>
+              <a:t>35</a:t>
+            </a:fld>
+            <a:endParaRPr lang="en-US"/>
           </a:p>
         </p:txBody>
       </p:sp>
     </p:spTree>
     <p:extLst>
       <p:ext uri="{BB962C8B-B14F-4D97-AF65-F5344CB8AC3E}">
-        <p14:creationId xmlns:p14="http://schemas.microsoft.com/office/powerpoint/2010/main" val="193550282"/>
+        <p14:creationId xmlns:p14="http://schemas.microsoft.com/office/powerpoint/2010/main" val="680413815"/>
       </p:ext>
     </p:extLst>
   </p:cSld>
   <p:clrMapOvr>
     <a:masterClrMapping/>
   </p:clrMapOvr>
-  <p:timing>
-    <p:tnLst>
-      <p:par>
-        <p:cTn id="1" dur="indefinite" restart="never" nodeType="tmRoot"/>
-      </p:par>
-    </p:tnLst>
-  </p:timing>
 </p:sld>
 </file>
 
@@ -24524,55 +26253,103 @@
       </p:grpSpPr>
       <p:sp>
         <p:nvSpPr>
-          <p:cNvPr id="4" name="TextBox 3"/>
-          <p:cNvSpPr txBox="1"/>
-          <p:nvPr/>
-        </p:nvSpPr>
-        <p:spPr>
-          <a:xfrm>
-            <a:off x="1992429" y="1780674"/>
-            <a:ext cx="8066632" cy="1200329"/>
-          </a:xfrm>
-          <a:prstGeom prst="rect">
-            <a:avLst/>
-          </a:prstGeom>
-          <a:noFill/>
-        </p:spPr>
-        <p:txBody>
-          <a:bodyPr wrap="none" rtlCol="0">
-            <a:spAutoFit/>
-          </a:bodyPr>
+          <p:cNvPr id="2" name="Title 1"/>
+          <p:cNvSpPr>
+            <a:spLocks noGrp="1"/>
+          </p:cNvSpPr>
+          <p:nvPr>
+            <p:ph type="title"/>
+          </p:nvPr>
+        </p:nvSpPr>
+        <p:spPr/>
+        <p:txBody>
+          <a:bodyPr/>
           <a:lstStyle/>
           <a:p>
             <a:r>
               <a:rPr lang="en-US" dirty="0" smtClean="0"/>
-              <a:t>Shared - ?? Bandwidth – Images to blob storage</a:t>
-            </a:r>
-          </a:p>
-          <a:p>
+              <a:t>Step </a:t>
+            </a:r>
+            <a:r>
+              <a:rPr lang="en-US" dirty="0"/>
+              <a:t>2</a:t>
+            </a:r>
             <a:r>
               <a:rPr lang="en-US" dirty="0" smtClean="0"/>
-              <a:t>Scalability – ARR, ARR Cookie, Affinity, -- Beyond to Cloud Services – Stateless</a:t>
-            </a:r>
-          </a:p>
-          <a:p>
+              <a:t>: Global Reach</a:t>
+            </a:r>
+            <a:endParaRPr lang="en-US" dirty="0"/>
+          </a:p>
+        </p:txBody>
+      </p:sp>
+      <p:sp>
+        <p:nvSpPr>
+          <p:cNvPr id="3" name="Content Placeholder 2"/>
+          <p:cNvSpPr>
+            <a:spLocks noGrp="1"/>
+          </p:cNvSpPr>
+          <p:nvPr>
+            <p:ph idx="1"/>
+          </p:nvPr>
+        </p:nvSpPr>
+        <p:spPr/>
+        <p:txBody>
+          <a:bodyPr/>
+          <a:lstStyle/>
+          <a:p>
+            <a:pPr marL="0" indent="0">
+              <a:buNone/>
+            </a:pPr>
             <a:r>
               <a:rPr lang="en-US" dirty="0" smtClean="0"/>
-              <a:t>Demo Scale Manual</a:t>
-            </a:r>
-          </a:p>
-          <a:p>
+              <a:t>SOLUTION:</a:t>
+            </a:r>
+          </a:p>
+          <a:p>
+            <a:pPr marL="0" indent="0">
+              <a:buNone/>
+            </a:pPr>
+            <a:endParaRPr lang="en-US" dirty="0" smtClean="0"/>
+          </a:p>
+          <a:p>
+            <a:pPr marL="0" indent="0">
+              <a:buNone/>
+            </a:pPr>
             <a:r>
               <a:rPr lang="en-US" dirty="0" smtClean="0"/>
-              <a:t>Demo Scale Auto – Test Project in VS</a:t>
-            </a:r>
+              <a:t>Use automated deployment workflow to ensure consistency in deployment process.</a:t>
+            </a:r>
+            <a:endParaRPr lang="en-US" dirty="0"/>
+          </a:p>
+        </p:txBody>
+      </p:sp>
+      <p:sp>
+        <p:nvSpPr>
+          <p:cNvPr id="4" name="Slide Number Placeholder 3"/>
+          <p:cNvSpPr>
+            <a:spLocks noGrp="1"/>
+          </p:cNvSpPr>
+          <p:nvPr>
+            <p:ph type="sldNum" sz="quarter" idx="12"/>
+          </p:nvPr>
+        </p:nvSpPr>
+        <p:spPr/>
+        <p:txBody>
+          <a:bodyPr/>
+          <a:lstStyle/>
+          <a:p>
+            <a:fld id="{0A164282-434E-41D4-9582-783D542A7B68}" type="slidenum">
+              <a:rPr lang="en-US" smtClean="0"/>
+              <a:t>36</a:t>
+            </a:fld>
+            <a:endParaRPr lang="en-US"/>
           </a:p>
         </p:txBody>
       </p:sp>
     </p:spTree>
     <p:extLst>
       <p:ext uri="{BB962C8B-B14F-4D97-AF65-F5344CB8AC3E}">
-        <p14:creationId xmlns:p14="http://schemas.microsoft.com/office/powerpoint/2010/main" val="4007898504"/>
+        <p14:creationId xmlns:p14="http://schemas.microsoft.com/office/powerpoint/2010/main" val="3833856955"/>
       </p:ext>
     </p:extLst>
   </p:cSld>
@@ -24616,7 +26393,19 @@
           <a:p>
             <a:r>
               <a:rPr lang="en-US" dirty="0" smtClean="0"/>
-              <a:t>Resources</a:t>
+              <a:t>Step </a:t>
+            </a:r>
+            <a:r>
+              <a:rPr lang="en-US" dirty="0" smtClean="0"/>
+              <a:t>3: </a:t>
+            </a:r>
+            <a:r>
+              <a:rPr lang="en-US" dirty="0" smtClean="0"/>
+              <a:t>Continuous </a:t>
+            </a:r>
+            <a:r>
+              <a:rPr lang="en-US" dirty="0" smtClean="0"/>
+              <a:t>Delivery</a:t>
             </a:r>
             <a:endParaRPr lang="en-US" dirty="0"/>
           </a:p>
@@ -24637,23 +26426,60 @@
           <a:bodyPr/>
           <a:lstStyle/>
           <a:p>
-            <a:r>
-              <a:rPr lang="en-US" dirty="0">
-                <a:hlinkClick r:id="rId2"/>
-              </a:rPr>
-              <a:t>http://www.windowsazure.com/en-us/manage/services/cache/net/how-to-cache-service</a:t>
-            </a:r>
-            <a:r>
-              <a:rPr lang="en-US" dirty="0" smtClean="0">
-                <a:hlinkClick r:id="rId2"/>
-              </a:rPr>
-              <a:t>/</a:t>
-            </a:r>
+            <a:pPr marL="0" indent="0">
+              <a:buNone/>
+            </a:pPr>
             <a:r>
               <a:rPr lang="en-US" dirty="0" smtClean="0"/>
-              <a:t> - aka.ms this</a:t>
+              <a:t>PROBLEM:</a:t>
+            </a:r>
+          </a:p>
+          <a:p>
+            <a:pPr marL="0" indent="0">
+              <a:buNone/>
+            </a:pPr>
+            <a:endParaRPr lang="en-US" dirty="0" smtClean="0"/>
+          </a:p>
+          <a:p>
+            <a:pPr marL="0" indent="0">
+              <a:buNone/>
+            </a:pPr>
+            <a:r>
+              <a:rPr lang="en-US" dirty="0" smtClean="0"/>
+              <a:t>Bugs and issues in your code get harder to fix </a:t>
+            </a:r>
+            <a:r>
+              <a:rPr lang="en-US" dirty="0" smtClean="0"/>
+              <a:t/>
+            </a:r>
+            <a:br>
+              <a:rPr lang="en-US" dirty="0" smtClean="0"/>
+            </a:br>
+            <a:r>
+              <a:rPr lang="en-US" dirty="0" smtClean="0"/>
+              <a:t>the </a:t>
+            </a:r>
+            <a:r>
+              <a:rPr lang="en-US" dirty="0" smtClean="0"/>
+              <a:t>longer it takes to find out about them.</a:t>
             </a:r>
             <a:endParaRPr lang="en-US" dirty="0"/>
+          </a:p>
+          <a:p>
+            <a:pPr marL="0" indent="0">
+              <a:buNone/>
+            </a:pPr>
+            <a:r>
+              <a:rPr lang="en-US" dirty="0" smtClean="0"/>
+              <a:t/>
+            </a:r>
+            <a:br>
+              <a:rPr lang="en-US" dirty="0" smtClean="0"/>
+            </a:br>
+            <a:r>
+              <a:rPr lang="en-US" dirty="0" smtClean="0"/>
+              <a:t>Deployment is a risky, error-prone operation.</a:t>
+            </a:r>
           </a:p>
         </p:txBody>
       </p:sp>
@@ -24683,24 +26509,325 @@
     </p:spTree>
     <p:extLst>
       <p:ext uri="{BB962C8B-B14F-4D97-AF65-F5344CB8AC3E}">
-        <p14:creationId xmlns:p14="http://schemas.microsoft.com/office/powerpoint/2010/main" val="2821683008"/>
+        <p14:creationId xmlns:p14="http://schemas.microsoft.com/office/powerpoint/2010/main" val="1064823689"/>
       </p:ext>
     </p:extLst>
   </p:cSld>
   <p:clrMapOvr>
     <a:masterClrMapping/>
   </p:clrMapOvr>
-  <p:timing>
-    <p:tnLst>
-      <p:par>
-        <p:cTn id="1" dur="indefinite" restart="never" nodeType="tmRoot"/>
-      </p:par>
-    </p:tnLst>
-  </p:timing>
 </p:sld>
 </file>
 
 <file path=ppt/slides/slide38.xml><?xml version="1.0" encoding="utf-8"?>
+<p:sld xmlns:a="http://schemas.openxmlformats.org/drawingml/2006/main" xmlns:r="http://schemas.openxmlformats.org/officeDocument/2006/relationships" xmlns:p="http://schemas.openxmlformats.org/presentationml/2006/main">
+  <p:cSld>
+    <p:spTree>
+      <p:nvGrpSpPr>
+        <p:cNvPr id="1" name=""/>
+        <p:cNvGrpSpPr/>
+        <p:nvPr/>
+      </p:nvGrpSpPr>
+      <p:grpSpPr>
+        <a:xfrm>
+          <a:off x="0" y="0"/>
+          <a:ext cx="0" cy="0"/>
+          <a:chOff x="0" y="0"/>
+          <a:chExt cx="0" cy="0"/>
+        </a:xfrm>
+      </p:grpSpPr>
+      <p:sp>
+        <p:nvSpPr>
+          <p:cNvPr id="2" name="Title 1"/>
+          <p:cNvSpPr>
+            <a:spLocks noGrp="1"/>
+          </p:cNvSpPr>
+          <p:nvPr>
+            <p:ph type="title"/>
+          </p:nvPr>
+        </p:nvSpPr>
+        <p:spPr/>
+        <p:txBody>
+          <a:bodyPr/>
+          <a:lstStyle/>
+          <a:p>
+            <a:r>
+              <a:rPr lang="en-US" dirty="0" smtClean="0"/>
+              <a:t>Step </a:t>
+            </a:r>
+            <a:r>
+              <a:rPr lang="en-US" dirty="0" smtClean="0"/>
+              <a:t>3: </a:t>
+            </a:r>
+            <a:r>
+              <a:rPr lang="en-US" dirty="0" smtClean="0"/>
+              <a:t>Continuous </a:t>
+            </a:r>
+            <a:r>
+              <a:rPr lang="en-US" dirty="0" smtClean="0"/>
+              <a:t>Delivery</a:t>
+            </a:r>
+            <a:endParaRPr lang="en-US" dirty="0"/>
+          </a:p>
+        </p:txBody>
+      </p:sp>
+      <p:sp>
+        <p:nvSpPr>
+          <p:cNvPr id="3" name="Content Placeholder 2"/>
+          <p:cNvSpPr>
+            <a:spLocks noGrp="1"/>
+          </p:cNvSpPr>
+          <p:nvPr>
+            <p:ph idx="1"/>
+          </p:nvPr>
+        </p:nvSpPr>
+        <p:spPr/>
+        <p:txBody>
+          <a:bodyPr/>
+          <a:lstStyle/>
+          <a:p>
+            <a:pPr marL="0" indent="0">
+              <a:buNone/>
+            </a:pPr>
+            <a:r>
+              <a:rPr lang="en-US" dirty="0" smtClean="0"/>
+              <a:t>SOLUTION:</a:t>
+            </a:r>
+          </a:p>
+          <a:p>
+            <a:pPr marL="0" indent="0">
+              <a:buNone/>
+            </a:pPr>
+            <a:endParaRPr lang="en-US" dirty="0" smtClean="0"/>
+          </a:p>
+          <a:p>
+            <a:pPr marL="0" indent="0">
+              <a:buNone/>
+            </a:pPr>
+            <a:r>
+              <a:rPr lang="en-US" dirty="0" smtClean="0"/>
+              <a:t>Use continuous integration to automate buil</a:t>
+            </a:r>
+            <a:r>
+              <a:rPr lang="en-US" dirty="0" smtClean="0"/>
+              <a:t>d, unit &amp; integration testing.</a:t>
+            </a:r>
+          </a:p>
+          <a:p>
+            <a:pPr marL="0" indent="0">
+              <a:buNone/>
+            </a:pPr>
+            <a:endParaRPr lang="en-US" dirty="0"/>
+          </a:p>
+          <a:p>
+            <a:pPr marL="0" indent="0">
+              <a:buNone/>
+            </a:pPr>
+            <a:r>
+              <a:rPr lang="en-US" dirty="0" smtClean="0"/>
+              <a:t>Use automated deployment workflow to ensure consistency in deployment process.</a:t>
+            </a:r>
+            <a:endParaRPr lang="en-US" dirty="0"/>
+          </a:p>
+        </p:txBody>
+      </p:sp>
+      <p:sp>
+        <p:nvSpPr>
+          <p:cNvPr id="4" name="Slide Number Placeholder 3"/>
+          <p:cNvSpPr>
+            <a:spLocks noGrp="1"/>
+          </p:cNvSpPr>
+          <p:nvPr>
+            <p:ph type="sldNum" sz="quarter" idx="12"/>
+          </p:nvPr>
+        </p:nvSpPr>
+        <p:spPr/>
+        <p:txBody>
+          <a:bodyPr/>
+          <a:lstStyle/>
+          <a:p>
+            <a:fld id="{0A164282-434E-41D4-9582-783D542A7B68}" type="slidenum">
+              <a:rPr lang="en-US" smtClean="0"/>
+              <a:t>38</a:t>
+            </a:fld>
+            <a:endParaRPr lang="en-US"/>
+          </a:p>
+        </p:txBody>
+      </p:sp>
+    </p:spTree>
+    <p:extLst>
+      <p:ext uri="{BB962C8B-B14F-4D97-AF65-F5344CB8AC3E}">
+        <p14:creationId xmlns:p14="http://schemas.microsoft.com/office/powerpoint/2010/main" val="2713316148"/>
+      </p:ext>
+    </p:extLst>
+  </p:cSld>
+  <p:clrMapOvr>
+    <a:masterClrMapping/>
+  </p:clrMapOvr>
+</p:sld>
+</file>
+
+<file path=ppt/slides/slide39.xml><?xml version="1.0" encoding="utf-8"?>
+<p:sld xmlns:a="http://schemas.openxmlformats.org/drawingml/2006/main" xmlns:r="http://schemas.openxmlformats.org/officeDocument/2006/relationships" xmlns:p="http://schemas.openxmlformats.org/presentationml/2006/main" show="0">
+  <p:cSld>
+    <p:spTree>
+      <p:nvGrpSpPr>
+        <p:cNvPr id="1" name=""/>
+        <p:cNvGrpSpPr/>
+        <p:nvPr/>
+      </p:nvGrpSpPr>
+      <p:grpSpPr>
+        <a:xfrm>
+          <a:off x="0" y="0"/>
+          <a:ext cx="0" cy="0"/>
+          <a:chOff x="0" y="0"/>
+          <a:chExt cx="0" cy="0"/>
+        </a:xfrm>
+      </p:grpSpPr>
+      <p:sp>
+        <p:nvSpPr>
+          <p:cNvPr id="2" name="Title 1"/>
+          <p:cNvSpPr>
+            <a:spLocks noGrp="1"/>
+          </p:cNvSpPr>
+          <p:nvPr>
+            <p:ph type="ctrTitle"/>
+          </p:nvPr>
+        </p:nvSpPr>
+        <p:spPr/>
+        <p:txBody>
+          <a:bodyPr/>
+          <a:lstStyle/>
+          <a:p>
+            <a:r>
+              <a:rPr lang="en-US" dirty="0" smtClean="0"/>
+              <a:t>Demo</a:t>
+            </a:r>
+            <a:endParaRPr lang="en-US" dirty="0"/>
+          </a:p>
+        </p:txBody>
+      </p:sp>
+      <p:sp>
+        <p:nvSpPr>
+          <p:cNvPr id="4" name="Subtitle 3"/>
+          <p:cNvSpPr>
+            <a:spLocks noGrp="1"/>
+          </p:cNvSpPr>
+          <p:nvPr>
+            <p:ph type="subTitle" idx="1"/>
+          </p:nvPr>
+        </p:nvSpPr>
+        <p:spPr/>
+        <p:txBody>
+          <a:bodyPr/>
+          <a:lstStyle/>
+          <a:p>
+            <a:r>
+              <a:rPr lang="en-US" dirty="0" smtClean="0"/>
+              <a:t>Scenario: </a:t>
+            </a:r>
+            <a:r>
+              <a:rPr lang="en-US" dirty="0" smtClean="0"/>
+              <a:t>Multiple environment</a:t>
+            </a:r>
+            <a:endParaRPr lang="en-US" dirty="0"/>
+          </a:p>
+        </p:txBody>
+      </p:sp>
+    </p:spTree>
+    <p:extLst>
+      <p:ext uri="{BB962C8B-B14F-4D97-AF65-F5344CB8AC3E}">
+        <p14:creationId xmlns:p14="http://schemas.microsoft.com/office/powerpoint/2010/main" val="1661626757"/>
+      </p:ext>
+    </p:extLst>
+  </p:cSld>
+  <p:clrMapOvr>
+    <a:masterClrMapping/>
+  </p:clrMapOvr>
+  <mc:AlternateContent xmlns:mc="http://schemas.openxmlformats.org/markup-compatibility/2006">
+    <mc:Choice xmlns:p14="http://schemas.microsoft.com/office/powerpoint/2010/main" Requires="p14">
+      <p:transition spd="slow" p14:dur="2000"/>
+    </mc:Choice>
+    <mc:Fallback>
+      <p:transition spd="slow"/>
+    </mc:Fallback>
+  </mc:AlternateContent>
+</p:sld>
+</file>
+
+<file path=ppt/slides/slide4.xml><?xml version="1.0" encoding="utf-8"?>
+<p:sld xmlns:a="http://schemas.openxmlformats.org/drawingml/2006/main" xmlns:r="http://schemas.openxmlformats.org/officeDocument/2006/relationships" xmlns:p="http://schemas.openxmlformats.org/presentationml/2006/main">
+  <p:cSld>
+    <p:spTree>
+      <p:nvGrpSpPr>
+        <p:cNvPr id="1" name=""/>
+        <p:cNvGrpSpPr/>
+        <p:nvPr/>
+      </p:nvGrpSpPr>
+      <p:grpSpPr>
+        <a:xfrm>
+          <a:off x="0" y="0"/>
+          <a:ext cx="0" cy="0"/>
+          <a:chOff x="0" y="0"/>
+          <a:chExt cx="0" cy="0"/>
+        </a:xfrm>
+      </p:grpSpPr>
+      <p:sp>
+        <p:nvSpPr>
+          <p:cNvPr id="2" name="Title 1"/>
+          <p:cNvSpPr>
+            <a:spLocks noGrp="1"/>
+          </p:cNvSpPr>
+          <p:nvPr>
+            <p:ph type="title"/>
+          </p:nvPr>
+        </p:nvSpPr>
+        <p:spPr/>
+        <p:txBody>
+          <a:bodyPr/>
+          <a:lstStyle/>
+          <a:p>
+            <a:r>
+              <a:rPr lang="en-US" dirty="0" smtClean="0"/>
+              <a:t>Scenario: Scale</a:t>
+            </a:r>
+            <a:endParaRPr lang="en-US" dirty="0"/>
+          </a:p>
+        </p:txBody>
+      </p:sp>
+      <p:sp>
+        <p:nvSpPr>
+          <p:cNvPr id="3" name="Text Placeholder 2"/>
+          <p:cNvSpPr>
+            <a:spLocks noGrp="1"/>
+          </p:cNvSpPr>
+          <p:nvPr>
+            <p:ph type="body" sz="quarter" idx="10"/>
+          </p:nvPr>
+        </p:nvSpPr>
+        <p:spPr/>
+        <p:txBody>
+          <a:bodyPr/>
+          <a:lstStyle/>
+          <a:p>
+            <a:endParaRPr lang="en-US"/>
+          </a:p>
+        </p:txBody>
+      </p:sp>
+    </p:spTree>
+    <p:extLst>
+      <p:ext uri="{BB962C8B-B14F-4D97-AF65-F5344CB8AC3E}">
+        <p14:creationId xmlns:p14="http://schemas.microsoft.com/office/powerpoint/2010/main" val="511082479"/>
+      </p:ext>
+    </p:extLst>
+  </p:cSld>
+  <p:clrMapOvr>
+    <a:masterClrMapping/>
+  </p:clrMapOvr>
+</p:sld>
+</file>
+
+<file path=ppt/slides/slide40.xml><?xml version="1.0" encoding="utf-8"?>
 <p:sld xmlns:a="http://schemas.openxmlformats.org/drawingml/2006/main" xmlns:r="http://schemas.openxmlformats.org/officeDocument/2006/relationships" xmlns:p="http://schemas.openxmlformats.org/presentationml/2006/main">
   <p:cSld>
     <p:bg>
@@ -24756,78 +26883,6 @@
       </p:par>
     </p:tnLst>
   </p:timing>
-</p:sld>
-</file>
-
-<file path=ppt/slides/slide4.xml><?xml version="1.0" encoding="utf-8"?>
-<p:sld xmlns:a="http://schemas.openxmlformats.org/drawingml/2006/main" xmlns:r="http://schemas.openxmlformats.org/officeDocument/2006/relationships" xmlns:p="http://schemas.openxmlformats.org/presentationml/2006/main">
-  <p:cSld>
-    <p:spTree>
-      <p:nvGrpSpPr>
-        <p:cNvPr id="1" name=""/>
-        <p:cNvGrpSpPr/>
-        <p:nvPr/>
-      </p:nvGrpSpPr>
-      <p:grpSpPr>
-        <a:xfrm>
-          <a:off x="0" y="0"/>
-          <a:ext cx="0" cy="0"/>
-          <a:chOff x="0" y="0"/>
-          <a:chExt cx="0" cy="0"/>
-        </a:xfrm>
-      </p:grpSpPr>
-      <p:sp>
-        <p:nvSpPr>
-          <p:cNvPr id="2" name="Title 1"/>
-          <p:cNvSpPr>
-            <a:spLocks noGrp="1"/>
-          </p:cNvSpPr>
-          <p:nvPr>
-            <p:ph type="title"/>
-          </p:nvPr>
-        </p:nvSpPr>
-        <p:spPr/>
-        <p:txBody>
-          <a:bodyPr/>
-          <a:lstStyle/>
-          <a:p>
-            <a:r>
-              <a:rPr lang="en-US" dirty="0" smtClean="0"/>
-              <a:t>Scenario: Scale</a:t>
-            </a:r>
-            <a:endParaRPr lang="en-US" dirty="0"/>
-          </a:p>
-        </p:txBody>
-      </p:sp>
-      <p:sp>
-        <p:nvSpPr>
-          <p:cNvPr id="3" name="Text Placeholder 2"/>
-          <p:cNvSpPr>
-            <a:spLocks noGrp="1"/>
-          </p:cNvSpPr>
-          <p:nvPr>
-            <p:ph type="body" sz="quarter" idx="10"/>
-          </p:nvPr>
-        </p:nvSpPr>
-        <p:spPr/>
-        <p:txBody>
-          <a:bodyPr/>
-          <a:lstStyle/>
-          <a:p>
-            <a:endParaRPr lang="en-US"/>
-          </a:p>
-        </p:txBody>
-      </p:sp>
-    </p:spTree>
-    <p:extLst>
-      <p:ext uri="{BB962C8B-B14F-4D97-AF65-F5344CB8AC3E}">
-        <p14:creationId xmlns:p14="http://schemas.microsoft.com/office/powerpoint/2010/main" val="511082479"/>
-      </p:ext>
-    </p:extLst>
-  </p:cSld>
-  <p:clrMapOvr>
-    <a:masterClrMapping/>
-  </p:clrMapOvr>
 </p:sld>
 </file>
 
@@ -27290,11 +29345,7 @@
           <a:p>
             <a:r>
               <a:rPr lang="en-US" dirty="0" smtClean="0"/>
-              <a:t>Step 1: </a:t>
-            </a:r>
-            <a:r>
-              <a:rPr lang="en-US" dirty="0" smtClean="0"/>
-              <a:t>Preserve server bandwidth</a:t>
+              <a:t>Step 1: Preserve server bandwidth</a:t>
             </a:r>
             <a:endParaRPr lang="en-US" dirty="0"/>
           </a:p>
@@ -27440,11 +29491,7 @@
           <a:p>
             <a:r>
               <a:rPr lang="en-US" dirty="0" smtClean="0"/>
-              <a:t>Step 1: </a:t>
-            </a:r>
-            <a:r>
-              <a:rPr lang="en-US" dirty="0" smtClean="0"/>
-              <a:t>Preserve server bandwidth</a:t>
+              <a:t>Step 1: Preserve server bandwidth</a:t>
             </a:r>
             <a:endParaRPr lang="en-US" dirty="0"/>
           </a:p>
@@ -27485,11 +29532,7 @@
             </a:pPr>
             <a:r>
               <a:rPr lang="en-US" dirty="0" smtClean="0"/>
-              <a:t>Serve static files from blob storage</a:t>
-            </a:r>
-            <a:r>
-              <a:rPr lang="en-US" dirty="0" smtClean="0"/>
-              <a:t>.</a:t>
+              <a:t>Serve static files from blob storage.</a:t>
             </a:r>
           </a:p>
           <a:p>

</xml_diff>

<commit_message>
Changed Windows Azure to Microsoft Azure
</commit_message>
<xml_diff>
--- a/6-ASPNET-in-Production.pptx
+++ b/6-ASPNET-in-Production.pptx
@@ -243,7 +243,7 @@
           <a:p>
             <a:fld id="{0E990FE3-7537-4D15-A9F5-FDF1805FD5F8}" type="datetimeFigureOut">
               <a:rPr lang="en-US" smtClean="0"/>
-              <a:t>10/28/2013</a:t>
+              <a:t>10/3/2014</a:t>
             </a:fld>
             <a:endParaRPr lang="en-US"/>
           </a:p>
@@ -987,7 +987,7 @@
           <a:p>
             <a:fld id="{50A28030-5D59-4E14-AFE9-B93D391AF3AF}" type="datetime1">
               <a:rPr lang="en-US" smtClean="0"/>
-              <a:t>10/28/2013</a:t>
+              <a:t>10/3/2014</a:t>
             </a:fld>
             <a:endParaRPr lang="en-US" dirty="0"/>
           </a:p>
@@ -2841,13 +2841,13 @@
   <p:clrMapOvr>
     <a:masterClrMapping/>
   </p:clrMapOvr>
-  <mc:AlternateContent xmlns:mc="http://schemas.openxmlformats.org/markup-compatibility/2006">
-    <mc:Choice xmlns:p14="http://schemas.microsoft.com/office/powerpoint/2010/main" Requires="p14">
+  <mc:AlternateContent xmlns:mc="http://schemas.openxmlformats.org/markup-compatibility/2006" xmlns:p14="http://schemas.microsoft.com/office/powerpoint/2010/main">
+    <mc:Choice Requires="p14">
       <p:transition spd="med" p14:dur="700">
         <p:fade/>
       </p:transition>
     </mc:Choice>
-    <mc:Fallback>
+    <mc:Fallback xmlns="">
       <p:transition spd="med">
         <p:fade/>
       </p:transition>
@@ -21519,7 +21519,15 @@
             </a:br>
             <a:r>
               <a:rPr lang="en-US" dirty="0" smtClean="0"/>
-              <a:t>  Windows Azure Caching Service.</a:t>
+              <a:t>  </a:t>
+            </a:r>
+            <a:r>
+              <a:rPr lang="en-US" dirty="0" smtClean="0"/>
+              <a:t>Microsoft Azure </a:t>
+            </a:r>
+            <a:r>
+              <a:rPr lang="en-US" dirty="0" smtClean="0"/>
+              <a:t>Caching Service.</a:t>
             </a:r>
             <a:endParaRPr lang="en-US" dirty="0"/>
           </a:p>
@@ -24043,7 +24051,15 @@
             </a:pPr>
             <a:r>
               <a:rPr lang="en-US" dirty="0" smtClean="0"/>
-              <a:t>Take advantage of available Windows Azure services.</a:t>
+              <a:t>Take advantage of available </a:t>
+            </a:r>
+            <a:r>
+              <a:rPr lang="en-US" dirty="0" smtClean="0"/>
+              <a:t>Microsoft Azure </a:t>
+            </a:r>
+            <a:r>
+              <a:rPr lang="en-US" dirty="0" smtClean="0"/>
+              <a:t>services.</a:t>
             </a:r>
             <a:endParaRPr lang="en-US" dirty="0"/>
           </a:p>
@@ -24167,7 +24183,15 @@
           <a:p>
             <a:r>
               <a:rPr lang="en-US" dirty="0" smtClean="0"/>
-              <a:t>Scenario: Windows Azure Active Directory</a:t>
+              <a:t>Scenario: </a:t>
+            </a:r>
+            <a:r>
+              <a:rPr lang="en-US" dirty="0" smtClean="0"/>
+              <a:t>Microsoft Azure </a:t>
+            </a:r>
+            <a:r>
+              <a:rPr lang="en-US" dirty="0" smtClean="0"/>
+              <a:t>Active Directory</a:t>
             </a:r>
             <a:endParaRPr lang="en-US" dirty="0"/>
           </a:p>
@@ -24389,11 +24413,7 @@
             </a:pPr>
             <a:r>
               <a:rPr lang="en-US" dirty="0" smtClean="0"/>
-              <a:t>Running a real site requires </a:t>
-            </a:r>
-            <a:r>
-              <a:rPr lang="en-US" dirty="0" smtClean="0"/>
-              <a:t>multiple internal environments.</a:t>
+              <a:t>Running a real site requires multiple internal environments.</a:t>
             </a:r>
           </a:p>
           <a:p>
@@ -24659,7 +24679,6 @@
               <a:rPr lang="en-US" dirty="0"/>
               <a:t> / Test environments</a:t>
             </a:r>
-            <a:endParaRPr lang="en-US" dirty="0"/>
           </a:p>
         </p:txBody>
       </p:sp>
@@ -24698,7 +24717,15 @@
             </a:pPr>
             <a:r>
               <a:rPr lang="en-US" dirty="0" smtClean="0"/>
-              <a:t>Environment consistency via deployment setup in Windows Azure Web Sites or VM images.</a:t>
+              <a:t>Environment consistency via deployment setup in </a:t>
+            </a:r>
+            <a:r>
+              <a:rPr lang="en-US" dirty="0" smtClean="0"/>
+              <a:t>Microsoft Azure </a:t>
+            </a:r>
+            <a:r>
+              <a:rPr lang="en-US" dirty="0" smtClean="0"/>
+              <a:t>Web Sites or VM images.</a:t>
             </a:r>
           </a:p>
           <a:p>
@@ -24965,13 +24992,6 @@
                 </a:rPr>
                 <a:t>%</a:t>
               </a:r>
-              <a:endParaRPr lang="en-US" sz="13600" dirty="0">
-                <a:solidFill>
-                  <a:srgbClr val="11C1FF"/>
-                </a:solidFill>
-                <a:latin typeface="Segoe UI Light" panose="020B0502040204020203" pitchFamily="34" charset="0"/>
-                <a:cs typeface="Segoe UI Light" panose="020B0502040204020203" pitchFamily="34" charset="0"/>
-              </a:endParaRPr>
             </a:p>
           </p:txBody>
         </p:sp>
@@ -25733,13 +25753,13 @@
   <p:clrMapOvr>
     <a:masterClrMapping/>
   </p:clrMapOvr>
-  <mc:AlternateContent xmlns:mc="http://schemas.openxmlformats.org/markup-compatibility/2006">
-    <mc:Choice xmlns:p14="http://schemas.microsoft.com/office/powerpoint/2010/main" Requires="p14">
+  <mc:AlternateContent xmlns:mc="http://schemas.openxmlformats.org/markup-compatibility/2006" xmlns:p14="http://schemas.microsoft.com/office/powerpoint/2010/main">
+    <mc:Choice Requires="p14">
       <p:transition spd="med" p14:dur="700">
         <p:fade/>
       </p:transition>
     </mc:Choice>
-    <mc:Fallback>
+    <mc:Fallback xmlns="">
       <p:transition spd="med">
         <p:fade/>
       </p:transition>
@@ -26148,11 +26168,7 @@
           <a:p>
             <a:r>
               <a:rPr lang="en-US" dirty="0" smtClean="0"/>
-              <a:t>Step </a:t>
-            </a:r>
-            <a:r>
-              <a:rPr lang="en-US" dirty="0" smtClean="0"/>
-              <a:t>2: Global Reach</a:t>
+              <a:t>Step 2: Global Reach</a:t>
             </a:r>
             <a:endParaRPr lang="en-US" dirty="0"/>
           </a:p>
@@ -26393,19 +26409,7 @@
           <a:p>
             <a:r>
               <a:rPr lang="en-US" dirty="0" smtClean="0"/>
-              <a:t>Step </a:t>
-            </a:r>
-            <a:r>
-              <a:rPr lang="en-US" dirty="0" smtClean="0"/>
-              <a:t>3: </a:t>
-            </a:r>
-            <a:r>
-              <a:rPr lang="en-US" dirty="0" smtClean="0"/>
-              <a:t>Continuous </a:t>
-            </a:r>
-            <a:r>
-              <a:rPr lang="en-US" dirty="0" smtClean="0"/>
-              <a:t>Delivery</a:t>
+              <a:t>Step 3: Continuous Delivery</a:t>
             </a:r>
             <a:endParaRPr lang="en-US" dirty="0"/>
           </a:p>
@@ -26448,20 +26452,12 @@
               <a:rPr lang="en-US" dirty="0" smtClean="0"/>
               <a:t>Bugs and issues in your code get harder to fix </a:t>
             </a:r>
-            <a:r>
-              <a:rPr lang="en-US" dirty="0" smtClean="0"/>
-              <a:t/>
-            </a:r>
             <a:br>
               <a:rPr lang="en-US" dirty="0" smtClean="0"/>
             </a:br>
             <a:r>
               <a:rPr lang="en-US" dirty="0" smtClean="0"/>
-              <a:t>the </a:t>
-            </a:r>
-            <a:r>
-              <a:rPr lang="en-US" dirty="0" smtClean="0"/>
-              <a:t>longer it takes to find out about them.</a:t>
+              <a:t>the longer it takes to find out about them.</a:t>
             </a:r>
             <a:endParaRPr lang="en-US" dirty="0"/>
           </a:p>
@@ -26553,19 +26549,7 @@
           <a:p>
             <a:r>
               <a:rPr lang="en-US" dirty="0" smtClean="0"/>
-              <a:t>Step </a:t>
-            </a:r>
-            <a:r>
-              <a:rPr lang="en-US" dirty="0" smtClean="0"/>
-              <a:t>3: </a:t>
-            </a:r>
-            <a:r>
-              <a:rPr lang="en-US" dirty="0" smtClean="0"/>
-              <a:t>Continuous </a:t>
-            </a:r>
-            <a:r>
-              <a:rPr lang="en-US" dirty="0" smtClean="0"/>
-              <a:t>Delivery</a:t>
+              <a:t>Step 3: Continuous Delivery</a:t>
             </a:r>
             <a:endParaRPr lang="en-US" dirty="0"/>
           </a:p>
@@ -26606,11 +26590,7 @@
             </a:pPr>
             <a:r>
               <a:rPr lang="en-US" dirty="0" smtClean="0"/>
-              <a:t>Use continuous integration to automate buil</a:t>
-            </a:r>
-            <a:r>
-              <a:rPr lang="en-US" dirty="0" smtClean="0"/>
-              <a:t>d, unit &amp; integration testing.</a:t>
+              <a:t>Use continuous integration to automate build, unit &amp; integration testing.</a:t>
             </a:r>
           </a:p>
           <a:p>
@@ -26724,11 +26704,7 @@
           <a:p>
             <a:r>
               <a:rPr lang="en-US" dirty="0" smtClean="0"/>
-              <a:t>Scenario: </a:t>
-            </a:r>
-            <a:r>
-              <a:rPr lang="en-US" dirty="0" smtClean="0"/>
-              <a:t>Multiple environment</a:t>
+              <a:t>Scenario: Multiple environment</a:t>
             </a:r>
             <a:endParaRPr lang="en-US" dirty="0"/>
           </a:p>
@@ -26744,11 +26720,11 @@
   <p:clrMapOvr>
     <a:masterClrMapping/>
   </p:clrMapOvr>
-  <mc:AlternateContent xmlns:mc="http://schemas.openxmlformats.org/markup-compatibility/2006">
-    <mc:Choice xmlns:p14="http://schemas.microsoft.com/office/powerpoint/2010/main" Requires="p14">
+  <mc:AlternateContent xmlns:mc="http://schemas.openxmlformats.org/markup-compatibility/2006" xmlns:p14="http://schemas.microsoft.com/office/powerpoint/2010/main">
+    <mc:Choice Requires="p14">
       <p:transition spd="slow" p14:dur="2000"/>
     </mc:Choice>
-    <mc:Fallback>
+    <mc:Fallback xmlns="">
       <p:transition spd="slow"/>
     </mc:Fallback>
   </mc:AlternateContent>

</xml_diff>